<commit_message>
feature collections didnt have the catalog URI right
</commit_message>
<xml_diff>
--- a/docs/web/thredds/tech/tds4.3/tutorial/NcMLvsFeatureCollections.pptx
+++ b/docs/web/thredds/tech/tds4.3/tutorial/NcMLvsFeatureCollections.pptx
@@ -10,8 +10,9 @@
     <p:sldId id="257" r:id="rId4"/>
     <p:sldId id="258" r:id="rId5"/>
     <p:sldId id="259" r:id="rId6"/>
-    <p:sldId id="260" r:id="rId7"/>
-    <p:sldId id="262" r:id="rId8"/>
+    <p:sldId id="263" r:id="rId7"/>
+    <p:sldId id="260" r:id="rId8"/>
+    <p:sldId id="262" r:id="rId9"/>
   </p:sldIdLst>
   <p:sldSz cx="9144000" cy="6858000" type="screen4x3"/>
   <p:notesSz cx="6858000" cy="9144000"/>
@@ -295,7 +296,7 @@
             <a:fld id="{8DF66C97-51D1-4C46-A462-47E7CAC852FA}" type="datetimeFigureOut">
               <a:rPr lang="en-US" smtClean="0"/>
               <a:pPr/>
-              <a:t>10/17/2012</a:t>
+              <a:t>10/18/2012</a:t>
             </a:fld>
             <a:endParaRPr lang="en-US"/>
           </a:p>
@@ -462,7 +463,7 @@
             <a:fld id="{8DF66C97-51D1-4C46-A462-47E7CAC852FA}" type="datetimeFigureOut">
               <a:rPr lang="en-US" smtClean="0"/>
               <a:pPr/>
-              <a:t>10/17/2012</a:t>
+              <a:t>10/18/2012</a:t>
             </a:fld>
             <a:endParaRPr lang="en-US"/>
           </a:p>
@@ -639,7 +640,7 @@
             <a:fld id="{8DF66C97-51D1-4C46-A462-47E7CAC852FA}" type="datetimeFigureOut">
               <a:rPr lang="en-US" smtClean="0"/>
               <a:pPr/>
-              <a:t>10/17/2012</a:t>
+              <a:t>10/18/2012</a:t>
             </a:fld>
             <a:endParaRPr lang="en-US"/>
           </a:p>
@@ -806,7 +807,7 @@
             <a:fld id="{8DF66C97-51D1-4C46-A462-47E7CAC852FA}" type="datetimeFigureOut">
               <a:rPr lang="en-US" smtClean="0"/>
               <a:pPr/>
-              <a:t>10/17/2012</a:t>
+              <a:t>10/18/2012</a:t>
             </a:fld>
             <a:endParaRPr lang="en-US"/>
           </a:p>
@@ -1049,7 +1050,7 @@
             <a:fld id="{8DF66C97-51D1-4C46-A462-47E7CAC852FA}" type="datetimeFigureOut">
               <a:rPr lang="en-US" smtClean="0"/>
               <a:pPr/>
-              <a:t>10/17/2012</a:t>
+              <a:t>10/18/2012</a:t>
             </a:fld>
             <a:endParaRPr lang="en-US"/>
           </a:p>
@@ -1334,7 +1335,7 @@
             <a:fld id="{8DF66C97-51D1-4C46-A462-47E7CAC852FA}" type="datetimeFigureOut">
               <a:rPr lang="en-US" smtClean="0"/>
               <a:pPr/>
-              <a:t>10/17/2012</a:t>
+              <a:t>10/18/2012</a:t>
             </a:fld>
             <a:endParaRPr lang="en-US"/>
           </a:p>
@@ -1753,7 +1754,7 @@
             <a:fld id="{8DF66C97-51D1-4C46-A462-47E7CAC852FA}" type="datetimeFigureOut">
               <a:rPr lang="en-US" smtClean="0"/>
               <a:pPr/>
-              <a:t>10/17/2012</a:t>
+              <a:t>10/18/2012</a:t>
             </a:fld>
             <a:endParaRPr lang="en-US"/>
           </a:p>
@@ -1868,7 +1869,7 @@
             <a:fld id="{8DF66C97-51D1-4C46-A462-47E7CAC852FA}" type="datetimeFigureOut">
               <a:rPr lang="en-US" smtClean="0"/>
               <a:pPr/>
-              <a:t>10/17/2012</a:t>
+              <a:t>10/18/2012</a:t>
             </a:fld>
             <a:endParaRPr lang="en-US"/>
           </a:p>
@@ -1960,7 +1961,7 @@
             <a:fld id="{8DF66C97-51D1-4C46-A462-47E7CAC852FA}" type="datetimeFigureOut">
               <a:rPr lang="en-US" smtClean="0"/>
               <a:pPr/>
-              <a:t>10/17/2012</a:t>
+              <a:t>10/18/2012</a:t>
             </a:fld>
             <a:endParaRPr lang="en-US"/>
           </a:p>
@@ -2234,7 +2235,7 @@
             <a:fld id="{8DF66C97-51D1-4C46-A462-47E7CAC852FA}" type="datetimeFigureOut">
               <a:rPr lang="en-US" smtClean="0"/>
               <a:pPr/>
-              <a:t>10/17/2012</a:t>
+              <a:t>10/18/2012</a:t>
             </a:fld>
             <a:endParaRPr lang="en-US"/>
           </a:p>
@@ -2484,7 +2485,7 @@
             <a:fld id="{8DF66C97-51D1-4C46-A462-47E7CAC852FA}" type="datetimeFigureOut">
               <a:rPr lang="en-US" smtClean="0"/>
               <a:pPr/>
-              <a:t>10/17/2012</a:t>
+              <a:t>10/18/2012</a:t>
             </a:fld>
             <a:endParaRPr lang="en-US"/>
           </a:p>
@@ -2694,7 +2695,7 @@
             <a:fld id="{8DF66C97-51D1-4C46-A462-47E7CAC852FA}" type="datetimeFigureOut">
               <a:rPr lang="en-US" smtClean="0"/>
               <a:pPr/>
-              <a:t>10/17/2012</a:t>
+              <a:t>10/18/2012</a:t>
             </a:fld>
             <a:endParaRPr lang="en-US"/>
           </a:p>
@@ -3131,6 +3132,13 @@
   <p:clrMapOvr>
     <a:masterClrMapping/>
   </p:clrMapOvr>
+  <p:timing>
+    <p:tnLst>
+      <p:par>
+        <p:cTn id="1" dur="indefinite" restart="never" nodeType="tmRoot"/>
+      </p:par>
+    </p:tnLst>
+  </p:timing>
 </p:sld>
 </file>
 
@@ -3190,7 +3198,9 @@
         </p:nvSpPr>
         <p:spPr/>
         <p:txBody>
-          <a:bodyPr/>
+          <a:bodyPr>
+            <a:normAutofit/>
+          </a:bodyPr>
           <a:lstStyle/>
           <a:p>
             <a:pPr marL="514350" indent="-514350">
@@ -3202,13 +3212,10 @@
               <a:t>Modify the </a:t>
             </a:r>
             <a:r>
-              <a:rPr lang="en-US" dirty="0" err="1" smtClean="0"/>
-              <a:t>netCDF</a:t>
-            </a:r>
-            <a:r>
               <a:rPr lang="en-US" dirty="0" smtClean="0"/>
-              <a:t> objects</a:t>
-            </a:r>
+              <a:t>objects found in CDM files</a:t>
+            </a:r>
+            <a:endParaRPr lang="en-US" dirty="0" smtClean="0"/>
           </a:p>
           <a:p>
             <a:pPr lvl="1"/>
@@ -3253,9 +3260,14 @@
               <a:t>ncgen</a:t>
             </a:r>
             <a:r>
-              <a:rPr lang="en-US" dirty="0" smtClean="0"/>
-              <a:t>, at least in Java</a:t>
-            </a:r>
+              <a:rPr lang="en-US" b="1" dirty="0" smtClean="0"/>
+              <a:t>, </a:t>
+            </a:r>
+            <a:r>
+              <a:rPr lang="en-US" b="1" dirty="0" err="1" smtClean="0"/>
+              <a:t>ncdump</a:t>
+            </a:r>
+            <a:endParaRPr lang="en-US" dirty="0" smtClean="0"/>
           </a:p>
           <a:p>
             <a:pPr marL="914400" lvl="1" indent="-514350"/>
@@ -3278,9 +3290,12 @@
             <a:pPr lvl="1"/>
             <a:r>
               <a:rPr lang="en-US" dirty="0" smtClean="0"/>
-              <a:t>Creating logical datasets out of file collections</a:t>
-            </a:r>
-            <a:endParaRPr lang="en-US" dirty="0"/>
+              <a:t>Creating logical datasets out of file </a:t>
+            </a:r>
+            <a:r>
+              <a:rPr lang="en-US" dirty="0" smtClean="0"/>
+              <a:t>collections</a:t>
+            </a:r>
           </a:p>
         </p:txBody>
       </p:sp>
@@ -3289,6 +3304,13 @@
   <p:clrMapOvr>
     <a:masterClrMapping/>
   </p:clrMapOvr>
+  <p:timing>
+    <p:tnLst>
+      <p:par>
+        <p:cTn id="1" dur="indefinite" restart="never" nodeType="tmRoot"/>
+      </p:par>
+    </p:tnLst>
+  </p:timing>
 </p:sld>
 </file>
 
@@ -3450,6 +3472,13 @@
   <p:clrMapOvr>
     <a:masterClrMapping/>
   </p:clrMapOvr>
+  <p:timing>
+    <p:tnLst>
+      <p:par>
+        <p:cTn id="1" dur="indefinite" restart="never" nodeType="tmRoot"/>
+      </p:par>
+    </p:tnLst>
+  </p:timing>
 </p:sld>
 </file>
 
@@ -3578,8 +3607,8 @@
               <a:t>Inefficient for large </a:t>
             </a:r>
             <a:r>
-              <a:rPr lang="en-US" dirty="0" err="1" smtClean="0"/>
-              <a:t>collecctions</a:t>
+              <a:rPr lang="en-US" dirty="0" smtClean="0"/>
+              <a:t>collections</a:t>
             </a:r>
             <a:endParaRPr lang="en-US" dirty="0" smtClean="0"/>
           </a:p>
@@ -3605,6 +3634,13 @@
   <p:clrMapOvr>
     <a:masterClrMapping/>
   </p:clrMapOvr>
+  <p:timing>
+    <p:tnLst>
+      <p:par>
+        <p:cTn id="1" dur="indefinite" restart="never" nodeType="tmRoot"/>
+      </p:par>
+    </p:tnLst>
+  </p:timing>
 </p:sld>
 </file>
 
@@ -3731,11 +3767,15 @@
             </a:r>
             <a:r>
               <a:rPr lang="en-US" dirty="0" err="1" smtClean="0"/>
-              <a:t>inhomegeneity</a:t>
+              <a:t>inhomogeneity</a:t>
             </a:r>
             <a:r>
               <a:rPr lang="en-US" dirty="0" smtClean="0"/>
-              <a:t> in the files</a:t>
+              <a:t> </a:t>
+            </a:r>
+            <a:r>
+              <a:rPr lang="en-US" dirty="0" smtClean="0"/>
+              <a:t>in the files</a:t>
             </a:r>
           </a:p>
           <a:p>
@@ -3793,6 +3833,13 @@
   <p:clrMapOvr>
     <a:masterClrMapping/>
   </p:clrMapOvr>
+  <p:timing>
+    <p:tnLst>
+      <p:par>
+        <p:cTn id="1" dur="indefinite" restart="never" nodeType="tmRoot"/>
+      </p:par>
+    </p:tnLst>
+  </p:timing>
 </p:sld>
 </file>
 
@@ -3815,121 +3862,1851 @@
       </p:grpSpPr>
       <p:sp>
         <p:nvSpPr>
-          <p:cNvPr id="2" name="Title 1"/>
-          <p:cNvSpPr>
-            <a:spLocks noGrp="1"/>
-          </p:cNvSpPr>
-          <p:nvPr>
-            <p:ph type="title"/>
-          </p:nvPr>
-        </p:nvSpPr>
-        <p:spPr/>
-        <p:txBody>
-          <a:bodyPr/>
-          <a:lstStyle/>
-          <a:p>
-            <a:r>
-              <a:rPr lang="en-US" dirty="0" smtClean="0"/>
-              <a:t>What do you need to know?</a:t>
-            </a:r>
-            <a:endParaRPr lang="en-US" dirty="0"/>
-          </a:p>
-        </p:txBody>
-      </p:sp>
-      <p:sp>
-        <p:nvSpPr>
-          <p:cNvPr id="3" name="Content Placeholder 2"/>
-          <p:cNvSpPr>
-            <a:spLocks noGrp="1"/>
-          </p:cNvSpPr>
-          <p:nvPr>
-            <p:ph idx="1"/>
-          </p:nvPr>
-        </p:nvSpPr>
-        <p:spPr/>
+          <p:cNvPr id="6146" name="Text Box 2"/>
+          <p:cNvSpPr txBox="1">
+            <a:spLocks noChangeArrowheads="1"/>
+          </p:cNvSpPr>
+          <p:nvPr/>
+        </p:nvSpPr>
+        <p:spPr bwMode="auto">
+          <a:xfrm>
+            <a:off x="1371600" y="2238375"/>
+            <a:ext cx="4572000" cy="376238"/>
+          </a:xfrm>
+          <a:prstGeom prst="rect">
+            <a:avLst/>
+          </a:prstGeom>
+          <a:solidFill>
+            <a:srgbClr val="FFFF99"/>
+          </a:solidFill>
+          <a:ln w="9525">
+            <a:solidFill>
+              <a:schemeClr val="tx1"/>
+            </a:solidFill>
+            <a:miter lim="800000"/>
+            <a:headEnd/>
+            <a:tailEnd/>
+          </a:ln>
+        </p:spPr>
         <p:txBody>
           <a:bodyPr>
-            <a:normAutofit fontScale="92500" lnSpcReduction="20000"/>
+            <a:spAutoFit/>
           </a:bodyPr>
           <a:lstStyle/>
           <a:p>
-            <a:r>
-              <a:rPr lang="en-US" dirty="0" err="1" smtClean="0"/>
+            <a:pPr algn="ctr">
+              <a:spcBef>
+                <a:spcPct val="50000"/>
+              </a:spcBef>
+            </a:pPr>
+            <a:r>
+              <a:rPr lang="en-US">
+                <a:latin typeface="Calibri" pitchFamily="34" charset="0"/>
+              </a:rPr>
+              <a:t>NetcdfDataset</a:t>
+            </a:r>
+          </a:p>
+        </p:txBody>
+      </p:sp>
+      <p:sp>
+        <p:nvSpPr>
+          <p:cNvPr id="6147" name="Oval 3"/>
+          <p:cNvSpPr>
+            <a:spLocks noChangeArrowheads="1"/>
+          </p:cNvSpPr>
+          <p:nvPr/>
+        </p:nvSpPr>
+        <p:spPr bwMode="auto">
+          <a:xfrm>
+            <a:off x="5334000" y="409575"/>
+            <a:ext cx="2667000" cy="990600"/>
+          </a:xfrm>
+          <a:prstGeom prst="ellipse">
+            <a:avLst/>
+          </a:prstGeom>
+          <a:solidFill>
+            <a:srgbClr val="99CC00"/>
+          </a:solidFill>
+          <a:ln w="9525">
+            <a:solidFill>
+              <a:schemeClr val="tx1"/>
+            </a:solidFill>
+            <a:round/>
+            <a:headEnd/>
+            <a:tailEnd/>
+          </a:ln>
+        </p:spPr>
+        <p:txBody>
+          <a:bodyPr wrap="none" anchor="ctr"/>
+          <a:lstStyle/>
+          <a:p>
+            <a:pPr algn="ctr"/>
+            <a:r>
+              <a:rPr lang="en-US">
+                <a:latin typeface="Calibri" pitchFamily="34" charset="0"/>
+              </a:rPr>
+              <a:t>Application</a:t>
+            </a:r>
+          </a:p>
+        </p:txBody>
+      </p:sp>
+      <p:cxnSp>
+        <p:nvCxnSpPr>
+          <p:cNvPr id="6148" name="AutoShape 4"/>
+          <p:cNvCxnSpPr>
+            <a:cxnSpLocks noChangeShapeType="1"/>
+            <a:stCxn id="6147" idx="2"/>
+            <a:endCxn id="6151" idx="3"/>
+          </p:cNvCxnSpPr>
+          <p:nvPr/>
+        </p:nvCxnSpPr>
+        <p:spPr bwMode="auto">
+          <a:xfrm rot="10800000" flipV="1">
+            <a:off x="3733800" y="904875"/>
+            <a:ext cx="1600200" cy="225425"/>
+          </a:xfrm>
+          <a:prstGeom prst="straightConnector1">
+            <a:avLst/>
+          </a:prstGeom>
+          <a:noFill/>
+          <a:ln w="9525">
+            <a:solidFill>
+              <a:schemeClr val="tx1"/>
+            </a:solidFill>
+            <a:round/>
+            <a:headEnd/>
+            <a:tailEnd type="triangle" w="med" len="med"/>
+          </a:ln>
+        </p:spPr>
+      </p:cxnSp>
+      <p:cxnSp>
+        <p:nvCxnSpPr>
+          <p:cNvPr id="6149" name="AutoShape 5"/>
+          <p:cNvCxnSpPr>
+            <a:cxnSpLocks noChangeShapeType="1"/>
+            <a:stCxn id="6147" idx="3"/>
+            <a:endCxn id="6146" idx="0"/>
+          </p:cNvCxnSpPr>
+          <p:nvPr/>
+        </p:nvCxnSpPr>
+        <p:spPr bwMode="auto">
+          <a:xfrm flipH="1">
+            <a:off x="3657600" y="1255713"/>
+            <a:ext cx="2066925" cy="982662"/>
+          </a:xfrm>
+          <a:prstGeom prst="straightConnector1">
+            <a:avLst/>
+          </a:prstGeom>
+          <a:noFill/>
+          <a:ln w="9525">
+            <a:solidFill>
+              <a:schemeClr val="tx1"/>
+            </a:solidFill>
+            <a:round/>
+            <a:headEnd/>
+            <a:tailEnd type="triangle" w="med" len="med"/>
+          </a:ln>
+        </p:spPr>
+      </p:cxnSp>
+      <p:cxnSp>
+        <p:nvCxnSpPr>
+          <p:cNvPr id="6150" name="AutoShape 6"/>
+          <p:cNvCxnSpPr>
+            <a:cxnSpLocks noChangeShapeType="1"/>
+            <a:stCxn id="6147" idx="4"/>
+            <a:endCxn id="6169" idx="0"/>
+          </p:cNvCxnSpPr>
+          <p:nvPr/>
+        </p:nvCxnSpPr>
+        <p:spPr bwMode="auto">
+          <a:xfrm flipH="1">
+            <a:off x="5981700" y="1400175"/>
+            <a:ext cx="685800" cy="2057400"/>
+          </a:xfrm>
+          <a:prstGeom prst="straightConnector1">
+            <a:avLst/>
+          </a:prstGeom>
+          <a:noFill/>
+          <a:ln w="9525">
+            <a:solidFill>
+              <a:schemeClr val="tx1"/>
+            </a:solidFill>
+            <a:round/>
+            <a:headEnd/>
+            <a:tailEnd type="triangle" w="med" len="med"/>
+          </a:ln>
+        </p:spPr>
+      </p:cxnSp>
+      <p:sp>
+        <p:nvSpPr>
+          <p:cNvPr id="6151" name="Text Box 7"/>
+          <p:cNvSpPr txBox="1">
+            <a:spLocks noChangeArrowheads="1"/>
+          </p:cNvSpPr>
+          <p:nvPr/>
+        </p:nvSpPr>
+        <p:spPr bwMode="auto">
+          <a:xfrm>
+            <a:off x="228600" y="942975"/>
+            <a:ext cx="3505200" cy="376238"/>
+          </a:xfrm>
+          <a:prstGeom prst="rect">
+            <a:avLst/>
+          </a:prstGeom>
+          <a:solidFill>
+            <a:srgbClr val="FFFF99"/>
+          </a:solidFill>
+          <a:ln w="9525">
+            <a:solidFill>
+              <a:schemeClr val="tx1"/>
+            </a:solidFill>
+            <a:miter lim="800000"/>
+            <a:headEnd/>
+            <a:tailEnd/>
+          </a:ln>
+        </p:spPr>
+        <p:txBody>
+          <a:bodyPr>
+            <a:spAutoFit/>
+          </a:bodyPr>
+          <a:lstStyle/>
+          <a:p>
+            <a:pPr algn="ctr">
+              <a:spcBef>
+                <a:spcPct val="50000"/>
+              </a:spcBef>
+            </a:pPr>
+            <a:r>
+              <a:rPr lang="en-US">
+                <a:latin typeface="Calibri" pitchFamily="34" charset="0"/>
+              </a:rPr>
+              <a:t>Scientific Feature Types</a:t>
+            </a:r>
+          </a:p>
+        </p:txBody>
+      </p:sp>
+      <p:sp>
+        <p:nvSpPr>
+          <p:cNvPr id="6152" name="Line 8"/>
+          <p:cNvSpPr>
+            <a:spLocks noChangeShapeType="1"/>
+          </p:cNvSpPr>
+          <p:nvPr/>
+        </p:nvSpPr>
+        <p:spPr bwMode="auto">
+          <a:xfrm flipH="1">
+            <a:off x="1600200" y="2619375"/>
+            <a:ext cx="0" cy="1143000"/>
+          </a:xfrm>
+          <a:prstGeom prst="line">
+            <a:avLst/>
+          </a:prstGeom>
+          <a:noFill/>
+          <a:ln w="9525">
+            <a:solidFill>
+              <a:schemeClr val="tx1"/>
+            </a:solidFill>
+            <a:round/>
+            <a:headEnd/>
+            <a:tailEnd type="triangle" w="med" len="med"/>
+          </a:ln>
+        </p:spPr>
+        <p:txBody>
+          <a:bodyPr/>
+          <a:lstStyle/>
+          <a:p>
+            <a:endParaRPr lang="en-US"/>
+          </a:p>
+        </p:txBody>
+      </p:sp>
+      <p:sp>
+        <p:nvSpPr>
+          <p:cNvPr id="6153" name="Line 9"/>
+          <p:cNvSpPr>
+            <a:spLocks noChangeShapeType="1"/>
+          </p:cNvSpPr>
+          <p:nvPr/>
+        </p:nvSpPr>
+        <p:spPr bwMode="auto">
+          <a:xfrm>
+            <a:off x="3886200" y="2619375"/>
+            <a:ext cx="0" cy="228600"/>
+          </a:xfrm>
+          <a:prstGeom prst="line">
+            <a:avLst/>
+          </a:prstGeom>
+          <a:noFill/>
+          <a:ln w="9525">
+            <a:solidFill>
+              <a:schemeClr val="tx1"/>
+            </a:solidFill>
+            <a:round/>
+            <a:headEnd/>
+            <a:tailEnd type="triangle" w="med" len="med"/>
+          </a:ln>
+        </p:spPr>
+        <p:txBody>
+          <a:bodyPr/>
+          <a:lstStyle/>
+          <a:p>
+            <a:endParaRPr lang="en-US"/>
+          </a:p>
+        </p:txBody>
+      </p:sp>
+      <p:sp>
+        <p:nvSpPr>
+          <p:cNvPr id="6154" name="Line 10"/>
+          <p:cNvSpPr>
+            <a:spLocks noChangeShapeType="1"/>
+          </p:cNvSpPr>
+          <p:nvPr/>
+        </p:nvSpPr>
+        <p:spPr bwMode="auto">
+          <a:xfrm>
+            <a:off x="3886200" y="3228975"/>
+            <a:ext cx="0" cy="228600"/>
+          </a:xfrm>
+          <a:prstGeom prst="line">
+            <a:avLst/>
+          </a:prstGeom>
+          <a:noFill/>
+          <a:ln w="9525">
+            <a:solidFill>
+              <a:schemeClr val="tx1"/>
+            </a:solidFill>
+            <a:round/>
+            <a:headEnd/>
+            <a:tailEnd type="triangle" w="med" len="med"/>
+          </a:ln>
+        </p:spPr>
+        <p:txBody>
+          <a:bodyPr/>
+          <a:lstStyle/>
+          <a:p>
+            <a:endParaRPr lang="en-US"/>
+          </a:p>
+        </p:txBody>
+      </p:sp>
+      <p:sp>
+        <p:nvSpPr>
+          <p:cNvPr id="6155" name="Line 11"/>
+          <p:cNvSpPr>
+            <a:spLocks noChangeShapeType="1"/>
+          </p:cNvSpPr>
+          <p:nvPr/>
+        </p:nvSpPr>
+        <p:spPr bwMode="auto">
+          <a:xfrm flipH="1">
+            <a:off x="4724400" y="3762375"/>
+            <a:ext cx="0" cy="914400"/>
+          </a:xfrm>
+          <a:prstGeom prst="line">
+            <a:avLst/>
+          </a:prstGeom>
+          <a:noFill/>
+          <a:ln w="9525">
+            <a:solidFill>
+              <a:schemeClr val="tx1"/>
+            </a:solidFill>
+            <a:round/>
+            <a:headEnd/>
+            <a:tailEnd type="triangle" w="med" len="med"/>
+          </a:ln>
+        </p:spPr>
+        <p:txBody>
+          <a:bodyPr/>
+          <a:lstStyle/>
+          <a:p>
+            <a:endParaRPr lang="en-US"/>
+          </a:p>
+        </p:txBody>
+      </p:sp>
+      <p:sp>
+        <p:nvSpPr>
+          <p:cNvPr id="6156" name="Text Box 12"/>
+          <p:cNvSpPr txBox="1">
+            <a:spLocks noChangeArrowheads="1"/>
+          </p:cNvSpPr>
+          <p:nvPr/>
+        </p:nvSpPr>
+        <p:spPr bwMode="auto">
+          <a:xfrm>
+            <a:off x="6553200" y="1752600"/>
+            <a:ext cx="2438400" cy="1016000"/>
+          </a:xfrm>
+          <a:prstGeom prst="rect">
+            <a:avLst/>
+          </a:prstGeom>
+          <a:noFill/>
+          <a:ln w="9525">
+            <a:noFill/>
+            <a:miter lim="800000"/>
+            <a:headEnd/>
+            <a:tailEnd/>
+          </a:ln>
+        </p:spPr>
+        <p:txBody>
+          <a:bodyPr>
+            <a:spAutoFit/>
+          </a:bodyPr>
+          <a:lstStyle/>
+          <a:p>
+            <a:pPr>
+              <a:spcBef>
+                <a:spcPct val="50000"/>
+              </a:spcBef>
+            </a:pPr>
+            <a:r>
+              <a:rPr lang="en-US" sz="2400">
+                <a:latin typeface="Calibri" pitchFamily="34" charset="0"/>
+              </a:rPr>
+              <a:t>NetCDF-Java/</a:t>
+            </a:r>
+          </a:p>
+          <a:p>
+            <a:pPr>
+              <a:spcBef>
+                <a:spcPct val="50000"/>
+              </a:spcBef>
+            </a:pPr>
+            <a:r>
+              <a:rPr lang="en-US" sz="2400">
+                <a:latin typeface="Calibri" pitchFamily="34" charset="0"/>
+              </a:rPr>
+              <a:t>CDM architecture</a:t>
+            </a:r>
+          </a:p>
+        </p:txBody>
+      </p:sp>
+      <p:sp>
+        <p:nvSpPr>
+          <p:cNvPr id="6157" name="Text Box 13"/>
+          <p:cNvSpPr txBox="1">
+            <a:spLocks noChangeArrowheads="1"/>
+          </p:cNvSpPr>
+          <p:nvPr/>
+        </p:nvSpPr>
+        <p:spPr bwMode="auto">
+          <a:xfrm>
+            <a:off x="3733800" y="4676775"/>
+            <a:ext cx="1295400" cy="376238"/>
+          </a:xfrm>
+          <a:prstGeom prst="rect">
+            <a:avLst/>
+          </a:prstGeom>
+          <a:solidFill>
+            <a:srgbClr val="FFCC99"/>
+          </a:solidFill>
+          <a:ln w="9525">
+            <a:solidFill>
+              <a:schemeClr val="tx1"/>
+            </a:solidFill>
+            <a:miter lim="800000"/>
+            <a:headEnd/>
+            <a:tailEnd/>
+          </a:ln>
+        </p:spPr>
+        <p:txBody>
+          <a:bodyPr>
+            <a:spAutoFit/>
+          </a:bodyPr>
+          <a:lstStyle/>
+          <a:p>
+            <a:pPr>
+              <a:spcBef>
+                <a:spcPct val="50000"/>
+              </a:spcBef>
+            </a:pPr>
+            <a:r>
+              <a:rPr lang="en-US">
+                <a:latin typeface="Calibri" pitchFamily="34" charset="0"/>
+              </a:rPr>
+              <a:t>OPeNDAP</a:t>
+            </a:r>
+          </a:p>
+        </p:txBody>
+      </p:sp>
+      <p:grpSp>
+        <p:nvGrpSpPr>
+          <p:cNvPr id="2" name="Group 14"/>
+          <p:cNvGrpSpPr>
+            <a:grpSpLocks/>
+          </p:cNvGrpSpPr>
+          <p:nvPr/>
+        </p:nvGrpSpPr>
+        <p:grpSpPr bwMode="auto">
+          <a:xfrm>
+            <a:off x="533400" y="3762375"/>
+            <a:ext cx="1447800" cy="1676400"/>
+            <a:chOff x="1872" y="2304"/>
+            <a:chExt cx="912" cy="1056"/>
+          </a:xfrm>
+        </p:grpSpPr>
+        <p:sp>
+          <p:nvSpPr>
+            <p:cNvPr id="6187" name="Text Box 15"/>
+            <p:cNvSpPr txBox="1">
+              <a:spLocks noChangeArrowheads="1"/>
+            </p:cNvSpPr>
+            <p:nvPr/>
+          </p:nvSpPr>
+          <p:spPr bwMode="auto">
+            <a:xfrm>
+              <a:off x="1872" y="2304"/>
+              <a:ext cx="912" cy="237"/>
+            </a:xfrm>
+            <a:prstGeom prst="rect">
+              <a:avLst/>
+            </a:prstGeom>
+            <a:solidFill>
+              <a:srgbClr val="FFCC99"/>
+            </a:solidFill>
+            <a:ln w="9525">
+              <a:solidFill>
+                <a:schemeClr val="tx1"/>
+              </a:solidFill>
+              <a:miter lim="800000"/>
+              <a:headEnd/>
+              <a:tailEnd/>
+            </a:ln>
+          </p:spPr>
+          <p:txBody>
+            <a:bodyPr>
+              <a:spAutoFit/>
+            </a:bodyPr>
+            <a:lstStyle/>
+            <a:p>
+              <a:pPr>
+                <a:spcBef>
+                  <a:spcPct val="50000"/>
+                </a:spcBef>
+              </a:pPr>
+              <a:r>
+                <a:rPr lang="en-US">
+                  <a:latin typeface="Calibri" pitchFamily="34" charset="0"/>
+                </a:rPr>
+                <a:t>THREDDS</a:t>
+              </a:r>
+            </a:p>
+          </p:txBody>
+        </p:sp>
+        <p:sp>
+          <p:nvSpPr>
+            <p:cNvPr id="6188" name="AutoShape 16"/>
+            <p:cNvSpPr>
+              <a:spLocks noChangeArrowheads="1"/>
+            </p:cNvSpPr>
+            <p:nvPr/>
+          </p:nvSpPr>
+          <p:spPr bwMode="auto">
+            <a:xfrm>
+              <a:off x="1872" y="2832"/>
+              <a:ext cx="912" cy="528"/>
+            </a:xfrm>
+            <a:prstGeom prst="foldedCorner">
+              <a:avLst>
+                <a:gd name="adj" fmla="val 12500"/>
+              </a:avLst>
+            </a:prstGeom>
+            <a:solidFill>
+              <a:srgbClr val="FFCC99"/>
+            </a:solidFill>
+            <a:ln w="9525">
+              <a:solidFill>
+                <a:schemeClr val="tx1"/>
+              </a:solidFill>
+              <a:round/>
+              <a:headEnd/>
+              <a:tailEnd/>
+            </a:ln>
+          </p:spPr>
+          <p:txBody>
+            <a:bodyPr wrap="none" anchor="ctr"/>
+            <a:lstStyle/>
+            <a:p>
+              <a:pPr algn="ctr"/>
+              <a:r>
+                <a:rPr lang="en-US">
+                  <a:latin typeface="Calibri" pitchFamily="34" charset="0"/>
+                </a:rPr>
+                <a:t>Catalog.xml</a:t>
+              </a:r>
+            </a:p>
+          </p:txBody>
+        </p:sp>
+        <p:cxnSp>
+          <p:nvCxnSpPr>
+            <p:cNvPr id="6189" name="AutoShape 17"/>
+            <p:cNvCxnSpPr>
+              <a:cxnSpLocks noChangeShapeType="1"/>
+              <a:stCxn id="6187" idx="2"/>
+              <a:endCxn id="6188" idx="0"/>
+            </p:cNvCxnSpPr>
+            <p:nvPr/>
+          </p:nvCxnSpPr>
+          <p:spPr bwMode="auto">
+            <a:xfrm>
+              <a:off x="2328" y="2541"/>
+              <a:ext cx="0" cy="291"/>
+            </a:xfrm>
+            <a:prstGeom prst="straightConnector1">
+              <a:avLst/>
+            </a:prstGeom>
+            <a:noFill/>
+            <a:ln w="9525">
+              <a:solidFill>
+                <a:schemeClr val="tx1"/>
+              </a:solidFill>
+              <a:round/>
+              <a:headEnd/>
+              <a:tailEnd type="triangle" w="med" len="med"/>
+            </a:ln>
+          </p:spPr>
+        </p:cxnSp>
+      </p:grpSp>
+      <p:sp>
+        <p:nvSpPr>
+          <p:cNvPr id="6159" name="Text Box 18"/>
+          <p:cNvSpPr txBox="1">
+            <a:spLocks noChangeArrowheads="1"/>
+          </p:cNvSpPr>
+          <p:nvPr/>
+        </p:nvSpPr>
+        <p:spPr bwMode="auto">
+          <a:xfrm>
+            <a:off x="5334000" y="4676775"/>
+            <a:ext cx="1447800" cy="376238"/>
+          </a:xfrm>
+          <a:prstGeom prst="rect">
+            <a:avLst/>
+          </a:prstGeom>
+          <a:solidFill>
+            <a:srgbClr val="FF99CC"/>
+          </a:solidFill>
+          <a:ln w="9525">
+            <a:solidFill>
+              <a:schemeClr val="tx1"/>
+            </a:solidFill>
+            <a:miter lim="800000"/>
+            <a:headEnd/>
+            <a:tailEnd/>
+          </a:ln>
+        </p:spPr>
+        <p:txBody>
+          <a:bodyPr>
+            <a:spAutoFit/>
+          </a:bodyPr>
+          <a:lstStyle/>
+          <a:p>
+            <a:pPr>
+              <a:spcBef>
+                <a:spcPct val="50000"/>
+              </a:spcBef>
+            </a:pPr>
+            <a:r>
+              <a:rPr lang="en-US">
+                <a:latin typeface="Calibri" pitchFamily="34" charset="0"/>
+              </a:rPr>
+              <a:t>NetCDF-3</a:t>
+            </a:r>
+          </a:p>
+        </p:txBody>
+      </p:sp>
+      <p:sp>
+        <p:nvSpPr>
+          <p:cNvPr id="6160" name="Text Box 19"/>
+          <p:cNvSpPr txBox="1">
+            <a:spLocks noChangeArrowheads="1"/>
+          </p:cNvSpPr>
+          <p:nvPr/>
+        </p:nvSpPr>
+        <p:spPr bwMode="auto">
+          <a:xfrm>
+            <a:off x="8153400" y="4295775"/>
+            <a:ext cx="762000" cy="366713"/>
+          </a:xfrm>
+          <a:prstGeom prst="rect">
+            <a:avLst/>
+          </a:prstGeom>
+          <a:noFill/>
+          <a:ln w="9525">
+            <a:noFill/>
+            <a:miter lim="800000"/>
+            <a:headEnd/>
+            <a:tailEnd/>
+          </a:ln>
+        </p:spPr>
+        <p:txBody>
+          <a:bodyPr>
+            <a:spAutoFit/>
+          </a:bodyPr>
+          <a:lstStyle/>
+          <a:p>
+            <a:pPr>
+              <a:spcBef>
+                <a:spcPct val="50000"/>
+              </a:spcBef>
+            </a:pPr>
+            <a:endParaRPr lang="en-US">
+              <a:latin typeface="Calibri" pitchFamily="34" charset="0"/>
+            </a:endParaRPr>
+          </a:p>
+        </p:txBody>
+      </p:sp>
+      <p:sp>
+        <p:nvSpPr>
+          <p:cNvPr id="6161" name="Text Box 20"/>
+          <p:cNvSpPr txBox="1">
+            <a:spLocks noChangeArrowheads="1"/>
+          </p:cNvSpPr>
+          <p:nvPr/>
+        </p:nvSpPr>
+        <p:spPr bwMode="auto">
+          <a:xfrm>
+            <a:off x="5181600" y="5743575"/>
+            <a:ext cx="838200" cy="376238"/>
+          </a:xfrm>
+          <a:prstGeom prst="rect">
+            <a:avLst/>
+          </a:prstGeom>
+          <a:solidFill>
+            <a:srgbClr val="FF99CC"/>
+          </a:solidFill>
+          <a:ln w="9525">
+            <a:solidFill>
+              <a:schemeClr val="tx1"/>
+            </a:solidFill>
+            <a:miter lim="800000"/>
+            <a:headEnd/>
+            <a:tailEnd/>
+          </a:ln>
+        </p:spPr>
+        <p:txBody>
+          <a:bodyPr>
+            <a:spAutoFit/>
+          </a:bodyPr>
+          <a:lstStyle/>
+          <a:p>
+            <a:pPr>
+              <a:spcBef>
+                <a:spcPct val="50000"/>
+              </a:spcBef>
+            </a:pPr>
+            <a:r>
+              <a:rPr lang="en-US">
+                <a:latin typeface="Calibri" pitchFamily="34" charset="0"/>
+              </a:rPr>
+              <a:t>HDF5</a:t>
+            </a:r>
+          </a:p>
+        </p:txBody>
+      </p:sp>
+      <p:sp>
+        <p:nvSpPr>
+          <p:cNvPr id="6162" name="Text Box 21"/>
+          <p:cNvSpPr txBox="1">
+            <a:spLocks noChangeArrowheads="1"/>
+          </p:cNvSpPr>
+          <p:nvPr/>
+        </p:nvSpPr>
+        <p:spPr bwMode="auto">
+          <a:xfrm>
+            <a:off x="5943600" y="4143375"/>
+            <a:ext cx="2819400" cy="376238"/>
+          </a:xfrm>
+          <a:prstGeom prst="rect">
+            <a:avLst/>
+          </a:prstGeom>
+          <a:solidFill>
+            <a:schemeClr val="accent1"/>
+          </a:solidFill>
+          <a:ln w="9525">
+            <a:solidFill>
+              <a:schemeClr val="tx1"/>
+            </a:solidFill>
+            <a:miter lim="800000"/>
+            <a:headEnd/>
+            <a:tailEnd/>
+          </a:ln>
+        </p:spPr>
+        <p:txBody>
+          <a:bodyPr>
+            <a:spAutoFit/>
+          </a:bodyPr>
+          <a:lstStyle/>
+          <a:p>
+            <a:pPr>
+              <a:spcBef>
+                <a:spcPct val="50000"/>
+              </a:spcBef>
+            </a:pPr>
+            <a:r>
+              <a:rPr lang="en-US">
+                <a:latin typeface="Calibri" pitchFamily="34" charset="0"/>
+              </a:rPr>
+              <a:t>I/O service provider</a:t>
+            </a:r>
+          </a:p>
+        </p:txBody>
+      </p:sp>
+      <p:sp>
+        <p:nvSpPr>
+          <p:cNvPr id="6163" name="Text Box 22"/>
+          <p:cNvSpPr txBox="1">
+            <a:spLocks noChangeArrowheads="1"/>
+          </p:cNvSpPr>
+          <p:nvPr/>
+        </p:nvSpPr>
+        <p:spPr bwMode="auto">
+          <a:xfrm>
+            <a:off x="7924800" y="5210175"/>
+            <a:ext cx="838200" cy="376238"/>
+          </a:xfrm>
+          <a:prstGeom prst="rect">
+            <a:avLst/>
+          </a:prstGeom>
+          <a:solidFill>
+            <a:srgbClr val="FF99CC"/>
+          </a:solidFill>
+          <a:ln w="9525">
+            <a:solidFill>
+              <a:schemeClr val="tx1"/>
+            </a:solidFill>
+            <a:miter lim="800000"/>
+            <a:headEnd/>
+            <a:tailEnd/>
+          </a:ln>
+        </p:spPr>
+        <p:txBody>
+          <a:bodyPr>
+            <a:spAutoFit/>
+          </a:bodyPr>
+          <a:lstStyle/>
+          <a:p>
+            <a:pPr>
+              <a:spcBef>
+                <a:spcPct val="50000"/>
+              </a:spcBef>
+            </a:pPr>
+            <a:r>
+              <a:rPr lang="en-US">
+                <a:latin typeface="Calibri" pitchFamily="34" charset="0"/>
+              </a:rPr>
+              <a:t>GRIB</a:t>
+            </a:r>
+          </a:p>
+        </p:txBody>
+      </p:sp>
+      <p:sp>
+        <p:nvSpPr>
+          <p:cNvPr id="6164" name="Text Box 23"/>
+          <p:cNvSpPr txBox="1">
+            <a:spLocks noChangeArrowheads="1"/>
+          </p:cNvSpPr>
+          <p:nvPr/>
+        </p:nvSpPr>
+        <p:spPr bwMode="auto">
+          <a:xfrm>
+            <a:off x="7924800" y="5743575"/>
+            <a:ext cx="838200" cy="376238"/>
+          </a:xfrm>
+          <a:prstGeom prst="rect">
+            <a:avLst/>
+          </a:prstGeom>
+          <a:solidFill>
+            <a:srgbClr val="FF99CC"/>
+          </a:solidFill>
+          <a:ln w="9525">
+            <a:solidFill>
+              <a:schemeClr val="tx1"/>
+            </a:solidFill>
+            <a:miter lim="800000"/>
+            <a:headEnd/>
+            <a:tailEnd/>
+          </a:ln>
+        </p:spPr>
+        <p:txBody>
+          <a:bodyPr>
+            <a:spAutoFit/>
+          </a:bodyPr>
+          <a:lstStyle/>
+          <a:p>
+            <a:pPr>
+              <a:spcBef>
+                <a:spcPct val="50000"/>
+              </a:spcBef>
+            </a:pPr>
+            <a:r>
+              <a:rPr lang="en-US">
+                <a:latin typeface="Calibri" pitchFamily="34" charset="0"/>
+              </a:rPr>
+              <a:t>GINI</a:t>
+            </a:r>
+          </a:p>
+        </p:txBody>
+      </p:sp>
+      <p:sp>
+        <p:nvSpPr>
+          <p:cNvPr id="6165" name="Text Box 24"/>
+          <p:cNvSpPr txBox="1">
+            <a:spLocks noChangeArrowheads="1"/>
+          </p:cNvSpPr>
+          <p:nvPr/>
+        </p:nvSpPr>
+        <p:spPr bwMode="auto">
+          <a:xfrm>
+            <a:off x="7924800" y="4676775"/>
+            <a:ext cx="838200" cy="376238"/>
+          </a:xfrm>
+          <a:prstGeom prst="rect">
+            <a:avLst/>
+          </a:prstGeom>
+          <a:solidFill>
+            <a:srgbClr val="FF99CC"/>
+          </a:solidFill>
+          <a:ln w="9525">
+            <a:solidFill>
+              <a:schemeClr val="tx1"/>
+            </a:solidFill>
+            <a:miter lim="800000"/>
+            <a:headEnd/>
+            <a:tailEnd/>
+          </a:ln>
+        </p:spPr>
+        <p:txBody>
+          <a:bodyPr>
+            <a:spAutoFit/>
+          </a:bodyPr>
+          <a:lstStyle/>
+          <a:p>
+            <a:pPr>
+              <a:spcBef>
+                <a:spcPct val="50000"/>
+              </a:spcBef>
+            </a:pPr>
+            <a:r>
+              <a:rPr lang="en-US">
+                <a:latin typeface="Calibri" pitchFamily="34" charset="0"/>
+              </a:rPr>
+              <a:t>NIDS</a:t>
+            </a:r>
+          </a:p>
+        </p:txBody>
+      </p:sp>
+      <p:cxnSp>
+        <p:nvCxnSpPr>
+          <p:cNvPr id="6166" name="AutoShape 25"/>
+          <p:cNvCxnSpPr>
+            <a:cxnSpLocks noChangeShapeType="1"/>
+            <a:stCxn id="6162" idx="2"/>
+            <a:endCxn id="6163" idx="1"/>
+          </p:cNvCxnSpPr>
+          <p:nvPr/>
+        </p:nvCxnSpPr>
+        <p:spPr bwMode="auto">
+          <a:xfrm rot="16200000" flipH="1">
+            <a:off x="7199312" y="4673601"/>
+            <a:ext cx="879475" cy="571500"/>
+          </a:xfrm>
+          <a:prstGeom prst="bentConnector2">
+            <a:avLst/>
+          </a:prstGeom>
+          <a:noFill/>
+          <a:ln w="9525">
+            <a:solidFill>
+              <a:schemeClr val="tx1"/>
+            </a:solidFill>
+            <a:miter lim="800000"/>
+            <a:headEnd/>
+            <a:tailEnd type="triangle" w="med" len="med"/>
+          </a:ln>
+        </p:spPr>
+      </p:cxnSp>
+      <p:cxnSp>
+        <p:nvCxnSpPr>
+          <p:cNvPr id="6167" name="AutoShape 26"/>
+          <p:cNvCxnSpPr>
+            <a:cxnSpLocks noChangeShapeType="1"/>
+            <a:stCxn id="6162" idx="2"/>
+            <a:endCxn id="6164" idx="1"/>
+          </p:cNvCxnSpPr>
+          <p:nvPr/>
+        </p:nvCxnSpPr>
+        <p:spPr bwMode="auto">
+          <a:xfrm rot="16200000" flipH="1">
+            <a:off x="6932612" y="4940301"/>
+            <a:ext cx="1412875" cy="571500"/>
+          </a:xfrm>
+          <a:prstGeom prst="bentConnector2">
+            <a:avLst/>
+          </a:prstGeom>
+          <a:noFill/>
+          <a:ln w="9525">
+            <a:solidFill>
+              <a:schemeClr val="tx1"/>
+            </a:solidFill>
+            <a:miter lim="800000"/>
+            <a:headEnd/>
+            <a:tailEnd type="triangle" w="med" len="med"/>
+          </a:ln>
+        </p:spPr>
+      </p:cxnSp>
+      <p:cxnSp>
+        <p:nvCxnSpPr>
+          <p:cNvPr id="6168" name="AutoShape 27"/>
+          <p:cNvCxnSpPr>
+            <a:cxnSpLocks noChangeShapeType="1"/>
+            <a:stCxn id="6162" idx="2"/>
+            <a:endCxn id="6165" idx="1"/>
+          </p:cNvCxnSpPr>
+          <p:nvPr/>
+        </p:nvCxnSpPr>
+        <p:spPr bwMode="auto">
+          <a:xfrm rot="16200000" flipH="1">
+            <a:off x="7466012" y="4406901"/>
+            <a:ext cx="346075" cy="571500"/>
+          </a:xfrm>
+          <a:prstGeom prst="bentConnector2">
+            <a:avLst/>
+          </a:prstGeom>
+          <a:noFill/>
+          <a:ln w="9525">
+            <a:solidFill>
+              <a:schemeClr val="tx1"/>
+            </a:solidFill>
+            <a:miter lim="800000"/>
+            <a:headEnd/>
+            <a:tailEnd type="triangle" w="med" len="med"/>
+          </a:ln>
+        </p:spPr>
+      </p:cxnSp>
+      <p:sp>
+        <p:nvSpPr>
+          <p:cNvPr id="6169" name="Text Box 28"/>
+          <p:cNvSpPr txBox="1">
+            <a:spLocks noChangeArrowheads="1"/>
+          </p:cNvSpPr>
+          <p:nvPr/>
+        </p:nvSpPr>
+        <p:spPr bwMode="auto">
+          <a:xfrm>
+            <a:off x="3124200" y="3457575"/>
+            <a:ext cx="5715000" cy="376238"/>
+          </a:xfrm>
+          <a:prstGeom prst="rect">
+            <a:avLst/>
+          </a:prstGeom>
+          <a:solidFill>
+            <a:srgbClr val="FFFF99"/>
+          </a:solidFill>
+          <a:ln w="9525">
+            <a:solidFill>
+              <a:schemeClr val="tx1"/>
+            </a:solidFill>
+            <a:miter lim="800000"/>
+            <a:headEnd/>
+            <a:tailEnd/>
+          </a:ln>
+        </p:spPr>
+        <p:txBody>
+          <a:bodyPr>
+            <a:spAutoFit/>
+          </a:bodyPr>
+          <a:lstStyle/>
+          <a:p>
+            <a:pPr algn="ctr">
+              <a:spcBef>
+                <a:spcPct val="50000"/>
+              </a:spcBef>
+            </a:pPr>
+            <a:r>
+              <a:rPr lang="en-US">
+                <a:latin typeface="Calibri" pitchFamily="34" charset="0"/>
+              </a:rPr>
+              <a:t>NetcdfFile</a:t>
+            </a:r>
+          </a:p>
+        </p:txBody>
+      </p:sp>
+      <p:sp>
+        <p:nvSpPr>
+          <p:cNvPr id="6170" name="Line 29"/>
+          <p:cNvSpPr>
+            <a:spLocks noChangeShapeType="1"/>
+          </p:cNvSpPr>
+          <p:nvPr/>
+        </p:nvSpPr>
+        <p:spPr bwMode="auto">
+          <a:xfrm>
+            <a:off x="7467600" y="3838575"/>
+            <a:ext cx="0" cy="304800"/>
+          </a:xfrm>
+          <a:prstGeom prst="line">
+            <a:avLst/>
+          </a:prstGeom>
+          <a:noFill/>
+          <a:ln w="9525">
+            <a:solidFill>
+              <a:schemeClr val="tx1"/>
+            </a:solidFill>
+            <a:round/>
+            <a:headEnd/>
+            <a:tailEnd type="triangle" w="med" len="med"/>
+          </a:ln>
+        </p:spPr>
+        <p:txBody>
+          <a:bodyPr/>
+          <a:lstStyle/>
+          <a:p>
+            <a:endParaRPr lang="en-US"/>
+          </a:p>
+        </p:txBody>
+      </p:sp>
+      <p:sp>
+        <p:nvSpPr>
+          <p:cNvPr id="6171" name="Text Box 30"/>
+          <p:cNvSpPr txBox="1">
+            <a:spLocks noChangeArrowheads="1"/>
+          </p:cNvSpPr>
+          <p:nvPr/>
+        </p:nvSpPr>
+        <p:spPr bwMode="auto">
+          <a:xfrm>
+            <a:off x="5257800" y="5210175"/>
+            <a:ext cx="1295400" cy="385763"/>
+          </a:xfrm>
+          <a:prstGeom prst="rect">
+            <a:avLst/>
+          </a:prstGeom>
+          <a:gradFill rotWithShape="1">
+            <a:gsLst>
+              <a:gs pos="0">
+                <a:srgbClr val="76475E"/>
+              </a:gs>
+              <a:gs pos="50000">
+                <a:srgbClr val="FF99CC"/>
+              </a:gs>
+              <a:gs pos="100000">
+                <a:srgbClr val="76475E"/>
+              </a:gs>
+            </a:gsLst>
+            <a:lin ang="5400000" scaled="1"/>
+          </a:gradFill>
+          <a:ln w="19050">
+            <a:solidFill>
+              <a:schemeClr val="tx1"/>
+            </a:solidFill>
+            <a:prstDash val="dash"/>
+            <a:miter lim="800000"/>
+            <a:headEnd/>
+            <a:tailEnd/>
+          </a:ln>
+        </p:spPr>
+        <p:txBody>
+          <a:bodyPr>
+            <a:spAutoFit/>
+          </a:bodyPr>
+          <a:lstStyle/>
+          <a:p>
+            <a:pPr>
+              <a:spcBef>
+                <a:spcPct val="50000"/>
+              </a:spcBef>
+            </a:pPr>
+            <a:r>
+              <a:rPr lang="en-US">
+                <a:latin typeface="Calibri" pitchFamily="34" charset="0"/>
+              </a:rPr>
+              <a:t>NetCDF-4</a:t>
+            </a:r>
+          </a:p>
+        </p:txBody>
+      </p:sp>
+      <p:sp>
+        <p:nvSpPr>
+          <p:cNvPr id="6172" name="Line 31"/>
+          <p:cNvSpPr>
+            <a:spLocks noChangeShapeType="1"/>
+          </p:cNvSpPr>
+          <p:nvPr/>
+        </p:nvSpPr>
+        <p:spPr bwMode="auto">
+          <a:xfrm flipH="1" flipV="1">
+            <a:off x="6553200" y="5438775"/>
+            <a:ext cx="762000" cy="0"/>
+          </a:xfrm>
+          <a:prstGeom prst="line">
+            <a:avLst/>
+          </a:prstGeom>
+          <a:noFill/>
+          <a:ln w="9525">
+            <a:solidFill>
+              <a:schemeClr val="tx1"/>
+            </a:solidFill>
+            <a:round/>
+            <a:headEnd/>
+            <a:tailEnd type="triangle" w="med" len="med"/>
+          </a:ln>
+        </p:spPr>
+        <p:txBody>
+          <a:bodyPr/>
+          <a:lstStyle/>
+          <a:p>
+            <a:endParaRPr lang="en-US"/>
+          </a:p>
+        </p:txBody>
+      </p:sp>
+      <p:sp>
+        <p:nvSpPr>
+          <p:cNvPr id="6173" name="Line 32"/>
+          <p:cNvSpPr>
+            <a:spLocks noChangeShapeType="1"/>
+          </p:cNvSpPr>
+          <p:nvPr/>
+        </p:nvSpPr>
+        <p:spPr bwMode="auto">
+          <a:xfrm flipH="1" flipV="1">
+            <a:off x="6781800" y="4829175"/>
+            <a:ext cx="533400" cy="0"/>
+          </a:xfrm>
+          <a:prstGeom prst="line">
+            <a:avLst/>
+          </a:prstGeom>
+          <a:noFill/>
+          <a:ln w="9525">
+            <a:solidFill>
+              <a:schemeClr val="tx1"/>
+            </a:solidFill>
+            <a:round/>
+            <a:headEnd/>
+            <a:tailEnd type="triangle" w="med" len="med"/>
+          </a:ln>
+        </p:spPr>
+        <p:txBody>
+          <a:bodyPr/>
+          <a:lstStyle/>
+          <a:p>
+            <a:endParaRPr lang="en-US"/>
+          </a:p>
+        </p:txBody>
+      </p:sp>
+      <p:cxnSp>
+        <p:nvCxnSpPr>
+          <p:cNvPr id="6174" name="AutoShape 33"/>
+          <p:cNvCxnSpPr>
+            <a:cxnSpLocks noChangeShapeType="1"/>
+            <a:stCxn id="6162" idx="2"/>
+            <a:endCxn id="6178" idx="1"/>
+          </p:cNvCxnSpPr>
+          <p:nvPr/>
+        </p:nvCxnSpPr>
+        <p:spPr bwMode="auto">
+          <a:xfrm rot="16200000" flipH="1">
+            <a:off x="6627812" y="5245101"/>
+            <a:ext cx="2022475" cy="571500"/>
+          </a:xfrm>
+          <a:prstGeom prst="bentConnector2">
+            <a:avLst/>
+          </a:prstGeom>
+          <a:noFill/>
+          <a:ln w="9525">
+            <a:solidFill>
+              <a:schemeClr val="tx1"/>
+            </a:solidFill>
+            <a:miter lim="800000"/>
+            <a:headEnd/>
+            <a:tailEnd type="triangle" w="med" len="med"/>
+          </a:ln>
+        </p:spPr>
+      </p:cxnSp>
+      <p:sp>
+        <p:nvSpPr>
+          <p:cNvPr id="6175" name="Text Box 34"/>
+          <p:cNvSpPr txBox="1">
+            <a:spLocks noChangeArrowheads="1"/>
+          </p:cNvSpPr>
+          <p:nvPr/>
+        </p:nvSpPr>
+        <p:spPr bwMode="auto">
+          <a:xfrm>
+            <a:off x="6324600" y="6491288"/>
+            <a:ext cx="1066800" cy="366712"/>
+          </a:xfrm>
+          <a:prstGeom prst="rect">
+            <a:avLst/>
+          </a:prstGeom>
+          <a:noFill/>
+          <a:ln w="9525">
+            <a:noFill/>
+            <a:miter lim="800000"/>
+            <a:headEnd/>
+            <a:tailEnd/>
+          </a:ln>
+        </p:spPr>
+        <p:txBody>
+          <a:bodyPr>
+            <a:spAutoFit/>
+          </a:bodyPr>
+          <a:lstStyle/>
+          <a:p>
+            <a:pPr algn="r">
+              <a:spcBef>
+                <a:spcPct val="50000"/>
+              </a:spcBef>
+            </a:pPr>
+            <a:r>
+              <a:rPr lang="en-US">
+                <a:latin typeface="Calibri" pitchFamily="34" charset="0"/>
+              </a:rPr>
+              <a:t>…</a:t>
+            </a:r>
+          </a:p>
+        </p:txBody>
+      </p:sp>
+      <p:cxnSp>
+        <p:nvCxnSpPr>
+          <p:cNvPr id="6176" name="AutoShape 35"/>
+          <p:cNvCxnSpPr>
+            <a:cxnSpLocks noChangeShapeType="1"/>
+            <a:stCxn id="6162" idx="2"/>
+            <a:endCxn id="6177" idx="3"/>
+          </p:cNvCxnSpPr>
+          <p:nvPr/>
+        </p:nvCxnSpPr>
+        <p:spPr bwMode="auto">
+          <a:xfrm rot="5400000">
+            <a:off x="6323012" y="5359401"/>
+            <a:ext cx="1870075" cy="190500"/>
+          </a:xfrm>
+          <a:prstGeom prst="bentConnector2">
+            <a:avLst/>
+          </a:prstGeom>
+          <a:noFill/>
+          <a:ln w="9525">
+            <a:solidFill>
+              <a:schemeClr val="tx1"/>
+            </a:solidFill>
+            <a:miter lim="800000"/>
+            <a:headEnd/>
+            <a:tailEnd type="triangle" w="med" len="med"/>
+          </a:ln>
+        </p:spPr>
+      </p:cxnSp>
+      <p:sp>
+        <p:nvSpPr>
+          <p:cNvPr id="6177" name="Text Box 36"/>
+          <p:cNvSpPr txBox="1">
+            <a:spLocks noChangeArrowheads="1"/>
+          </p:cNvSpPr>
+          <p:nvPr/>
+        </p:nvSpPr>
+        <p:spPr bwMode="auto">
+          <a:xfrm>
+            <a:off x="6019800" y="6200775"/>
+            <a:ext cx="1143000" cy="376238"/>
+          </a:xfrm>
+          <a:prstGeom prst="rect">
+            <a:avLst/>
+          </a:prstGeom>
+          <a:solidFill>
+            <a:srgbClr val="FF99CC"/>
+          </a:solidFill>
+          <a:ln w="9525">
+            <a:solidFill>
+              <a:schemeClr val="tx1"/>
+            </a:solidFill>
+            <a:miter lim="800000"/>
+            <a:headEnd/>
+            <a:tailEnd/>
+          </a:ln>
+        </p:spPr>
+        <p:txBody>
+          <a:bodyPr>
+            <a:spAutoFit/>
+          </a:bodyPr>
+          <a:lstStyle/>
+          <a:p>
+            <a:pPr>
+              <a:spcBef>
+                <a:spcPct val="50000"/>
+              </a:spcBef>
+            </a:pPr>
+            <a:r>
+              <a:rPr lang="en-US">
+                <a:latin typeface="Calibri" pitchFamily="34" charset="0"/>
+              </a:rPr>
+              <a:t>Nexrad</a:t>
+            </a:r>
+          </a:p>
+        </p:txBody>
+      </p:sp>
+      <p:sp>
+        <p:nvSpPr>
+          <p:cNvPr id="6178" name="Text Box 37"/>
+          <p:cNvSpPr txBox="1">
+            <a:spLocks noChangeArrowheads="1"/>
+          </p:cNvSpPr>
+          <p:nvPr/>
+        </p:nvSpPr>
+        <p:spPr bwMode="auto">
+          <a:xfrm>
+            <a:off x="7924800" y="6353175"/>
+            <a:ext cx="914400" cy="376238"/>
+          </a:xfrm>
+          <a:prstGeom prst="rect">
+            <a:avLst/>
+          </a:prstGeom>
+          <a:solidFill>
+            <a:srgbClr val="FF99CC"/>
+          </a:solidFill>
+          <a:ln w="9525">
+            <a:solidFill>
+              <a:schemeClr val="tx1"/>
+            </a:solidFill>
+            <a:miter lim="800000"/>
+            <a:headEnd/>
+            <a:tailEnd/>
+          </a:ln>
+        </p:spPr>
+        <p:txBody>
+          <a:bodyPr>
+            <a:spAutoFit/>
+          </a:bodyPr>
+          <a:lstStyle/>
+          <a:p>
+            <a:pPr>
+              <a:spcBef>
+                <a:spcPct val="50000"/>
+              </a:spcBef>
+            </a:pPr>
+            <a:r>
+              <a:rPr lang="en-US">
+                <a:latin typeface="Calibri" pitchFamily="34" charset="0"/>
+              </a:rPr>
+              <a:t>DMSP</a:t>
+            </a:r>
+          </a:p>
+        </p:txBody>
+      </p:sp>
+      <p:sp>
+        <p:nvSpPr>
+          <p:cNvPr id="6179" name="Line 38"/>
+          <p:cNvSpPr>
+            <a:spLocks noChangeShapeType="1"/>
+          </p:cNvSpPr>
+          <p:nvPr/>
+        </p:nvSpPr>
+        <p:spPr bwMode="auto">
+          <a:xfrm flipH="1" flipV="1">
+            <a:off x="6019800" y="5895975"/>
+            <a:ext cx="1295400" cy="0"/>
+          </a:xfrm>
+          <a:prstGeom prst="line">
+            <a:avLst/>
+          </a:prstGeom>
+          <a:noFill/>
+          <a:ln w="9525">
+            <a:solidFill>
+              <a:schemeClr val="tx1"/>
+            </a:solidFill>
+            <a:round/>
+            <a:headEnd/>
+            <a:tailEnd type="triangle" w="med" len="med"/>
+          </a:ln>
+        </p:spPr>
+        <p:txBody>
+          <a:bodyPr/>
+          <a:lstStyle/>
+          <a:p>
+            <a:endParaRPr lang="en-US"/>
+          </a:p>
+        </p:txBody>
+      </p:sp>
+      <p:sp>
+        <p:nvSpPr>
+          <p:cNvPr id="6180" name="Text Box 39"/>
+          <p:cNvSpPr txBox="1">
+            <a:spLocks noChangeArrowheads="1"/>
+          </p:cNvSpPr>
+          <p:nvPr/>
+        </p:nvSpPr>
+        <p:spPr bwMode="auto">
+          <a:xfrm>
+            <a:off x="2819400" y="2847975"/>
+            <a:ext cx="2362200" cy="376238"/>
+          </a:xfrm>
+          <a:prstGeom prst="rect">
+            <a:avLst/>
+          </a:prstGeom>
+          <a:solidFill>
+            <a:schemeClr val="accent1"/>
+          </a:solidFill>
+          <a:ln w="9525">
+            <a:solidFill>
+              <a:schemeClr val="tx1"/>
+            </a:solidFill>
+            <a:miter lim="800000"/>
+            <a:headEnd/>
+            <a:tailEnd/>
+          </a:ln>
+        </p:spPr>
+        <p:txBody>
+          <a:bodyPr>
+            <a:spAutoFit/>
+          </a:bodyPr>
+          <a:lstStyle/>
+          <a:p>
+            <a:pPr>
+              <a:spcBef>
+                <a:spcPct val="50000"/>
+              </a:spcBef>
+            </a:pPr>
+            <a:r>
+              <a:rPr lang="en-US">
+                <a:latin typeface="Calibri" pitchFamily="34" charset="0"/>
+              </a:rPr>
+              <a:t>CoordSystem Builder</a:t>
+            </a:r>
+          </a:p>
+        </p:txBody>
+      </p:sp>
+      <p:sp>
+        <p:nvSpPr>
+          <p:cNvPr id="6181" name="Text Box 40"/>
+          <p:cNvSpPr txBox="1">
+            <a:spLocks noChangeArrowheads="1"/>
+          </p:cNvSpPr>
+          <p:nvPr/>
+        </p:nvSpPr>
+        <p:spPr bwMode="auto">
+          <a:xfrm>
+            <a:off x="533400" y="1552575"/>
+            <a:ext cx="3200400" cy="376238"/>
+          </a:xfrm>
+          <a:prstGeom prst="rect">
+            <a:avLst/>
+          </a:prstGeom>
+          <a:solidFill>
+            <a:schemeClr val="accent1"/>
+          </a:solidFill>
+          <a:ln w="9525">
+            <a:solidFill>
+              <a:schemeClr val="tx1"/>
+            </a:solidFill>
+            <a:miter lim="800000"/>
+            <a:headEnd/>
+            <a:tailEnd/>
+          </a:ln>
+        </p:spPr>
+        <p:txBody>
+          <a:bodyPr>
+            <a:spAutoFit/>
+          </a:bodyPr>
+          <a:lstStyle/>
+          <a:p>
+            <a:pPr>
+              <a:spcBef>
+                <a:spcPct val="50000"/>
+              </a:spcBef>
+            </a:pPr>
+            <a:r>
+              <a:rPr lang="en-US">
+                <a:latin typeface="Calibri" pitchFamily="34" charset="0"/>
+              </a:rPr>
+              <a:t>Datatype Adapter</a:t>
+            </a:r>
+          </a:p>
+        </p:txBody>
+      </p:sp>
+      <p:sp>
+        <p:nvSpPr>
+          <p:cNvPr id="6182" name="Line 41"/>
+          <p:cNvSpPr>
+            <a:spLocks noChangeShapeType="1"/>
+          </p:cNvSpPr>
+          <p:nvPr/>
+        </p:nvSpPr>
+        <p:spPr bwMode="auto">
+          <a:xfrm flipH="1">
+            <a:off x="5562600" y="2619375"/>
+            <a:ext cx="0" cy="838200"/>
+          </a:xfrm>
+          <a:prstGeom prst="line">
+            <a:avLst/>
+          </a:prstGeom>
+          <a:noFill/>
+          <a:ln w="9525">
+            <a:solidFill>
+              <a:schemeClr val="tx1"/>
+            </a:solidFill>
+            <a:round/>
+            <a:headEnd/>
+            <a:tailEnd type="triangle" w="med" len="med"/>
+          </a:ln>
+        </p:spPr>
+        <p:txBody>
+          <a:bodyPr/>
+          <a:lstStyle/>
+          <a:p>
+            <a:endParaRPr lang="en-US"/>
+          </a:p>
+        </p:txBody>
+      </p:sp>
+      <p:sp>
+        <p:nvSpPr>
+          <p:cNvPr id="6183" name="Line 42"/>
+          <p:cNvSpPr>
+            <a:spLocks noChangeShapeType="1"/>
+          </p:cNvSpPr>
+          <p:nvPr/>
+        </p:nvSpPr>
+        <p:spPr bwMode="auto">
+          <a:xfrm>
+            <a:off x="1981200" y="1323975"/>
+            <a:ext cx="0" cy="228600"/>
+          </a:xfrm>
+          <a:prstGeom prst="line">
+            <a:avLst/>
+          </a:prstGeom>
+          <a:noFill/>
+          <a:ln w="9525">
+            <a:solidFill>
+              <a:schemeClr val="tx1"/>
+            </a:solidFill>
+            <a:round/>
+            <a:headEnd/>
+            <a:tailEnd type="triangle" w="med" len="med"/>
+          </a:ln>
+        </p:spPr>
+        <p:txBody>
+          <a:bodyPr/>
+          <a:lstStyle/>
+          <a:p>
+            <a:endParaRPr lang="en-US"/>
+          </a:p>
+        </p:txBody>
+      </p:sp>
+      <p:sp>
+        <p:nvSpPr>
+          <p:cNvPr id="6184" name="Line 43"/>
+          <p:cNvSpPr>
+            <a:spLocks noChangeShapeType="1"/>
+          </p:cNvSpPr>
+          <p:nvPr/>
+        </p:nvSpPr>
+        <p:spPr bwMode="auto">
+          <a:xfrm>
+            <a:off x="1981200" y="1933575"/>
+            <a:ext cx="0" cy="304800"/>
+          </a:xfrm>
+          <a:prstGeom prst="line">
+            <a:avLst/>
+          </a:prstGeom>
+          <a:noFill/>
+          <a:ln w="9525">
+            <a:solidFill>
+              <a:schemeClr val="tx1"/>
+            </a:solidFill>
+            <a:round/>
+            <a:headEnd/>
+            <a:tailEnd type="triangle" w="med" len="med"/>
+          </a:ln>
+        </p:spPr>
+        <p:txBody>
+          <a:bodyPr/>
+          <a:lstStyle/>
+          <a:p>
+            <a:endParaRPr lang="en-US"/>
+          </a:p>
+        </p:txBody>
+      </p:sp>
+      <p:sp>
+        <p:nvSpPr>
+          <p:cNvPr id="157740" name="Document"/>
+          <p:cNvSpPr>
+            <a:spLocks noEditPoints="1" noChangeArrowheads="1"/>
+          </p:cNvSpPr>
+          <p:nvPr/>
+        </p:nvSpPr>
+        <p:spPr bwMode="auto">
+          <a:xfrm>
+            <a:off x="1828800" y="5715000"/>
+            <a:ext cx="981075" cy="904875"/>
+          </a:xfrm>
+          <a:custGeom>
+            <a:avLst/>
+            <a:gdLst>
+              <a:gd name="T0" fmla="*/ 10757 w 21600"/>
+              <a:gd name="T1" fmla="*/ 21632 h 21600"/>
+              <a:gd name="T2" fmla="*/ 85 w 21600"/>
+              <a:gd name="T3" fmla="*/ 10849 h 21600"/>
+              <a:gd name="T4" fmla="*/ 10757 w 21600"/>
+              <a:gd name="T5" fmla="*/ 81 h 21600"/>
+              <a:gd name="T6" fmla="*/ 21706 w 21600"/>
+              <a:gd name="T7" fmla="*/ 10652 h 21600"/>
+              <a:gd name="T8" fmla="*/ 10757 w 21600"/>
+              <a:gd name="T9" fmla="*/ 21632 h 21600"/>
+              <a:gd name="T10" fmla="*/ 0 w 21600"/>
+              <a:gd name="T11" fmla="*/ 0 h 21600"/>
+              <a:gd name="T12" fmla="*/ 21600 w 21600"/>
+              <a:gd name="T13" fmla="*/ 0 h 21600"/>
+              <a:gd name="T14" fmla="*/ 21600 w 21600"/>
+              <a:gd name="T15" fmla="*/ 21600 h 21600"/>
+              <a:gd name="T16" fmla="*/ 977 w 21600"/>
+              <a:gd name="T17" fmla="*/ 818 h 21600"/>
+              <a:gd name="T18" fmla="*/ 20622 w 21600"/>
+              <a:gd name="T19" fmla="*/ 16429 h 21600"/>
+            </a:gdLst>
+            <a:ahLst/>
+            <a:cxnLst>
+              <a:cxn ang="0">
+                <a:pos x="T0" y="T1"/>
+              </a:cxn>
+              <a:cxn ang="0">
+                <a:pos x="T2" y="T3"/>
+              </a:cxn>
+              <a:cxn ang="0">
+                <a:pos x="T4" y="T5"/>
+              </a:cxn>
+              <a:cxn ang="0">
+                <a:pos x="T6" y="T7"/>
+              </a:cxn>
+              <a:cxn ang="0">
+                <a:pos x="T8" y="T9"/>
+              </a:cxn>
+              <a:cxn ang="0">
+                <a:pos x="T10" y="T11"/>
+              </a:cxn>
+              <a:cxn ang="0">
+                <a:pos x="T12" y="T13"/>
+              </a:cxn>
+              <a:cxn ang="0">
+                <a:pos x="T14" y="T15"/>
+              </a:cxn>
+            </a:cxnLst>
+            <a:rect l="T16" t="T17" r="T18" b="T19"/>
+            <a:pathLst>
+              <a:path w="21600" h="21600">
+                <a:moveTo>
+                  <a:pt x="10757" y="21632"/>
+                </a:moveTo>
+                <a:lnTo>
+                  <a:pt x="5187" y="21632"/>
+                </a:lnTo>
+                <a:lnTo>
+                  <a:pt x="85" y="17509"/>
+                </a:lnTo>
+                <a:lnTo>
+                  <a:pt x="85" y="10849"/>
+                </a:lnTo>
+                <a:lnTo>
+                  <a:pt x="85" y="81"/>
+                </a:lnTo>
+                <a:lnTo>
+                  <a:pt x="10757" y="81"/>
+                </a:lnTo>
+                <a:lnTo>
+                  <a:pt x="21706" y="81"/>
+                </a:lnTo>
+                <a:lnTo>
+                  <a:pt x="21706" y="10652"/>
+                </a:lnTo>
+                <a:lnTo>
+                  <a:pt x="21706" y="21632"/>
+                </a:lnTo>
+                <a:lnTo>
+                  <a:pt x="10757" y="21632"/>
+                </a:lnTo>
+                <a:close/>
+              </a:path>
+              <a:path w="21600" h="21600">
+                <a:moveTo>
+                  <a:pt x="85" y="17509"/>
+                </a:moveTo>
+                <a:lnTo>
+                  <a:pt x="5187" y="17509"/>
+                </a:lnTo>
+                <a:lnTo>
+                  <a:pt x="5187" y="21632"/>
+                </a:lnTo>
+                <a:lnTo>
+                  <a:pt x="85" y="17509"/>
+                </a:lnTo>
+                <a:close/>
+              </a:path>
+            </a:pathLst>
+          </a:custGeom>
+          <a:solidFill>
+            <a:srgbClr val="D8EBB3"/>
+          </a:solidFill>
+          <a:ln w="9525">
+            <a:solidFill>
+              <a:srgbClr val="000000"/>
+            </a:solidFill>
+            <a:miter lim="800000"/>
+            <a:headEnd/>
+            <a:tailEnd/>
+          </a:ln>
+          <a:effectLst>
+            <a:outerShdw dist="107763" dir="2700000" algn="ctr" rotWithShape="0">
+              <a:srgbClr val="808080"/>
+            </a:outerShdw>
+          </a:effectLst>
+        </p:spPr>
+        <p:txBody>
+          <a:bodyPr/>
+          <a:lstStyle/>
+          <a:p>
+            <a:pPr fontAlgn="auto">
+              <a:spcBef>
+                <a:spcPts val="0"/>
+              </a:spcBef>
+              <a:spcAft>
+                <a:spcPts val="0"/>
+              </a:spcAft>
+              <a:defRPr/>
+            </a:pPr>
+            <a:r>
+              <a:rPr lang="en-US">
+                <a:latin typeface="+mn-lt"/>
+                <a:cs typeface="+mn-cs"/>
+              </a:rPr>
               <a:t>NcML</a:t>
             </a:r>
-            <a:r>
-              <a:rPr lang="en-US" dirty="0" smtClean="0"/>
-              <a:t> aggregation works and is stable code</a:t>
-            </a:r>
-          </a:p>
-          <a:p>
-            <a:pPr lvl="1"/>
-            <a:r>
-              <a:rPr lang="en-US" dirty="0" smtClean="0"/>
-              <a:t>Must know how your collection of files varies</a:t>
-            </a:r>
-          </a:p>
-          <a:p>
-            <a:pPr lvl="1"/>
-            <a:r>
-              <a:rPr lang="en-US" dirty="0" smtClean="0"/>
-              <a:t>Use it for simple cases</a:t>
-            </a:r>
-          </a:p>
-          <a:p>
-            <a:r>
-              <a:rPr lang="en-US" dirty="0" smtClean="0"/>
-              <a:t>Feature Collections are still work in progress</a:t>
-            </a:r>
-          </a:p>
-          <a:p>
-            <a:pPr lvl="1"/>
-            <a:r>
-              <a:rPr lang="en-US" dirty="0" smtClean="0"/>
-              <a:t>Much easier to work with</a:t>
-            </a:r>
-          </a:p>
-          <a:p>
-            <a:pPr lvl="1"/>
-            <a:r>
-              <a:rPr lang="en-US" dirty="0" smtClean="0"/>
-              <a:t>All future development is here</a:t>
-            </a:r>
-          </a:p>
-          <a:p>
-            <a:pPr lvl="1"/>
-            <a:r>
-              <a:rPr lang="en-US" dirty="0" smtClean="0"/>
-              <a:t>You have our attention</a:t>
-            </a:r>
-          </a:p>
-          <a:p>
-            <a:pPr lvl="1"/>
-            <a:r>
-              <a:rPr lang="en-US" dirty="0" smtClean="0"/>
-              <a:t>Details </a:t>
-            </a:r>
-            <a:r>
-              <a:rPr lang="en-US" smtClean="0"/>
-              <a:t>tommorrow</a:t>
-            </a:r>
-            <a:endParaRPr lang="en-US" dirty="0" smtClean="0"/>
-          </a:p>
-          <a:p>
-            <a:r>
-              <a:rPr lang="en-US" dirty="0" smtClean="0"/>
-              <a:t>If you have GRIB files</a:t>
-            </a:r>
-          </a:p>
-          <a:p>
-            <a:pPr lvl="1"/>
-            <a:r>
-              <a:rPr lang="en-US" dirty="0" smtClean="0"/>
-              <a:t>You want to use GRIB feature collections (4.3)</a:t>
-            </a:r>
-          </a:p>
-          <a:p>
-            <a:endParaRPr lang="en-US" dirty="0"/>
+          </a:p>
+        </p:txBody>
+      </p:sp>
+      <p:sp>
+        <p:nvSpPr>
+          <p:cNvPr id="6186" name="Line 45"/>
+          <p:cNvSpPr>
+            <a:spLocks noChangeShapeType="1"/>
+          </p:cNvSpPr>
+          <p:nvPr/>
+        </p:nvSpPr>
+        <p:spPr bwMode="auto">
+          <a:xfrm flipH="1">
+            <a:off x="2438400" y="2619375"/>
+            <a:ext cx="0" cy="3095625"/>
+          </a:xfrm>
+          <a:prstGeom prst="line">
+            <a:avLst/>
+          </a:prstGeom>
+          <a:noFill/>
+          <a:ln w="9525">
+            <a:solidFill>
+              <a:schemeClr val="tx1"/>
+            </a:solidFill>
+            <a:round/>
+            <a:headEnd/>
+            <a:tailEnd type="triangle" w="med" len="med"/>
+          </a:ln>
+        </p:spPr>
+        <p:txBody>
+          <a:bodyPr/>
+          <a:lstStyle/>
+          <a:p>
+            <a:endParaRPr lang="en-US"/>
           </a:p>
         </p:txBody>
       </p:sp>
@@ -3938,10 +5715,169 @@
   <p:clrMapOvr>
     <a:masterClrMapping/>
   </p:clrMapOvr>
+  <p:timing>
+    <p:tnLst>
+      <p:par>
+        <p:cTn id="1" dur="indefinite" restart="never" nodeType="tmRoot"/>
+      </p:par>
+    </p:tnLst>
+  </p:timing>
 </p:sld>
 </file>
 
 <file path=ppt/slides/slide7.xml><?xml version="1.0" encoding="utf-8"?>
+<p:sld xmlns:a="http://schemas.openxmlformats.org/drawingml/2006/main" xmlns:r="http://schemas.openxmlformats.org/officeDocument/2006/relationships" xmlns:p="http://schemas.openxmlformats.org/presentationml/2006/main">
+  <p:cSld>
+    <p:spTree>
+      <p:nvGrpSpPr>
+        <p:cNvPr id="1" name=""/>
+        <p:cNvGrpSpPr/>
+        <p:nvPr/>
+      </p:nvGrpSpPr>
+      <p:grpSpPr>
+        <a:xfrm>
+          <a:off x="0" y="0"/>
+          <a:ext cx="0" cy="0"/>
+          <a:chOff x="0" y="0"/>
+          <a:chExt cx="0" cy="0"/>
+        </a:xfrm>
+      </p:grpSpPr>
+      <p:sp>
+        <p:nvSpPr>
+          <p:cNvPr id="2" name="Title 1"/>
+          <p:cNvSpPr>
+            <a:spLocks noGrp="1"/>
+          </p:cNvSpPr>
+          <p:nvPr>
+            <p:ph type="title"/>
+          </p:nvPr>
+        </p:nvSpPr>
+        <p:spPr/>
+        <p:txBody>
+          <a:bodyPr/>
+          <a:lstStyle/>
+          <a:p>
+            <a:r>
+              <a:rPr lang="en-US" dirty="0" smtClean="0"/>
+              <a:t>What do you need to know?</a:t>
+            </a:r>
+            <a:endParaRPr lang="en-US" dirty="0"/>
+          </a:p>
+        </p:txBody>
+      </p:sp>
+      <p:sp>
+        <p:nvSpPr>
+          <p:cNvPr id="3" name="Content Placeholder 2"/>
+          <p:cNvSpPr>
+            <a:spLocks noGrp="1"/>
+          </p:cNvSpPr>
+          <p:nvPr>
+            <p:ph idx="1"/>
+          </p:nvPr>
+        </p:nvSpPr>
+        <p:spPr/>
+        <p:txBody>
+          <a:bodyPr>
+            <a:normAutofit fontScale="92500" lnSpcReduction="20000"/>
+          </a:bodyPr>
+          <a:lstStyle/>
+          <a:p>
+            <a:r>
+              <a:rPr lang="en-US" dirty="0" err="1" smtClean="0"/>
+              <a:t>NcML</a:t>
+            </a:r>
+            <a:r>
+              <a:rPr lang="en-US" dirty="0" smtClean="0"/>
+              <a:t> aggregation works and is stable code</a:t>
+            </a:r>
+          </a:p>
+          <a:p>
+            <a:pPr lvl="1"/>
+            <a:r>
+              <a:rPr lang="en-US" dirty="0" smtClean="0"/>
+              <a:t>Must know how your collection of files varies</a:t>
+            </a:r>
+          </a:p>
+          <a:p>
+            <a:pPr lvl="1"/>
+            <a:r>
+              <a:rPr lang="en-US" dirty="0" smtClean="0"/>
+              <a:t>Use it for simple cases</a:t>
+            </a:r>
+          </a:p>
+          <a:p>
+            <a:r>
+              <a:rPr lang="en-US" dirty="0" smtClean="0"/>
+              <a:t>Feature Collections are still work in progress</a:t>
+            </a:r>
+          </a:p>
+          <a:p>
+            <a:pPr lvl="1"/>
+            <a:r>
+              <a:rPr lang="en-US" dirty="0" smtClean="0"/>
+              <a:t>Much easier to work with</a:t>
+            </a:r>
+          </a:p>
+          <a:p>
+            <a:pPr lvl="1"/>
+            <a:r>
+              <a:rPr lang="en-US" dirty="0" smtClean="0"/>
+              <a:t>All future development is here</a:t>
+            </a:r>
+          </a:p>
+          <a:p>
+            <a:pPr lvl="1"/>
+            <a:r>
+              <a:rPr lang="en-US" dirty="0" smtClean="0"/>
+              <a:t>You have our attention</a:t>
+            </a:r>
+          </a:p>
+          <a:p>
+            <a:pPr lvl="1"/>
+            <a:r>
+              <a:rPr lang="en-US" dirty="0" smtClean="0"/>
+              <a:t>Details </a:t>
+            </a:r>
+            <a:r>
+              <a:rPr lang="en-US" smtClean="0"/>
+              <a:t>tommorrow</a:t>
+            </a:r>
+            <a:endParaRPr lang="en-US" dirty="0" smtClean="0"/>
+          </a:p>
+          <a:p>
+            <a:r>
+              <a:rPr lang="en-US" dirty="0" smtClean="0"/>
+              <a:t>If you have GRIB files</a:t>
+            </a:r>
+          </a:p>
+          <a:p>
+            <a:pPr lvl="1"/>
+            <a:r>
+              <a:rPr lang="en-US" dirty="0" smtClean="0"/>
+              <a:t>You want to use GRIB feature collections (4.3)</a:t>
+            </a:r>
+          </a:p>
+          <a:p>
+            <a:endParaRPr lang="en-US" dirty="0"/>
+          </a:p>
+        </p:txBody>
+      </p:sp>
+    </p:spTree>
+  </p:cSld>
+  <p:clrMapOvr>
+    <a:masterClrMapping/>
+  </p:clrMapOvr>
+  <p:timing>
+    <p:tnLst>
+      <p:par>
+        <p:cTn id="1" dur="indefinite" restart="never" nodeType="tmRoot"/>
+      </p:par>
+    </p:tnLst>
+  </p:timing>
+</p:sld>
+</file>
+
+<file path=ppt/slides/slide8.xml><?xml version="1.0" encoding="utf-8"?>
 <p:sld xmlns:a="http://schemas.openxmlformats.org/drawingml/2006/main" xmlns:r="http://schemas.openxmlformats.org/officeDocument/2006/relationships" xmlns:p="http://schemas.openxmlformats.org/presentationml/2006/main">
   <p:cSld>
     <p:spTree>
@@ -3991,13 +5927,19 @@
             <p:ph type="title"/>
           </p:nvPr>
         </p:nvSpPr>
-        <p:spPr/>
-        <p:txBody>
-          <a:bodyPr/>
-          <a:lstStyle/>
-          <a:p>
-            <a:r>
-              <a:rPr lang="en-US" smtClean="0"/>
+        <p:spPr>
+          <a:ln>
+            <a:solidFill>
+              <a:schemeClr val="bg2"/>
+            </a:solidFill>
+          </a:ln>
+        </p:spPr>
+        <p:txBody>
+          <a:bodyPr/>
+          <a:lstStyle/>
+          <a:p>
+            <a:r>
+              <a:rPr lang="en-US" dirty="0" smtClean="0"/>
               <a:t>Good Luck!</a:t>
             </a:r>
             <a:endParaRPr lang="en-US" dirty="0"/>
@@ -4009,6 +5951,13 @@
   <p:clrMapOvr>
     <a:masterClrMapping/>
   </p:clrMapOvr>
+  <p:timing>
+    <p:tnLst>
+      <p:par>
+        <p:cTn id="1" dur="indefinite" restart="never" nodeType="tmRoot"/>
+      </p:par>
+    </p:tnLst>
+  </p:timing>
 </p:sld>
 </file>
 

</xml_diff>

<commit_message>
updated NcMLvsFeatureCollections and Overview ppts
</commit_message>
<xml_diff>
--- a/docs/web/thredds/tech/tds4.3/tutorial/NcMLvsFeatureCollections.pptx
+++ b/docs/web/thredds/tech/tds4.3/tutorial/NcMLvsFeatureCollections.pptx
@@ -296,7 +296,7 @@
             <a:fld id="{8DF66C97-51D1-4C46-A462-47E7CAC852FA}" type="datetimeFigureOut">
               <a:rPr lang="en-US" smtClean="0"/>
               <a:pPr/>
-              <a:t>10/18/2012</a:t>
+              <a:t>7/23/13</a:t>
             </a:fld>
             <a:endParaRPr lang="en-US"/>
           </a:p>
@@ -463,7 +463,7 @@
             <a:fld id="{8DF66C97-51D1-4C46-A462-47E7CAC852FA}" type="datetimeFigureOut">
               <a:rPr lang="en-US" smtClean="0"/>
               <a:pPr/>
-              <a:t>10/18/2012</a:t>
+              <a:t>7/23/13</a:t>
             </a:fld>
             <a:endParaRPr lang="en-US"/>
           </a:p>
@@ -640,7 +640,7 @@
             <a:fld id="{8DF66C97-51D1-4C46-A462-47E7CAC852FA}" type="datetimeFigureOut">
               <a:rPr lang="en-US" smtClean="0"/>
               <a:pPr/>
-              <a:t>10/18/2012</a:t>
+              <a:t>7/23/13</a:t>
             </a:fld>
             <a:endParaRPr lang="en-US"/>
           </a:p>
@@ -807,7 +807,7 @@
             <a:fld id="{8DF66C97-51D1-4C46-A462-47E7CAC852FA}" type="datetimeFigureOut">
               <a:rPr lang="en-US" smtClean="0"/>
               <a:pPr/>
-              <a:t>10/18/2012</a:t>
+              <a:t>7/23/13</a:t>
             </a:fld>
             <a:endParaRPr lang="en-US"/>
           </a:p>
@@ -1050,7 +1050,7 @@
             <a:fld id="{8DF66C97-51D1-4C46-A462-47E7CAC852FA}" type="datetimeFigureOut">
               <a:rPr lang="en-US" smtClean="0"/>
               <a:pPr/>
-              <a:t>10/18/2012</a:t>
+              <a:t>7/23/13</a:t>
             </a:fld>
             <a:endParaRPr lang="en-US"/>
           </a:p>
@@ -1335,7 +1335,7 @@
             <a:fld id="{8DF66C97-51D1-4C46-A462-47E7CAC852FA}" type="datetimeFigureOut">
               <a:rPr lang="en-US" smtClean="0"/>
               <a:pPr/>
-              <a:t>10/18/2012</a:t>
+              <a:t>7/23/13</a:t>
             </a:fld>
             <a:endParaRPr lang="en-US"/>
           </a:p>
@@ -1754,7 +1754,7 @@
             <a:fld id="{8DF66C97-51D1-4C46-A462-47E7CAC852FA}" type="datetimeFigureOut">
               <a:rPr lang="en-US" smtClean="0"/>
               <a:pPr/>
-              <a:t>10/18/2012</a:t>
+              <a:t>7/23/13</a:t>
             </a:fld>
             <a:endParaRPr lang="en-US"/>
           </a:p>
@@ -1869,7 +1869,7 @@
             <a:fld id="{8DF66C97-51D1-4C46-A462-47E7CAC852FA}" type="datetimeFigureOut">
               <a:rPr lang="en-US" smtClean="0"/>
               <a:pPr/>
-              <a:t>10/18/2012</a:t>
+              <a:t>7/23/13</a:t>
             </a:fld>
             <a:endParaRPr lang="en-US"/>
           </a:p>
@@ -1961,7 +1961,7 @@
             <a:fld id="{8DF66C97-51D1-4C46-A462-47E7CAC852FA}" type="datetimeFigureOut">
               <a:rPr lang="en-US" smtClean="0"/>
               <a:pPr/>
-              <a:t>10/18/2012</a:t>
+              <a:t>7/23/13</a:t>
             </a:fld>
             <a:endParaRPr lang="en-US"/>
           </a:p>
@@ -2235,7 +2235,7 @@
             <a:fld id="{8DF66C97-51D1-4C46-A462-47E7CAC852FA}" type="datetimeFigureOut">
               <a:rPr lang="en-US" smtClean="0"/>
               <a:pPr/>
-              <a:t>10/18/2012</a:t>
+              <a:t>7/23/13</a:t>
             </a:fld>
             <a:endParaRPr lang="en-US"/>
           </a:p>
@@ -2485,7 +2485,7 @@
             <a:fld id="{8DF66C97-51D1-4C46-A462-47E7CAC852FA}" type="datetimeFigureOut">
               <a:rPr lang="en-US" smtClean="0"/>
               <a:pPr/>
-              <a:t>10/18/2012</a:t>
+              <a:t>7/23/13</a:t>
             </a:fld>
             <a:endParaRPr lang="en-US"/>
           </a:p>
@@ -2695,7 +2695,7 @@
             <a:fld id="{8DF66C97-51D1-4C46-A462-47E7CAC852FA}" type="datetimeFigureOut">
               <a:rPr lang="en-US" smtClean="0"/>
               <a:pPr/>
-              <a:t>10/18/2012</a:t>
+              <a:t>7/23/13</a:t>
             </a:fld>
             <a:endParaRPr lang="en-US"/>
           </a:p>
@@ -3108,25 +3108,6 @@
           </a:p>
         </p:txBody>
       </p:sp>
-      <p:sp>
-        <p:nvSpPr>
-          <p:cNvPr id="3" name="Subtitle 2"/>
-          <p:cNvSpPr>
-            <a:spLocks noGrp="1"/>
-          </p:cNvSpPr>
-          <p:nvPr>
-            <p:ph type="subTitle" idx="1"/>
-          </p:nvPr>
-        </p:nvSpPr>
-        <p:spPr/>
-        <p:txBody>
-          <a:bodyPr/>
-          <a:lstStyle/>
-          <a:p>
-            <a:endParaRPr lang="en-US"/>
-          </a:p>
-        </p:txBody>
-      </p:sp>
     </p:spTree>
   </p:cSld>
   <p:clrMapOvr>
@@ -3135,7 +3116,7 @@
   <p:timing>
     <p:tnLst>
       <p:par>
-        <p:cTn id="1" dur="indefinite" restart="never" nodeType="tmRoot"/>
+        <p:cTn xmlns:p14="http://schemas.microsoft.com/office/powerpoint/2010/main" id="1" dur="indefinite" restart="never" nodeType="tmRoot"/>
       </p:par>
     </p:tnLst>
   </p:timing>
@@ -3209,13 +3190,8 @@
             </a:pPr>
             <a:r>
               <a:rPr lang="en-US" dirty="0" smtClean="0"/>
-              <a:t>Modify the </a:t>
-            </a:r>
-            <a:r>
-              <a:rPr lang="en-US" dirty="0" smtClean="0"/>
-              <a:t>objects found in CDM files</a:t>
-            </a:r>
-            <a:endParaRPr lang="en-US" dirty="0" smtClean="0"/>
+              <a:t>Modify the objects found in CDM files</a:t>
+            </a:r>
           </a:p>
           <a:p>
             <a:pPr lvl="1"/>
@@ -3290,11 +3266,7 @@
             <a:pPr lvl="1"/>
             <a:r>
               <a:rPr lang="en-US" dirty="0" smtClean="0"/>
-              <a:t>Creating logical datasets out of file </a:t>
-            </a:r>
-            <a:r>
-              <a:rPr lang="en-US" dirty="0" smtClean="0"/>
-              <a:t>collections</a:t>
+              <a:t>Creating logical datasets out of file collections</a:t>
             </a:r>
           </a:p>
         </p:txBody>
@@ -3307,7 +3279,7 @@
   <p:timing>
     <p:tnLst>
       <p:par>
-        <p:cTn id="1" dur="indefinite" restart="never" nodeType="tmRoot"/>
+        <p:cTn xmlns:p14="http://schemas.microsoft.com/office/powerpoint/2010/main" id="1" dur="indefinite" restart="never" nodeType="tmRoot"/>
       </p:par>
     </p:tnLst>
   </p:timing>
@@ -3475,7 +3447,7 @@
   <p:timing>
     <p:tnLst>
       <p:par>
-        <p:cTn id="1" dur="indefinite" restart="never" nodeType="tmRoot"/>
+        <p:cTn xmlns:p14="http://schemas.microsoft.com/office/powerpoint/2010/main" id="1" dur="indefinite" restart="never" nodeType="tmRoot"/>
       </p:par>
     </p:tnLst>
   </p:timing>
@@ -3604,13 +3576,8 @@
             <a:pPr lvl="1"/>
             <a:r>
               <a:rPr lang="en-US" dirty="0" smtClean="0"/>
-              <a:t>Inefficient for large </a:t>
-            </a:r>
-            <a:r>
-              <a:rPr lang="en-US" dirty="0" smtClean="0"/>
-              <a:t>collections</a:t>
-            </a:r>
-            <a:endParaRPr lang="en-US" dirty="0" smtClean="0"/>
+              <a:t>Inefficient for large collections</a:t>
+            </a:r>
           </a:p>
           <a:p>
             <a:pPr lvl="1"/>
@@ -3637,7 +3604,7 @@
   <p:timing>
     <p:tnLst>
       <p:par>
-        <p:cTn id="1" dur="indefinite" restart="never" nodeType="tmRoot"/>
+        <p:cTn xmlns:p14="http://schemas.microsoft.com/office/powerpoint/2010/main" id="1" dur="indefinite" restart="never" nodeType="tmRoot"/>
       </p:par>
     </p:tnLst>
   </p:timing>
@@ -3771,11 +3738,7 @@
             </a:r>
             <a:r>
               <a:rPr lang="en-US" dirty="0" smtClean="0"/>
-              <a:t> </a:t>
-            </a:r>
-            <a:r>
-              <a:rPr lang="en-US" dirty="0" smtClean="0"/>
-              <a:t>in the files</a:t>
+              <a:t> in the files</a:t>
             </a:r>
           </a:p>
           <a:p>
@@ -3836,7 +3799,7 @@
   <p:timing>
     <p:tnLst>
       <p:par>
-        <p:cTn id="1" dur="indefinite" restart="never" nodeType="tmRoot"/>
+        <p:cTn xmlns:p14="http://schemas.microsoft.com/office/powerpoint/2010/main" id="1" dur="indefinite" restart="never" nodeType="tmRoot"/>
       </p:par>
     </p:tnLst>
   </p:timing>
@@ -3860,9 +3823,46 @@
           <a:chExt cx="0" cy="0"/>
         </a:xfrm>
       </p:grpSpPr>
-      <p:sp>
-        <p:nvSpPr>
-          <p:cNvPr id="6146" name="Text Box 2"/>
+      <p:cxnSp>
+        <p:nvCxnSpPr>
+          <p:cNvPr id="46" name="AutoShape 33"/>
+          <p:cNvCxnSpPr>
+            <a:cxnSpLocks noChangeShapeType="1"/>
+          </p:cNvCxnSpPr>
+          <p:nvPr/>
+        </p:nvCxnSpPr>
+        <p:spPr bwMode="auto">
+          <a:xfrm rot="5400000">
+            <a:off x="7181056" y="6619082"/>
+            <a:ext cx="338137" cy="0"/>
+          </a:xfrm>
+          <a:prstGeom prst="bentConnector3">
+            <a:avLst>
+              <a:gd name="adj1" fmla="val 50000"/>
+            </a:avLst>
+          </a:prstGeom>
+          <a:noFill/>
+          <a:ln w="9525">
+            <a:solidFill>
+              <a:schemeClr val="tx1"/>
+            </a:solidFill>
+            <a:prstDash val="dash"/>
+            <a:miter lim="800000"/>
+            <a:headEnd/>
+            <a:tailEnd type="triangle" w="med" len="med"/>
+          </a:ln>
+          <a:extLst>
+            <a:ext uri="{909E8E84-426E-40dd-AFC4-6F175D3DCCD1}">
+              <a14:hiddenFill xmlns:a14="http://schemas.microsoft.com/office/drawing/2010/main">
+                <a:noFill/>
+              </a14:hiddenFill>
+            </a:ext>
+          </a:extLst>
+        </p:spPr>
+      </p:cxnSp>
+      <p:sp>
+        <p:nvSpPr>
+          <p:cNvPr id="47" name="Text Box 2"/>
           <p:cNvSpPr txBox="1">
             <a:spLocks noChangeArrowheads="1"/>
           </p:cNvSpPr>
@@ -3877,7 +3877,7 @@
             <a:avLst/>
           </a:prstGeom>
           <a:solidFill>
-            <a:srgbClr val="FFFF99"/>
+            <a:srgbClr val="FFFF00"/>
           </a:solidFill>
           <a:ln w="9525">
             <a:solidFill>
@@ -3887,21 +3887,144 @@
             <a:headEnd/>
             <a:tailEnd/>
           </a:ln>
+          <a:scene3d>
+            <a:camera prst="orthographicFront"/>
+            <a:lightRig rig="threePt" dir="t"/>
+          </a:scene3d>
+          <a:sp3d>
+            <a:bevelT w="114300" prst="hardEdge"/>
+          </a:sp3d>
         </p:spPr>
         <p:txBody>
           <a:bodyPr>
             <a:spAutoFit/>
           </a:bodyPr>
-          <a:lstStyle/>
-          <a:p>
-            <a:pPr algn="ctr">
+          <a:lstStyle>
+            <a:lvl1pPr eaLnBrk="0" hangingPunct="0">
+              <a:defRPr>
+                <a:solidFill>
+                  <a:schemeClr val="tx1"/>
+                </a:solidFill>
+                <a:latin typeface="Arial" charset="0"/>
+                <a:ea typeface="ＭＳ Ｐゴシック" charset="0"/>
+                <a:cs typeface="Arial" charset="0"/>
+              </a:defRPr>
+            </a:lvl1pPr>
+            <a:lvl2pPr marL="742950" indent="-285750" eaLnBrk="0" hangingPunct="0">
+              <a:defRPr>
+                <a:solidFill>
+                  <a:schemeClr val="tx1"/>
+                </a:solidFill>
+                <a:latin typeface="Arial" charset="0"/>
+                <a:ea typeface="Arial" charset="0"/>
+                <a:cs typeface="Arial" charset="0"/>
+              </a:defRPr>
+            </a:lvl2pPr>
+            <a:lvl3pPr marL="1143000" indent="-228600" eaLnBrk="0" hangingPunct="0">
+              <a:defRPr>
+                <a:solidFill>
+                  <a:schemeClr val="tx1"/>
+                </a:solidFill>
+                <a:latin typeface="Arial" charset="0"/>
+                <a:ea typeface="Arial" charset="0"/>
+                <a:cs typeface="Arial" charset="0"/>
+              </a:defRPr>
+            </a:lvl3pPr>
+            <a:lvl4pPr marL="1600200" indent="-228600" eaLnBrk="0" hangingPunct="0">
+              <a:defRPr>
+                <a:solidFill>
+                  <a:schemeClr val="tx1"/>
+                </a:solidFill>
+                <a:latin typeface="Arial" charset="0"/>
+                <a:ea typeface="Arial" charset="0"/>
+                <a:cs typeface="Arial" charset="0"/>
+              </a:defRPr>
+            </a:lvl4pPr>
+            <a:lvl5pPr marL="2057400" indent="-228600" eaLnBrk="0" hangingPunct="0">
+              <a:defRPr>
+                <a:solidFill>
+                  <a:schemeClr val="tx1"/>
+                </a:solidFill>
+                <a:latin typeface="Arial" charset="0"/>
+                <a:ea typeface="Arial" charset="0"/>
+                <a:cs typeface="Arial" charset="0"/>
+              </a:defRPr>
+            </a:lvl5pPr>
+            <a:lvl6pPr marL="2514600" indent="-228600" eaLnBrk="0" fontAlgn="base" hangingPunct="0">
+              <a:spcBef>
+                <a:spcPct val="0"/>
+              </a:spcBef>
+              <a:spcAft>
+                <a:spcPct val="0"/>
+              </a:spcAft>
+              <a:defRPr>
+                <a:solidFill>
+                  <a:schemeClr val="tx1"/>
+                </a:solidFill>
+                <a:latin typeface="Arial" charset="0"/>
+                <a:ea typeface="Arial" charset="0"/>
+                <a:cs typeface="Arial" charset="0"/>
+              </a:defRPr>
+            </a:lvl6pPr>
+            <a:lvl7pPr marL="2971800" indent="-228600" eaLnBrk="0" fontAlgn="base" hangingPunct="0">
+              <a:spcBef>
+                <a:spcPct val="0"/>
+              </a:spcBef>
+              <a:spcAft>
+                <a:spcPct val="0"/>
+              </a:spcAft>
+              <a:defRPr>
+                <a:solidFill>
+                  <a:schemeClr val="tx1"/>
+                </a:solidFill>
+                <a:latin typeface="Arial" charset="0"/>
+                <a:ea typeface="Arial" charset="0"/>
+                <a:cs typeface="Arial" charset="0"/>
+              </a:defRPr>
+            </a:lvl7pPr>
+            <a:lvl8pPr marL="3429000" indent="-228600" eaLnBrk="0" fontAlgn="base" hangingPunct="0">
+              <a:spcBef>
+                <a:spcPct val="0"/>
+              </a:spcBef>
+              <a:spcAft>
+                <a:spcPct val="0"/>
+              </a:spcAft>
+              <a:defRPr>
+                <a:solidFill>
+                  <a:schemeClr val="tx1"/>
+                </a:solidFill>
+                <a:latin typeface="Arial" charset="0"/>
+                <a:ea typeface="Arial" charset="0"/>
+                <a:cs typeface="Arial" charset="0"/>
+              </a:defRPr>
+            </a:lvl8pPr>
+            <a:lvl9pPr marL="3886200" indent="-228600" eaLnBrk="0" fontAlgn="base" hangingPunct="0">
+              <a:spcBef>
+                <a:spcPct val="0"/>
+              </a:spcBef>
+              <a:spcAft>
+                <a:spcPct val="0"/>
+              </a:spcAft>
+              <a:defRPr>
+                <a:solidFill>
+                  <a:schemeClr val="tx1"/>
+                </a:solidFill>
+                <a:latin typeface="Arial" charset="0"/>
+                <a:ea typeface="Arial" charset="0"/>
+                <a:cs typeface="Arial" charset="0"/>
+              </a:defRPr>
+            </a:lvl9pPr>
+          </a:lstStyle>
+          <a:p>
+            <a:pPr algn="ctr" eaLnBrk="1" hangingPunct="1">
               <a:spcBef>
                 <a:spcPct val="50000"/>
               </a:spcBef>
+              <a:defRPr/>
             </a:pPr>
             <a:r>
-              <a:rPr lang="en-US">
-                <a:latin typeface="Calibri" pitchFamily="34" charset="0"/>
+              <a:rPr lang="en-US" smtClean="0">
+                <a:latin typeface="Calibri" charset="0"/>
               </a:rPr>
               <a:t>NetcdfDataset</a:t>
             </a:r>
@@ -3910,7 +4033,7 @@
       </p:sp>
       <p:sp>
         <p:nvSpPr>
-          <p:cNvPr id="6147" name="Oval 3"/>
+          <p:cNvPr id="48" name="Oval 3"/>
           <p:cNvSpPr>
             <a:spLocks noChangeArrowheads="1"/>
           </p:cNvSpPr>
@@ -3925,7 +4048,7 @@
             <a:avLst/>
           </a:prstGeom>
           <a:solidFill>
-            <a:srgbClr val="99CC00"/>
+            <a:schemeClr val="accent6"/>
           </a:solidFill>
           <a:ln w="9525">
             <a:solidFill>
@@ -3935,15 +4058,25 @@
             <a:headEnd/>
             <a:tailEnd/>
           </a:ln>
+          <a:scene3d>
+            <a:camera prst="orthographicFront"/>
+            <a:lightRig rig="threePt" dir="t"/>
+          </a:scene3d>
+          <a:sp3d>
+            <a:bevelT w="114300" prst="artDeco"/>
+          </a:sp3d>
         </p:spPr>
         <p:txBody>
           <a:bodyPr wrap="none" anchor="ctr"/>
           <a:lstStyle/>
           <a:p>
-            <a:pPr algn="ctr"/>
+            <a:pPr algn="ctr">
+              <a:defRPr/>
+            </a:pPr>
             <a:r>
               <a:rPr lang="en-US">
-                <a:latin typeface="Calibri" pitchFamily="34" charset="0"/>
+                <a:latin typeface="Calibri" charset="0"/>
+                <a:cs typeface="Arial" charset="0"/>
               </a:rPr>
               <a:t>Application</a:t>
             </a:r>
@@ -3952,11 +4085,9 @@
       </p:sp>
       <p:cxnSp>
         <p:nvCxnSpPr>
-          <p:cNvPr id="6148" name="AutoShape 4"/>
+          <p:cNvPr id="49" name="AutoShape 4"/>
           <p:cNvCxnSpPr>
             <a:cxnSpLocks noChangeShapeType="1"/>
-            <a:stCxn id="6147" idx="2"/>
-            <a:endCxn id="6151" idx="3"/>
           </p:cNvCxnSpPr>
           <p:nvPr/>
         </p:nvCxnSpPr>
@@ -3977,15 +4108,20 @@
             <a:headEnd/>
             <a:tailEnd type="triangle" w="med" len="med"/>
           </a:ln>
+          <a:extLst>
+            <a:ext uri="{909E8E84-426E-40dd-AFC4-6F175D3DCCD1}">
+              <a14:hiddenFill xmlns:a14="http://schemas.microsoft.com/office/drawing/2010/main">
+                <a:noFill/>
+              </a14:hiddenFill>
+            </a:ext>
+          </a:extLst>
         </p:spPr>
       </p:cxnSp>
       <p:cxnSp>
         <p:nvCxnSpPr>
-          <p:cNvPr id="6149" name="AutoShape 5"/>
+          <p:cNvPr id="50" name="AutoShape 5"/>
           <p:cNvCxnSpPr>
             <a:cxnSpLocks noChangeShapeType="1"/>
-            <a:stCxn id="6147" idx="3"/>
-            <a:endCxn id="6146" idx="0"/>
           </p:cNvCxnSpPr>
           <p:nvPr/>
         </p:nvCxnSpPr>
@@ -4006,15 +4142,20 @@
             <a:headEnd/>
             <a:tailEnd type="triangle" w="med" len="med"/>
           </a:ln>
+          <a:extLst>
+            <a:ext uri="{909E8E84-426E-40dd-AFC4-6F175D3DCCD1}">
+              <a14:hiddenFill xmlns:a14="http://schemas.microsoft.com/office/drawing/2010/main">
+                <a:noFill/>
+              </a14:hiddenFill>
+            </a:ext>
+          </a:extLst>
         </p:spPr>
       </p:cxnSp>
       <p:cxnSp>
         <p:nvCxnSpPr>
-          <p:cNvPr id="6150" name="AutoShape 6"/>
+          <p:cNvPr id="51" name="AutoShape 6"/>
           <p:cNvCxnSpPr>
             <a:cxnSpLocks noChangeShapeType="1"/>
-            <a:stCxn id="6147" idx="4"/>
-            <a:endCxn id="6169" idx="0"/>
           </p:cNvCxnSpPr>
           <p:nvPr/>
         </p:nvCxnSpPr>
@@ -4035,11 +4176,18 @@
             <a:headEnd/>
             <a:tailEnd type="triangle" w="med" len="med"/>
           </a:ln>
+          <a:extLst>
+            <a:ext uri="{909E8E84-426E-40dd-AFC4-6F175D3DCCD1}">
+              <a14:hiddenFill xmlns:a14="http://schemas.microsoft.com/office/drawing/2010/main">
+                <a:noFill/>
+              </a14:hiddenFill>
+            </a:ext>
+          </a:extLst>
         </p:spPr>
       </p:cxnSp>
       <p:sp>
         <p:nvSpPr>
-          <p:cNvPr id="6151" name="Text Box 7"/>
+          <p:cNvPr id="52" name="Text Box 7"/>
           <p:cNvSpPr txBox="1">
             <a:spLocks noChangeArrowheads="1"/>
           </p:cNvSpPr>
@@ -4054,7 +4202,7 @@
             <a:avLst/>
           </a:prstGeom>
           <a:solidFill>
-            <a:srgbClr val="FFFF99"/>
+            <a:srgbClr val="FFFF00"/>
           </a:solidFill>
           <a:ln w="9525">
             <a:solidFill>
@@ -4064,21 +4212,144 @@
             <a:headEnd/>
             <a:tailEnd/>
           </a:ln>
+          <a:scene3d>
+            <a:camera prst="orthographicFront"/>
+            <a:lightRig rig="threePt" dir="t"/>
+          </a:scene3d>
+          <a:sp3d>
+            <a:bevelT w="114300" prst="hardEdge"/>
+          </a:sp3d>
         </p:spPr>
         <p:txBody>
           <a:bodyPr>
             <a:spAutoFit/>
           </a:bodyPr>
-          <a:lstStyle/>
-          <a:p>
-            <a:pPr algn="ctr">
+          <a:lstStyle>
+            <a:lvl1pPr eaLnBrk="0" hangingPunct="0">
+              <a:defRPr>
+                <a:solidFill>
+                  <a:schemeClr val="tx1"/>
+                </a:solidFill>
+                <a:latin typeface="Arial" charset="0"/>
+                <a:ea typeface="ＭＳ Ｐゴシック" charset="0"/>
+                <a:cs typeface="Arial" charset="0"/>
+              </a:defRPr>
+            </a:lvl1pPr>
+            <a:lvl2pPr marL="742950" indent="-285750" eaLnBrk="0" hangingPunct="0">
+              <a:defRPr>
+                <a:solidFill>
+                  <a:schemeClr val="tx1"/>
+                </a:solidFill>
+                <a:latin typeface="Arial" charset="0"/>
+                <a:ea typeface="Arial" charset="0"/>
+                <a:cs typeface="Arial" charset="0"/>
+              </a:defRPr>
+            </a:lvl2pPr>
+            <a:lvl3pPr marL="1143000" indent="-228600" eaLnBrk="0" hangingPunct="0">
+              <a:defRPr>
+                <a:solidFill>
+                  <a:schemeClr val="tx1"/>
+                </a:solidFill>
+                <a:latin typeface="Arial" charset="0"/>
+                <a:ea typeface="Arial" charset="0"/>
+                <a:cs typeface="Arial" charset="0"/>
+              </a:defRPr>
+            </a:lvl3pPr>
+            <a:lvl4pPr marL="1600200" indent="-228600" eaLnBrk="0" hangingPunct="0">
+              <a:defRPr>
+                <a:solidFill>
+                  <a:schemeClr val="tx1"/>
+                </a:solidFill>
+                <a:latin typeface="Arial" charset="0"/>
+                <a:ea typeface="Arial" charset="0"/>
+                <a:cs typeface="Arial" charset="0"/>
+              </a:defRPr>
+            </a:lvl4pPr>
+            <a:lvl5pPr marL="2057400" indent="-228600" eaLnBrk="0" hangingPunct="0">
+              <a:defRPr>
+                <a:solidFill>
+                  <a:schemeClr val="tx1"/>
+                </a:solidFill>
+                <a:latin typeface="Arial" charset="0"/>
+                <a:ea typeface="Arial" charset="0"/>
+                <a:cs typeface="Arial" charset="0"/>
+              </a:defRPr>
+            </a:lvl5pPr>
+            <a:lvl6pPr marL="2514600" indent="-228600" eaLnBrk="0" fontAlgn="base" hangingPunct="0">
+              <a:spcBef>
+                <a:spcPct val="0"/>
+              </a:spcBef>
+              <a:spcAft>
+                <a:spcPct val="0"/>
+              </a:spcAft>
+              <a:defRPr>
+                <a:solidFill>
+                  <a:schemeClr val="tx1"/>
+                </a:solidFill>
+                <a:latin typeface="Arial" charset="0"/>
+                <a:ea typeface="Arial" charset="0"/>
+                <a:cs typeface="Arial" charset="0"/>
+              </a:defRPr>
+            </a:lvl6pPr>
+            <a:lvl7pPr marL="2971800" indent="-228600" eaLnBrk="0" fontAlgn="base" hangingPunct="0">
+              <a:spcBef>
+                <a:spcPct val="0"/>
+              </a:spcBef>
+              <a:spcAft>
+                <a:spcPct val="0"/>
+              </a:spcAft>
+              <a:defRPr>
+                <a:solidFill>
+                  <a:schemeClr val="tx1"/>
+                </a:solidFill>
+                <a:latin typeface="Arial" charset="0"/>
+                <a:ea typeface="Arial" charset="0"/>
+                <a:cs typeface="Arial" charset="0"/>
+              </a:defRPr>
+            </a:lvl7pPr>
+            <a:lvl8pPr marL="3429000" indent="-228600" eaLnBrk="0" fontAlgn="base" hangingPunct="0">
+              <a:spcBef>
+                <a:spcPct val="0"/>
+              </a:spcBef>
+              <a:spcAft>
+                <a:spcPct val="0"/>
+              </a:spcAft>
+              <a:defRPr>
+                <a:solidFill>
+                  <a:schemeClr val="tx1"/>
+                </a:solidFill>
+                <a:latin typeface="Arial" charset="0"/>
+                <a:ea typeface="Arial" charset="0"/>
+                <a:cs typeface="Arial" charset="0"/>
+              </a:defRPr>
+            </a:lvl8pPr>
+            <a:lvl9pPr marL="3886200" indent="-228600" eaLnBrk="0" fontAlgn="base" hangingPunct="0">
+              <a:spcBef>
+                <a:spcPct val="0"/>
+              </a:spcBef>
+              <a:spcAft>
+                <a:spcPct val="0"/>
+              </a:spcAft>
+              <a:defRPr>
+                <a:solidFill>
+                  <a:schemeClr val="tx1"/>
+                </a:solidFill>
+                <a:latin typeface="Arial" charset="0"/>
+                <a:ea typeface="Arial" charset="0"/>
+                <a:cs typeface="Arial" charset="0"/>
+              </a:defRPr>
+            </a:lvl9pPr>
+          </a:lstStyle>
+          <a:p>
+            <a:pPr algn="ctr" eaLnBrk="1" hangingPunct="1">
               <a:spcBef>
                 <a:spcPct val="50000"/>
               </a:spcBef>
+              <a:defRPr/>
             </a:pPr>
             <a:r>
-              <a:rPr lang="en-US">
-                <a:latin typeface="Calibri" pitchFamily="34" charset="0"/>
+              <a:rPr lang="en-US" dirty="0" smtClean="0">
+                <a:latin typeface="Calibri" charset="0"/>
               </a:rPr>
               <a:t>Scientific Feature Types</a:t>
             </a:r>
@@ -4087,7 +4358,7 @@
       </p:sp>
       <p:sp>
         <p:nvSpPr>
-          <p:cNvPr id="6152" name="Line 8"/>
+          <p:cNvPr id="53" name="Line 8"/>
           <p:cNvSpPr>
             <a:spLocks noChangeShapeType="1"/>
           </p:cNvSpPr>
@@ -4110,6 +4381,13 @@
             <a:headEnd/>
             <a:tailEnd type="triangle" w="med" len="med"/>
           </a:ln>
+          <a:extLst>
+            <a:ext uri="{909E8E84-426E-40dd-AFC4-6F175D3DCCD1}">
+              <a14:hiddenFill xmlns:a14="http://schemas.microsoft.com/office/drawing/2010/main">
+                <a:noFill/>
+              </a14:hiddenFill>
+            </a:ext>
+          </a:extLst>
         </p:spPr>
         <p:txBody>
           <a:bodyPr/>
@@ -4121,7 +4399,7 @@
       </p:sp>
       <p:sp>
         <p:nvSpPr>
-          <p:cNvPr id="6153" name="Line 9"/>
+          <p:cNvPr id="54" name="Line 9"/>
           <p:cNvSpPr>
             <a:spLocks noChangeShapeType="1"/>
           </p:cNvSpPr>
@@ -4144,6 +4422,13 @@
             <a:headEnd/>
             <a:tailEnd type="triangle" w="med" len="med"/>
           </a:ln>
+          <a:extLst>
+            <a:ext uri="{909E8E84-426E-40dd-AFC4-6F175D3DCCD1}">
+              <a14:hiddenFill xmlns:a14="http://schemas.microsoft.com/office/drawing/2010/main">
+                <a:noFill/>
+              </a14:hiddenFill>
+            </a:ext>
+          </a:extLst>
         </p:spPr>
         <p:txBody>
           <a:bodyPr/>
@@ -4155,7 +4440,7 @@
       </p:sp>
       <p:sp>
         <p:nvSpPr>
-          <p:cNvPr id="6154" name="Line 10"/>
+          <p:cNvPr id="55" name="Line 10"/>
           <p:cNvSpPr>
             <a:spLocks noChangeShapeType="1"/>
           </p:cNvSpPr>
@@ -4178,6 +4463,13 @@
             <a:headEnd/>
             <a:tailEnd type="triangle" w="med" len="med"/>
           </a:ln>
+          <a:extLst>
+            <a:ext uri="{909E8E84-426E-40dd-AFC4-6F175D3DCCD1}">
+              <a14:hiddenFill xmlns:a14="http://schemas.microsoft.com/office/drawing/2010/main">
+                <a:noFill/>
+              </a14:hiddenFill>
+            </a:ext>
+          </a:extLst>
         </p:spPr>
         <p:txBody>
           <a:bodyPr/>
@@ -4189,7 +4481,7 @@
       </p:sp>
       <p:sp>
         <p:nvSpPr>
-          <p:cNvPr id="6155" name="Line 11"/>
+          <p:cNvPr id="56" name="Line 11"/>
           <p:cNvSpPr>
             <a:spLocks noChangeShapeType="1"/>
           </p:cNvSpPr>
@@ -4212,6 +4504,13 @@
             <a:headEnd/>
             <a:tailEnd type="triangle" w="med" len="med"/>
           </a:ln>
+          <a:extLst>
+            <a:ext uri="{909E8E84-426E-40dd-AFC4-6F175D3DCCD1}">
+              <a14:hiddenFill xmlns:a14="http://schemas.microsoft.com/office/drawing/2010/main">
+                <a:noFill/>
+              </a14:hiddenFill>
+            </a:ext>
+          </a:extLst>
         </p:spPr>
         <p:txBody>
           <a:bodyPr/>
@@ -4223,7 +4522,7 @@
       </p:sp>
       <p:sp>
         <p:nvSpPr>
-          <p:cNvPr id="6156" name="Text Box 12"/>
+          <p:cNvPr id="57" name="Text Box 12"/>
           <p:cNvSpPr txBox="1">
             <a:spLocks noChangeArrowheads="1"/>
           </p:cNvSpPr>
@@ -4238,40 +4537,163 @@
             <a:avLst/>
           </a:prstGeom>
           <a:noFill/>
-          <a:ln w="9525">
+          <a:ln>
             <a:noFill/>
-            <a:miter lim="800000"/>
-            <a:headEnd/>
-            <a:tailEnd/>
           </a:ln>
+          <a:extLst>
+            <a:ext uri="{909E8E84-426E-40dd-AFC4-6F175D3DCCD1}">
+              <a14:hiddenFill xmlns:a14="http://schemas.microsoft.com/office/drawing/2010/main">
+                <a:solidFill>
+                  <a:srgbClr val="FFFFFF"/>
+                </a:solidFill>
+              </a14:hiddenFill>
+            </a:ext>
+            <a:ext uri="{91240B29-F687-4f45-9708-019B960494DF}">
+              <a14:hiddenLine xmlns:a14="http://schemas.microsoft.com/office/drawing/2010/main" w="9525">
+                <a:solidFill>
+                  <a:srgbClr val="000000"/>
+                </a:solidFill>
+                <a:miter lim="800000"/>
+                <a:headEnd/>
+                <a:tailEnd/>
+              </a14:hiddenLine>
+            </a:ext>
+          </a:extLst>
         </p:spPr>
         <p:txBody>
           <a:bodyPr>
             <a:spAutoFit/>
           </a:bodyPr>
-          <a:lstStyle/>
-          <a:p>
-            <a:pPr>
+          <a:lstStyle>
+            <a:lvl1pPr eaLnBrk="0" hangingPunct="0">
+              <a:defRPr sz="2400">
+                <a:solidFill>
+                  <a:schemeClr val="tx1"/>
+                </a:solidFill>
+                <a:latin typeface="Arial" charset="0"/>
+                <a:ea typeface="ＭＳ Ｐゴシック" charset="0"/>
+                <a:cs typeface="ＭＳ Ｐゴシック" charset="0"/>
+              </a:defRPr>
+            </a:lvl1pPr>
+            <a:lvl2pPr marL="742950" indent="-285750" eaLnBrk="0" hangingPunct="0">
+              <a:defRPr sz="2400">
+                <a:solidFill>
+                  <a:schemeClr val="tx1"/>
+                </a:solidFill>
+                <a:latin typeface="Arial" charset="0"/>
+                <a:ea typeface="ＭＳ Ｐゴシック" charset="0"/>
+              </a:defRPr>
+            </a:lvl2pPr>
+            <a:lvl3pPr marL="1143000" indent="-228600" eaLnBrk="0" hangingPunct="0">
+              <a:defRPr sz="2400">
+                <a:solidFill>
+                  <a:schemeClr val="tx1"/>
+                </a:solidFill>
+                <a:latin typeface="Arial" charset="0"/>
+                <a:ea typeface="ＭＳ Ｐゴシック" charset="0"/>
+              </a:defRPr>
+            </a:lvl3pPr>
+            <a:lvl4pPr marL="1600200" indent="-228600" eaLnBrk="0" hangingPunct="0">
+              <a:defRPr sz="2400">
+                <a:solidFill>
+                  <a:schemeClr val="tx1"/>
+                </a:solidFill>
+                <a:latin typeface="Arial" charset="0"/>
+                <a:ea typeface="ＭＳ Ｐゴシック" charset="0"/>
+              </a:defRPr>
+            </a:lvl4pPr>
+            <a:lvl5pPr marL="2057400" indent="-228600" eaLnBrk="0" hangingPunct="0">
+              <a:defRPr sz="2400">
+                <a:solidFill>
+                  <a:schemeClr val="tx1"/>
+                </a:solidFill>
+                <a:latin typeface="Arial" charset="0"/>
+                <a:ea typeface="ＭＳ Ｐゴシック" charset="0"/>
+              </a:defRPr>
+            </a:lvl5pPr>
+            <a:lvl6pPr marL="2514600" indent="-228600" eaLnBrk="0" fontAlgn="base" hangingPunct="0">
+              <a:spcBef>
+                <a:spcPct val="0"/>
+              </a:spcBef>
+              <a:spcAft>
+                <a:spcPct val="0"/>
+              </a:spcAft>
+              <a:defRPr sz="2400">
+                <a:solidFill>
+                  <a:schemeClr val="tx1"/>
+                </a:solidFill>
+                <a:latin typeface="Arial" charset="0"/>
+                <a:ea typeface="ＭＳ Ｐゴシック" charset="0"/>
+              </a:defRPr>
+            </a:lvl6pPr>
+            <a:lvl7pPr marL="2971800" indent="-228600" eaLnBrk="0" fontAlgn="base" hangingPunct="0">
+              <a:spcBef>
+                <a:spcPct val="0"/>
+              </a:spcBef>
+              <a:spcAft>
+                <a:spcPct val="0"/>
+              </a:spcAft>
+              <a:defRPr sz="2400">
+                <a:solidFill>
+                  <a:schemeClr val="tx1"/>
+                </a:solidFill>
+                <a:latin typeface="Arial" charset="0"/>
+                <a:ea typeface="ＭＳ Ｐゴシック" charset="0"/>
+              </a:defRPr>
+            </a:lvl7pPr>
+            <a:lvl8pPr marL="3429000" indent="-228600" eaLnBrk="0" fontAlgn="base" hangingPunct="0">
+              <a:spcBef>
+                <a:spcPct val="0"/>
+              </a:spcBef>
+              <a:spcAft>
+                <a:spcPct val="0"/>
+              </a:spcAft>
+              <a:defRPr sz="2400">
+                <a:solidFill>
+                  <a:schemeClr val="tx1"/>
+                </a:solidFill>
+                <a:latin typeface="Arial" charset="0"/>
+                <a:ea typeface="ＭＳ Ｐゴシック" charset="0"/>
+              </a:defRPr>
+            </a:lvl8pPr>
+            <a:lvl9pPr marL="3886200" indent="-228600" eaLnBrk="0" fontAlgn="base" hangingPunct="0">
+              <a:spcBef>
+                <a:spcPct val="0"/>
+              </a:spcBef>
+              <a:spcAft>
+                <a:spcPct val="0"/>
+              </a:spcAft>
+              <a:defRPr sz="2400">
+                <a:solidFill>
+                  <a:schemeClr val="tx1"/>
+                </a:solidFill>
+                <a:latin typeface="Arial" charset="0"/>
+                <a:ea typeface="ＭＳ Ｐゴシック" charset="0"/>
+              </a:defRPr>
+            </a:lvl9pPr>
+          </a:lstStyle>
+          <a:p>
+            <a:pPr eaLnBrk="1" hangingPunct="1">
               <a:spcBef>
                 <a:spcPct val="50000"/>
               </a:spcBef>
             </a:pPr>
             <a:r>
-              <a:rPr lang="en-US" sz="2400">
-                <a:latin typeface="Calibri" pitchFamily="34" charset="0"/>
+              <a:rPr lang="en-US">
+                <a:latin typeface="Calibri" charset="0"/>
               </a:rPr>
               <a:t>NetCDF-Java/</a:t>
             </a:r>
           </a:p>
           <a:p>
-            <a:pPr>
+            <a:pPr eaLnBrk="1" hangingPunct="1">
               <a:spcBef>
                 <a:spcPct val="50000"/>
               </a:spcBef>
             </a:pPr>
             <a:r>
-              <a:rPr lang="en-US" sz="2400">
-                <a:latin typeface="Calibri" pitchFamily="34" charset="0"/>
+              <a:rPr lang="en-US">
+                <a:latin typeface="Calibri" charset="0"/>
               </a:rPr>
               <a:t>CDM architecture</a:t>
             </a:r>
@@ -4280,7 +4702,7 @@
       </p:sp>
       <p:sp>
         <p:nvSpPr>
-          <p:cNvPr id="6157" name="Text Box 13"/>
+          <p:cNvPr id="58" name="Text Box 13"/>
           <p:cNvSpPr txBox="1">
             <a:spLocks noChangeArrowheads="1"/>
           </p:cNvSpPr>
@@ -4305,168 +4727,424 @@
             <a:headEnd/>
             <a:tailEnd/>
           </a:ln>
+          <a:scene3d>
+            <a:camera prst="orthographicFront"/>
+            <a:lightRig rig="threePt" dir="t"/>
+          </a:scene3d>
+          <a:sp3d>
+            <a:bevelT prst="relaxedInset"/>
+          </a:sp3d>
         </p:spPr>
         <p:txBody>
           <a:bodyPr>
             <a:spAutoFit/>
           </a:bodyPr>
-          <a:lstStyle/>
-          <a:p>
-            <a:pPr>
+          <a:lstStyle>
+            <a:lvl1pPr eaLnBrk="0" hangingPunct="0">
+              <a:defRPr>
+                <a:solidFill>
+                  <a:schemeClr val="tx1"/>
+                </a:solidFill>
+                <a:latin typeface="Arial" charset="0"/>
+                <a:ea typeface="ＭＳ Ｐゴシック" charset="0"/>
+                <a:cs typeface="Arial" charset="0"/>
+              </a:defRPr>
+            </a:lvl1pPr>
+            <a:lvl2pPr marL="742950" indent="-285750" eaLnBrk="0" hangingPunct="0">
+              <a:defRPr>
+                <a:solidFill>
+                  <a:schemeClr val="tx1"/>
+                </a:solidFill>
+                <a:latin typeface="Arial" charset="0"/>
+                <a:ea typeface="Arial" charset="0"/>
+                <a:cs typeface="Arial" charset="0"/>
+              </a:defRPr>
+            </a:lvl2pPr>
+            <a:lvl3pPr marL="1143000" indent="-228600" eaLnBrk="0" hangingPunct="0">
+              <a:defRPr>
+                <a:solidFill>
+                  <a:schemeClr val="tx1"/>
+                </a:solidFill>
+                <a:latin typeface="Arial" charset="0"/>
+                <a:ea typeface="Arial" charset="0"/>
+                <a:cs typeface="Arial" charset="0"/>
+              </a:defRPr>
+            </a:lvl3pPr>
+            <a:lvl4pPr marL="1600200" indent="-228600" eaLnBrk="0" hangingPunct="0">
+              <a:defRPr>
+                <a:solidFill>
+                  <a:schemeClr val="tx1"/>
+                </a:solidFill>
+                <a:latin typeface="Arial" charset="0"/>
+                <a:ea typeface="Arial" charset="0"/>
+                <a:cs typeface="Arial" charset="0"/>
+              </a:defRPr>
+            </a:lvl4pPr>
+            <a:lvl5pPr marL="2057400" indent="-228600" eaLnBrk="0" hangingPunct="0">
+              <a:defRPr>
+                <a:solidFill>
+                  <a:schemeClr val="tx1"/>
+                </a:solidFill>
+                <a:latin typeface="Arial" charset="0"/>
+                <a:ea typeface="Arial" charset="0"/>
+                <a:cs typeface="Arial" charset="0"/>
+              </a:defRPr>
+            </a:lvl5pPr>
+            <a:lvl6pPr marL="2514600" indent="-228600" eaLnBrk="0" fontAlgn="base" hangingPunct="0">
+              <a:spcBef>
+                <a:spcPct val="0"/>
+              </a:spcBef>
+              <a:spcAft>
+                <a:spcPct val="0"/>
+              </a:spcAft>
+              <a:defRPr>
+                <a:solidFill>
+                  <a:schemeClr val="tx1"/>
+                </a:solidFill>
+                <a:latin typeface="Arial" charset="0"/>
+                <a:ea typeface="Arial" charset="0"/>
+                <a:cs typeface="Arial" charset="0"/>
+              </a:defRPr>
+            </a:lvl6pPr>
+            <a:lvl7pPr marL="2971800" indent="-228600" eaLnBrk="0" fontAlgn="base" hangingPunct="0">
+              <a:spcBef>
+                <a:spcPct val="0"/>
+              </a:spcBef>
+              <a:spcAft>
+                <a:spcPct val="0"/>
+              </a:spcAft>
+              <a:defRPr>
+                <a:solidFill>
+                  <a:schemeClr val="tx1"/>
+                </a:solidFill>
+                <a:latin typeface="Arial" charset="0"/>
+                <a:ea typeface="Arial" charset="0"/>
+                <a:cs typeface="Arial" charset="0"/>
+              </a:defRPr>
+            </a:lvl7pPr>
+            <a:lvl8pPr marL="3429000" indent="-228600" eaLnBrk="0" fontAlgn="base" hangingPunct="0">
+              <a:spcBef>
+                <a:spcPct val="0"/>
+              </a:spcBef>
+              <a:spcAft>
+                <a:spcPct val="0"/>
+              </a:spcAft>
+              <a:defRPr>
+                <a:solidFill>
+                  <a:schemeClr val="tx1"/>
+                </a:solidFill>
+                <a:latin typeface="Arial" charset="0"/>
+                <a:ea typeface="Arial" charset="0"/>
+                <a:cs typeface="Arial" charset="0"/>
+              </a:defRPr>
+            </a:lvl8pPr>
+            <a:lvl9pPr marL="3886200" indent="-228600" eaLnBrk="0" fontAlgn="base" hangingPunct="0">
+              <a:spcBef>
+                <a:spcPct val="0"/>
+              </a:spcBef>
+              <a:spcAft>
+                <a:spcPct val="0"/>
+              </a:spcAft>
+              <a:defRPr>
+                <a:solidFill>
+                  <a:schemeClr val="tx1"/>
+                </a:solidFill>
+                <a:latin typeface="Arial" charset="0"/>
+                <a:ea typeface="Arial" charset="0"/>
+                <a:cs typeface="Arial" charset="0"/>
+              </a:defRPr>
+            </a:lvl9pPr>
+          </a:lstStyle>
+          <a:p>
+            <a:pPr eaLnBrk="1" hangingPunct="1">
               <a:spcBef>
                 <a:spcPct val="50000"/>
               </a:spcBef>
+              <a:defRPr/>
             </a:pPr>
             <a:r>
-              <a:rPr lang="en-US">
-                <a:latin typeface="Calibri" pitchFamily="34" charset="0"/>
+              <a:rPr lang="en-US" dirty="0" err="1" smtClean="0">
+                <a:latin typeface="Calibri" charset="0"/>
               </a:rPr>
               <a:t>OPeNDAP</a:t>
             </a:r>
-          </a:p>
-        </p:txBody>
-      </p:sp>
-      <p:grpSp>
-        <p:nvGrpSpPr>
-          <p:cNvPr id="2" name="Group 14"/>
-          <p:cNvGrpSpPr>
-            <a:grpSpLocks/>
-          </p:cNvGrpSpPr>
+            <a:endParaRPr lang="en-US" dirty="0" smtClean="0">
+              <a:latin typeface="Calibri" charset="0"/>
+            </a:endParaRPr>
+          </a:p>
+        </p:txBody>
+      </p:sp>
+      <p:sp>
+        <p:nvSpPr>
+          <p:cNvPr id="59" name="Text Box 15"/>
+          <p:cNvSpPr txBox="1">
+            <a:spLocks noChangeArrowheads="1"/>
+          </p:cNvSpPr>
           <p:nvPr/>
-        </p:nvGrpSpPr>
-        <p:grpSpPr bwMode="auto">
+        </p:nvSpPr>
+        <p:spPr bwMode="auto">
           <a:xfrm>
             <a:off x="533400" y="3762375"/>
-            <a:ext cx="1447800" cy="1676400"/>
-            <a:chOff x="1872" y="2304"/>
-            <a:chExt cx="912" cy="1056"/>
+            <a:ext cx="1447800" cy="376238"/>
           </a:xfrm>
-        </p:grpSpPr>
-        <p:sp>
-          <p:nvSpPr>
-            <p:cNvPr id="6187" name="Text Box 15"/>
-            <p:cNvSpPr txBox="1">
-              <a:spLocks noChangeArrowheads="1"/>
-            </p:cNvSpPr>
-            <p:nvPr/>
-          </p:nvSpPr>
-          <p:spPr bwMode="auto">
-            <a:xfrm>
-              <a:off x="1872" y="2304"/>
-              <a:ext cx="912" cy="237"/>
-            </a:xfrm>
-            <a:prstGeom prst="rect">
-              <a:avLst/>
-            </a:prstGeom>
+          <a:prstGeom prst="rect">
+            <a:avLst/>
+          </a:prstGeom>
+          <a:solidFill>
+            <a:srgbClr val="FFCC99"/>
+          </a:solidFill>
+          <a:ln w="9525">
             <a:solidFill>
-              <a:srgbClr val="FFCC99"/>
+              <a:schemeClr val="tx1"/>
             </a:solidFill>
-            <a:ln w="9525">
-              <a:solidFill>
-                <a:schemeClr val="tx1"/>
-              </a:solidFill>
-              <a:miter lim="800000"/>
-              <a:headEnd/>
-              <a:tailEnd/>
-            </a:ln>
-          </p:spPr>
-          <p:txBody>
-            <a:bodyPr>
-              <a:spAutoFit/>
-            </a:bodyPr>
-            <a:lstStyle/>
-            <a:p>
-              <a:pPr>
-                <a:spcBef>
-                  <a:spcPct val="50000"/>
-                </a:spcBef>
-              </a:pPr>
-              <a:r>
-                <a:rPr lang="en-US">
-                  <a:latin typeface="Calibri" pitchFamily="34" charset="0"/>
-                </a:rPr>
-                <a:t>THREDDS</a:t>
-              </a:r>
-            </a:p>
-          </p:txBody>
-        </p:sp>
-        <p:sp>
-          <p:nvSpPr>
-            <p:cNvPr id="6188" name="AutoShape 16"/>
-            <p:cNvSpPr>
-              <a:spLocks noChangeArrowheads="1"/>
-            </p:cNvSpPr>
-            <p:nvPr/>
-          </p:nvSpPr>
-          <p:spPr bwMode="auto">
-            <a:xfrm>
-              <a:off x="1872" y="2832"/>
-              <a:ext cx="912" cy="528"/>
-            </a:xfrm>
-            <a:prstGeom prst="foldedCorner">
-              <a:avLst>
-                <a:gd name="adj" fmla="val 12500"/>
-              </a:avLst>
-            </a:prstGeom>
+            <a:miter lim="800000"/>
+            <a:headEnd/>
+            <a:tailEnd/>
+          </a:ln>
+          <a:scene3d>
+            <a:camera prst="orthographicFront"/>
+            <a:lightRig rig="threePt" dir="t"/>
+          </a:scene3d>
+          <a:sp3d>
+            <a:bevelT prst="relaxedInset"/>
+          </a:sp3d>
+        </p:spPr>
+        <p:txBody>
+          <a:bodyPr>
+            <a:spAutoFit/>
+          </a:bodyPr>
+          <a:lstStyle>
+            <a:lvl1pPr eaLnBrk="0" hangingPunct="0">
+              <a:defRPr>
+                <a:solidFill>
+                  <a:schemeClr val="tx1"/>
+                </a:solidFill>
+                <a:latin typeface="Arial" charset="0"/>
+                <a:ea typeface="ＭＳ Ｐゴシック" charset="0"/>
+                <a:cs typeface="Arial" charset="0"/>
+              </a:defRPr>
+            </a:lvl1pPr>
+            <a:lvl2pPr marL="742950" indent="-285750" eaLnBrk="0" hangingPunct="0">
+              <a:defRPr>
+                <a:solidFill>
+                  <a:schemeClr val="tx1"/>
+                </a:solidFill>
+                <a:latin typeface="Arial" charset="0"/>
+                <a:ea typeface="Arial" charset="0"/>
+                <a:cs typeface="Arial" charset="0"/>
+              </a:defRPr>
+            </a:lvl2pPr>
+            <a:lvl3pPr marL="1143000" indent="-228600" eaLnBrk="0" hangingPunct="0">
+              <a:defRPr>
+                <a:solidFill>
+                  <a:schemeClr val="tx1"/>
+                </a:solidFill>
+                <a:latin typeface="Arial" charset="0"/>
+                <a:ea typeface="Arial" charset="0"/>
+                <a:cs typeface="Arial" charset="0"/>
+              </a:defRPr>
+            </a:lvl3pPr>
+            <a:lvl4pPr marL="1600200" indent="-228600" eaLnBrk="0" hangingPunct="0">
+              <a:defRPr>
+                <a:solidFill>
+                  <a:schemeClr val="tx1"/>
+                </a:solidFill>
+                <a:latin typeface="Arial" charset="0"/>
+                <a:ea typeface="Arial" charset="0"/>
+                <a:cs typeface="Arial" charset="0"/>
+              </a:defRPr>
+            </a:lvl4pPr>
+            <a:lvl5pPr marL="2057400" indent="-228600" eaLnBrk="0" hangingPunct="0">
+              <a:defRPr>
+                <a:solidFill>
+                  <a:schemeClr val="tx1"/>
+                </a:solidFill>
+                <a:latin typeface="Arial" charset="0"/>
+                <a:ea typeface="Arial" charset="0"/>
+                <a:cs typeface="Arial" charset="0"/>
+              </a:defRPr>
+            </a:lvl5pPr>
+            <a:lvl6pPr marL="2514600" indent="-228600" eaLnBrk="0" fontAlgn="base" hangingPunct="0">
+              <a:spcBef>
+                <a:spcPct val="0"/>
+              </a:spcBef>
+              <a:spcAft>
+                <a:spcPct val="0"/>
+              </a:spcAft>
+              <a:defRPr>
+                <a:solidFill>
+                  <a:schemeClr val="tx1"/>
+                </a:solidFill>
+                <a:latin typeface="Arial" charset="0"/>
+                <a:ea typeface="Arial" charset="0"/>
+                <a:cs typeface="Arial" charset="0"/>
+              </a:defRPr>
+            </a:lvl6pPr>
+            <a:lvl7pPr marL="2971800" indent="-228600" eaLnBrk="0" fontAlgn="base" hangingPunct="0">
+              <a:spcBef>
+                <a:spcPct val="0"/>
+              </a:spcBef>
+              <a:spcAft>
+                <a:spcPct val="0"/>
+              </a:spcAft>
+              <a:defRPr>
+                <a:solidFill>
+                  <a:schemeClr val="tx1"/>
+                </a:solidFill>
+                <a:latin typeface="Arial" charset="0"/>
+                <a:ea typeface="Arial" charset="0"/>
+                <a:cs typeface="Arial" charset="0"/>
+              </a:defRPr>
+            </a:lvl7pPr>
+            <a:lvl8pPr marL="3429000" indent="-228600" eaLnBrk="0" fontAlgn="base" hangingPunct="0">
+              <a:spcBef>
+                <a:spcPct val="0"/>
+              </a:spcBef>
+              <a:spcAft>
+                <a:spcPct val="0"/>
+              </a:spcAft>
+              <a:defRPr>
+                <a:solidFill>
+                  <a:schemeClr val="tx1"/>
+                </a:solidFill>
+                <a:latin typeface="Arial" charset="0"/>
+                <a:ea typeface="Arial" charset="0"/>
+                <a:cs typeface="Arial" charset="0"/>
+              </a:defRPr>
+            </a:lvl8pPr>
+            <a:lvl9pPr marL="3886200" indent="-228600" eaLnBrk="0" fontAlgn="base" hangingPunct="0">
+              <a:spcBef>
+                <a:spcPct val="0"/>
+              </a:spcBef>
+              <a:spcAft>
+                <a:spcPct val="0"/>
+              </a:spcAft>
+              <a:defRPr>
+                <a:solidFill>
+                  <a:schemeClr val="tx1"/>
+                </a:solidFill>
+                <a:latin typeface="Arial" charset="0"/>
+                <a:ea typeface="Arial" charset="0"/>
+                <a:cs typeface="Arial" charset="0"/>
+              </a:defRPr>
+            </a:lvl9pPr>
+          </a:lstStyle>
+          <a:p>
+            <a:pPr eaLnBrk="1" hangingPunct="1">
+              <a:spcBef>
+                <a:spcPct val="50000"/>
+              </a:spcBef>
+              <a:defRPr/>
+            </a:pPr>
+            <a:r>
+              <a:rPr lang="en-US" smtClean="0">
+                <a:latin typeface="Calibri" charset="0"/>
+              </a:rPr>
+              <a:t>THREDDS</a:t>
+            </a:r>
+          </a:p>
+        </p:txBody>
+      </p:sp>
+      <p:sp>
+        <p:nvSpPr>
+          <p:cNvPr id="60" name="AutoShape 16"/>
+          <p:cNvSpPr>
+            <a:spLocks noChangeArrowheads="1"/>
+          </p:cNvSpPr>
+          <p:nvPr/>
+        </p:nvSpPr>
+        <p:spPr bwMode="auto">
+          <a:xfrm>
+            <a:off x="533400" y="4600575"/>
+            <a:ext cx="1447800" cy="838200"/>
+          </a:xfrm>
+          <a:prstGeom prst="foldedCorner">
+            <a:avLst>
+              <a:gd name="adj" fmla="val 12500"/>
+            </a:avLst>
+          </a:prstGeom>
+          <a:solidFill>
+            <a:srgbClr val="FFCC99"/>
+          </a:solidFill>
+          <a:ln w="9525">
             <a:solidFill>
-              <a:srgbClr val="FFCC99"/>
+              <a:schemeClr val="tx1"/>
             </a:solidFill>
-            <a:ln w="9525">
-              <a:solidFill>
-                <a:schemeClr val="tx1"/>
-              </a:solidFill>
-              <a:round/>
-              <a:headEnd/>
-              <a:tailEnd/>
-            </a:ln>
-          </p:spPr>
-          <p:txBody>
-            <a:bodyPr wrap="none" anchor="ctr"/>
-            <a:lstStyle/>
-            <a:p>
-              <a:pPr algn="ctr"/>
-              <a:r>
-                <a:rPr lang="en-US">
-                  <a:latin typeface="Calibri" pitchFamily="34" charset="0"/>
-                </a:rPr>
-                <a:t>Catalog.xml</a:t>
-              </a:r>
-            </a:p>
-          </p:txBody>
-        </p:sp>
-        <p:cxnSp>
-          <p:nvCxnSpPr>
-            <p:cNvPr id="6189" name="AutoShape 17"/>
-            <p:cNvCxnSpPr>
-              <a:cxnSpLocks noChangeShapeType="1"/>
-              <a:stCxn id="6187" idx="2"/>
-              <a:endCxn id="6188" idx="0"/>
-            </p:cNvCxnSpPr>
-            <p:nvPr/>
-          </p:nvCxnSpPr>
-          <p:spPr bwMode="auto">
-            <a:xfrm>
-              <a:off x="2328" y="2541"/>
-              <a:ext cx="0" cy="291"/>
-            </a:xfrm>
-            <a:prstGeom prst="straightConnector1">
-              <a:avLst/>
-            </a:prstGeom>
-            <a:noFill/>
-            <a:ln w="9525">
-              <a:solidFill>
-                <a:schemeClr val="tx1"/>
-              </a:solidFill>
-              <a:round/>
-              <a:headEnd/>
-              <a:tailEnd type="triangle" w="med" len="med"/>
-            </a:ln>
-          </p:spPr>
-        </p:cxnSp>
-      </p:grpSp>
-      <p:sp>
-        <p:nvSpPr>
-          <p:cNvPr id="6159" name="Text Box 18"/>
+            <a:round/>
+            <a:headEnd/>
+            <a:tailEnd/>
+          </a:ln>
+          <a:effectLst>
+            <a:outerShdw blurRad="50800" dist="38100" dir="8100000" sx="104000" sy="104000" algn="tr" rotWithShape="0">
+              <a:prstClr val="black">
+                <a:alpha val="40000"/>
+              </a:prstClr>
+            </a:outerShdw>
+          </a:effectLst>
+          <a:scene3d>
+            <a:camera prst="orthographicFront"/>
+            <a:lightRig rig="threePt" dir="t"/>
+          </a:scene3d>
+          <a:sp3d/>
+        </p:spPr>
+        <p:txBody>
+          <a:bodyPr wrap="none" anchor="ctr"/>
+          <a:lstStyle/>
+          <a:p>
+            <a:pPr algn="ctr">
+              <a:defRPr/>
+            </a:pPr>
+            <a:r>
+              <a:rPr lang="en-US" dirty="0" err="1">
+                <a:latin typeface="Calibri" charset="0"/>
+                <a:cs typeface="Arial" charset="0"/>
+              </a:rPr>
+              <a:t>Catalog.xml</a:t>
+            </a:r>
+            <a:endParaRPr lang="en-US" dirty="0">
+              <a:latin typeface="Calibri" charset="0"/>
+              <a:cs typeface="Arial" charset="0"/>
+            </a:endParaRPr>
+          </a:p>
+        </p:txBody>
+      </p:sp>
+      <p:cxnSp>
+        <p:nvCxnSpPr>
+          <p:cNvPr id="61" name="AutoShape 17"/>
+          <p:cNvCxnSpPr>
+            <a:cxnSpLocks noChangeShapeType="1"/>
+          </p:cNvCxnSpPr>
+          <p:nvPr/>
+        </p:nvCxnSpPr>
+        <p:spPr bwMode="auto">
+          <a:xfrm>
+            <a:off x="1257300" y="4138613"/>
+            <a:ext cx="0" cy="461962"/>
+          </a:xfrm>
+          <a:prstGeom prst="straightConnector1">
+            <a:avLst/>
+          </a:prstGeom>
+          <a:noFill/>
+          <a:ln w="9525">
+            <a:solidFill>
+              <a:schemeClr val="tx1"/>
+            </a:solidFill>
+            <a:round/>
+            <a:headEnd/>
+            <a:tailEnd type="triangle" w="med" len="med"/>
+          </a:ln>
+          <a:extLst>
+            <a:ext uri="{909E8E84-426E-40dd-AFC4-6F175D3DCCD1}">
+              <a14:hiddenFill xmlns:a14="http://schemas.microsoft.com/office/drawing/2010/main">
+                <a:noFill/>
+              </a14:hiddenFill>
+            </a:ext>
+          </a:extLst>
+        </p:spPr>
+      </p:cxnSp>
+      <p:sp>
+        <p:nvSpPr>
+          <p:cNvPr id="62" name="Text Box 18"/>
           <p:cNvSpPr txBox="1">
             <a:spLocks noChangeArrowheads="1"/>
           </p:cNvSpPr>
@@ -4474,7 +5152,7 @@
         </p:nvSpPr>
         <p:spPr bwMode="auto">
           <a:xfrm>
-            <a:off x="5334000" y="4676775"/>
+            <a:off x="5410200" y="4729162"/>
             <a:ext cx="1447800" cy="376238"/>
           </a:xfrm>
           <a:prstGeom prst="rect">
@@ -4491,21 +5169,144 @@
             <a:headEnd/>
             <a:tailEnd/>
           </a:ln>
+          <a:scene3d>
+            <a:camera prst="orthographicFront"/>
+            <a:lightRig rig="threePt" dir="t"/>
+          </a:scene3d>
+          <a:sp3d>
+            <a:bevelT prst="relaxedInset"/>
+          </a:sp3d>
         </p:spPr>
         <p:txBody>
           <a:bodyPr>
             <a:spAutoFit/>
           </a:bodyPr>
-          <a:lstStyle/>
-          <a:p>
-            <a:pPr>
+          <a:lstStyle>
+            <a:lvl1pPr eaLnBrk="0" hangingPunct="0">
+              <a:defRPr>
+                <a:solidFill>
+                  <a:schemeClr val="tx1"/>
+                </a:solidFill>
+                <a:latin typeface="Arial" charset="0"/>
+                <a:ea typeface="ＭＳ Ｐゴシック" charset="0"/>
+                <a:cs typeface="Arial" charset="0"/>
+              </a:defRPr>
+            </a:lvl1pPr>
+            <a:lvl2pPr marL="742950" indent="-285750" eaLnBrk="0" hangingPunct="0">
+              <a:defRPr>
+                <a:solidFill>
+                  <a:schemeClr val="tx1"/>
+                </a:solidFill>
+                <a:latin typeface="Arial" charset="0"/>
+                <a:ea typeface="Arial" charset="0"/>
+                <a:cs typeface="Arial" charset="0"/>
+              </a:defRPr>
+            </a:lvl2pPr>
+            <a:lvl3pPr marL="1143000" indent="-228600" eaLnBrk="0" hangingPunct="0">
+              <a:defRPr>
+                <a:solidFill>
+                  <a:schemeClr val="tx1"/>
+                </a:solidFill>
+                <a:latin typeface="Arial" charset="0"/>
+                <a:ea typeface="Arial" charset="0"/>
+                <a:cs typeface="Arial" charset="0"/>
+              </a:defRPr>
+            </a:lvl3pPr>
+            <a:lvl4pPr marL="1600200" indent="-228600" eaLnBrk="0" hangingPunct="0">
+              <a:defRPr>
+                <a:solidFill>
+                  <a:schemeClr val="tx1"/>
+                </a:solidFill>
+                <a:latin typeface="Arial" charset="0"/>
+                <a:ea typeface="Arial" charset="0"/>
+                <a:cs typeface="Arial" charset="0"/>
+              </a:defRPr>
+            </a:lvl4pPr>
+            <a:lvl5pPr marL="2057400" indent="-228600" eaLnBrk="0" hangingPunct="0">
+              <a:defRPr>
+                <a:solidFill>
+                  <a:schemeClr val="tx1"/>
+                </a:solidFill>
+                <a:latin typeface="Arial" charset="0"/>
+                <a:ea typeface="Arial" charset="0"/>
+                <a:cs typeface="Arial" charset="0"/>
+              </a:defRPr>
+            </a:lvl5pPr>
+            <a:lvl6pPr marL="2514600" indent="-228600" eaLnBrk="0" fontAlgn="base" hangingPunct="0">
+              <a:spcBef>
+                <a:spcPct val="0"/>
+              </a:spcBef>
+              <a:spcAft>
+                <a:spcPct val="0"/>
+              </a:spcAft>
+              <a:defRPr>
+                <a:solidFill>
+                  <a:schemeClr val="tx1"/>
+                </a:solidFill>
+                <a:latin typeface="Arial" charset="0"/>
+                <a:ea typeface="Arial" charset="0"/>
+                <a:cs typeface="Arial" charset="0"/>
+              </a:defRPr>
+            </a:lvl6pPr>
+            <a:lvl7pPr marL="2971800" indent="-228600" eaLnBrk="0" fontAlgn="base" hangingPunct="0">
+              <a:spcBef>
+                <a:spcPct val="0"/>
+              </a:spcBef>
+              <a:spcAft>
+                <a:spcPct val="0"/>
+              </a:spcAft>
+              <a:defRPr>
+                <a:solidFill>
+                  <a:schemeClr val="tx1"/>
+                </a:solidFill>
+                <a:latin typeface="Arial" charset="0"/>
+                <a:ea typeface="Arial" charset="0"/>
+                <a:cs typeface="Arial" charset="0"/>
+              </a:defRPr>
+            </a:lvl7pPr>
+            <a:lvl8pPr marL="3429000" indent="-228600" eaLnBrk="0" fontAlgn="base" hangingPunct="0">
+              <a:spcBef>
+                <a:spcPct val="0"/>
+              </a:spcBef>
+              <a:spcAft>
+                <a:spcPct val="0"/>
+              </a:spcAft>
+              <a:defRPr>
+                <a:solidFill>
+                  <a:schemeClr val="tx1"/>
+                </a:solidFill>
+                <a:latin typeface="Arial" charset="0"/>
+                <a:ea typeface="Arial" charset="0"/>
+                <a:cs typeface="Arial" charset="0"/>
+              </a:defRPr>
+            </a:lvl8pPr>
+            <a:lvl9pPr marL="3886200" indent="-228600" eaLnBrk="0" fontAlgn="base" hangingPunct="0">
+              <a:spcBef>
+                <a:spcPct val="0"/>
+              </a:spcBef>
+              <a:spcAft>
+                <a:spcPct val="0"/>
+              </a:spcAft>
+              <a:defRPr>
+                <a:solidFill>
+                  <a:schemeClr val="tx1"/>
+                </a:solidFill>
+                <a:latin typeface="Arial" charset="0"/>
+                <a:ea typeface="Arial" charset="0"/>
+                <a:cs typeface="Arial" charset="0"/>
+              </a:defRPr>
+            </a:lvl9pPr>
+          </a:lstStyle>
+          <a:p>
+            <a:pPr eaLnBrk="1" hangingPunct="1">
               <a:spcBef>
                 <a:spcPct val="50000"/>
               </a:spcBef>
+              <a:defRPr/>
             </a:pPr>
             <a:r>
-              <a:rPr lang="en-US">
-                <a:latin typeface="Calibri" pitchFamily="34" charset="0"/>
+              <a:rPr lang="en-US" dirty="0" smtClean="0">
+                <a:latin typeface="Calibri" charset="0"/>
               </a:rPr>
               <a:t>NetCDF-3</a:t>
             </a:r>
@@ -4514,7 +5315,7 @@
       </p:sp>
       <p:sp>
         <p:nvSpPr>
-          <p:cNvPr id="6160" name="Text Box 19"/>
+          <p:cNvPr id="63" name="Text Box 19"/>
           <p:cNvSpPr txBox="1">
             <a:spLocks noChangeArrowheads="1"/>
           </p:cNvSpPr>
@@ -4529,33 +5330,156 @@
             <a:avLst/>
           </a:prstGeom>
           <a:noFill/>
-          <a:ln w="9525">
+          <a:ln>
             <a:noFill/>
-            <a:miter lim="800000"/>
-            <a:headEnd/>
-            <a:tailEnd/>
           </a:ln>
+          <a:extLst>
+            <a:ext uri="{909E8E84-426E-40dd-AFC4-6F175D3DCCD1}">
+              <a14:hiddenFill xmlns:a14="http://schemas.microsoft.com/office/drawing/2010/main">
+                <a:solidFill>
+                  <a:srgbClr val="FFFFFF"/>
+                </a:solidFill>
+              </a14:hiddenFill>
+            </a:ext>
+            <a:ext uri="{91240B29-F687-4f45-9708-019B960494DF}">
+              <a14:hiddenLine xmlns:a14="http://schemas.microsoft.com/office/drawing/2010/main" w="9525">
+                <a:solidFill>
+                  <a:srgbClr val="000000"/>
+                </a:solidFill>
+                <a:miter lim="800000"/>
+                <a:headEnd/>
+                <a:tailEnd/>
+              </a14:hiddenLine>
+            </a:ext>
+          </a:extLst>
         </p:spPr>
         <p:txBody>
           <a:bodyPr>
             <a:spAutoFit/>
           </a:bodyPr>
-          <a:lstStyle/>
-          <a:p>
-            <a:pPr>
+          <a:lstStyle>
+            <a:lvl1pPr eaLnBrk="0" hangingPunct="0">
+              <a:defRPr sz="2400">
+                <a:solidFill>
+                  <a:schemeClr val="tx1"/>
+                </a:solidFill>
+                <a:latin typeface="Arial" charset="0"/>
+                <a:ea typeface="ＭＳ Ｐゴシック" charset="0"/>
+                <a:cs typeface="ＭＳ Ｐゴシック" charset="0"/>
+              </a:defRPr>
+            </a:lvl1pPr>
+            <a:lvl2pPr marL="742950" indent="-285750" eaLnBrk="0" hangingPunct="0">
+              <a:defRPr sz="2400">
+                <a:solidFill>
+                  <a:schemeClr val="tx1"/>
+                </a:solidFill>
+                <a:latin typeface="Arial" charset="0"/>
+                <a:ea typeface="ＭＳ Ｐゴシック" charset="0"/>
+              </a:defRPr>
+            </a:lvl2pPr>
+            <a:lvl3pPr marL="1143000" indent="-228600" eaLnBrk="0" hangingPunct="0">
+              <a:defRPr sz="2400">
+                <a:solidFill>
+                  <a:schemeClr val="tx1"/>
+                </a:solidFill>
+                <a:latin typeface="Arial" charset="0"/>
+                <a:ea typeface="ＭＳ Ｐゴシック" charset="0"/>
+              </a:defRPr>
+            </a:lvl3pPr>
+            <a:lvl4pPr marL="1600200" indent="-228600" eaLnBrk="0" hangingPunct="0">
+              <a:defRPr sz="2400">
+                <a:solidFill>
+                  <a:schemeClr val="tx1"/>
+                </a:solidFill>
+                <a:latin typeface="Arial" charset="0"/>
+                <a:ea typeface="ＭＳ Ｐゴシック" charset="0"/>
+              </a:defRPr>
+            </a:lvl4pPr>
+            <a:lvl5pPr marL="2057400" indent="-228600" eaLnBrk="0" hangingPunct="0">
+              <a:defRPr sz="2400">
+                <a:solidFill>
+                  <a:schemeClr val="tx1"/>
+                </a:solidFill>
+                <a:latin typeface="Arial" charset="0"/>
+                <a:ea typeface="ＭＳ Ｐゴシック" charset="0"/>
+              </a:defRPr>
+            </a:lvl5pPr>
+            <a:lvl6pPr marL="2514600" indent="-228600" eaLnBrk="0" fontAlgn="base" hangingPunct="0">
+              <a:spcBef>
+                <a:spcPct val="0"/>
+              </a:spcBef>
+              <a:spcAft>
+                <a:spcPct val="0"/>
+              </a:spcAft>
+              <a:defRPr sz="2400">
+                <a:solidFill>
+                  <a:schemeClr val="tx1"/>
+                </a:solidFill>
+                <a:latin typeface="Arial" charset="0"/>
+                <a:ea typeface="ＭＳ Ｐゴシック" charset="0"/>
+              </a:defRPr>
+            </a:lvl6pPr>
+            <a:lvl7pPr marL="2971800" indent="-228600" eaLnBrk="0" fontAlgn="base" hangingPunct="0">
+              <a:spcBef>
+                <a:spcPct val="0"/>
+              </a:spcBef>
+              <a:spcAft>
+                <a:spcPct val="0"/>
+              </a:spcAft>
+              <a:defRPr sz="2400">
+                <a:solidFill>
+                  <a:schemeClr val="tx1"/>
+                </a:solidFill>
+                <a:latin typeface="Arial" charset="0"/>
+                <a:ea typeface="ＭＳ Ｐゴシック" charset="0"/>
+              </a:defRPr>
+            </a:lvl7pPr>
+            <a:lvl8pPr marL="3429000" indent="-228600" eaLnBrk="0" fontAlgn="base" hangingPunct="0">
+              <a:spcBef>
+                <a:spcPct val="0"/>
+              </a:spcBef>
+              <a:spcAft>
+                <a:spcPct val="0"/>
+              </a:spcAft>
+              <a:defRPr sz="2400">
+                <a:solidFill>
+                  <a:schemeClr val="tx1"/>
+                </a:solidFill>
+                <a:latin typeface="Arial" charset="0"/>
+                <a:ea typeface="ＭＳ Ｐゴシック" charset="0"/>
+              </a:defRPr>
+            </a:lvl8pPr>
+            <a:lvl9pPr marL="3886200" indent="-228600" eaLnBrk="0" fontAlgn="base" hangingPunct="0">
+              <a:spcBef>
+                <a:spcPct val="0"/>
+              </a:spcBef>
+              <a:spcAft>
+                <a:spcPct val="0"/>
+              </a:spcAft>
+              <a:defRPr sz="2400">
+                <a:solidFill>
+                  <a:schemeClr val="tx1"/>
+                </a:solidFill>
+                <a:latin typeface="Arial" charset="0"/>
+                <a:ea typeface="ＭＳ Ｐゴシック" charset="0"/>
+              </a:defRPr>
+            </a:lvl9pPr>
+          </a:lstStyle>
+          <a:p>
+            <a:pPr eaLnBrk="1" hangingPunct="1">
               <a:spcBef>
                 <a:spcPct val="50000"/>
               </a:spcBef>
             </a:pPr>
-            <a:endParaRPr lang="en-US">
-              <a:latin typeface="Calibri" pitchFamily="34" charset="0"/>
+            <a:endParaRPr lang="en-US" sz="1800">
+              <a:latin typeface="Calibri" charset="0"/>
             </a:endParaRPr>
           </a:p>
         </p:txBody>
       </p:sp>
       <p:sp>
         <p:nvSpPr>
-          <p:cNvPr id="6161" name="Text Box 20"/>
+          <p:cNvPr id="64" name="Text Box 20"/>
           <p:cNvSpPr txBox="1">
             <a:spLocks noChangeArrowheads="1"/>
           </p:cNvSpPr>
@@ -4563,7 +5487,7 @@
         </p:nvSpPr>
         <p:spPr bwMode="auto">
           <a:xfrm>
-            <a:off x="5181600" y="5743575"/>
+            <a:off x="6019800" y="5743575"/>
             <a:ext cx="838200" cy="376238"/>
           </a:xfrm>
           <a:prstGeom prst="rect">
@@ -4580,21 +5504,144 @@
             <a:headEnd/>
             <a:tailEnd/>
           </a:ln>
+          <a:scene3d>
+            <a:camera prst="orthographicFront"/>
+            <a:lightRig rig="threePt" dir="t"/>
+          </a:scene3d>
+          <a:sp3d>
+            <a:bevelT prst="relaxedInset"/>
+          </a:sp3d>
         </p:spPr>
         <p:txBody>
           <a:bodyPr>
             <a:spAutoFit/>
           </a:bodyPr>
-          <a:lstStyle/>
-          <a:p>
-            <a:pPr>
+          <a:lstStyle>
+            <a:lvl1pPr eaLnBrk="0" hangingPunct="0">
+              <a:defRPr>
+                <a:solidFill>
+                  <a:schemeClr val="tx1"/>
+                </a:solidFill>
+                <a:latin typeface="Arial" charset="0"/>
+                <a:ea typeface="ＭＳ Ｐゴシック" charset="0"/>
+                <a:cs typeface="Arial" charset="0"/>
+              </a:defRPr>
+            </a:lvl1pPr>
+            <a:lvl2pPr marL="742950" indent="-285750" eaLnBrk="0" hangingPunct="0">
+              <a:defRPr>
+                <a:solidFill>
+                  <a:schemeClr val="tx1"/>
+                </a:solidFill>
+                <a:latin typeface="Arial" charset="0"/>
+                <a:ea typeface="Arial" charset="0"/>
+                <a:cs typeface="Arial" charset="0"/>
+              </a:defRPr>
+            </a:lvl2pPr>
+            <a:lvl3pPr marL="1143000" indent="-228600" eaLnBrk="0" hangingPunct="0">
+              <a:defRPr>
+                <a:solidFill>
+                  <a:schemeClr val="tx1"/>
+                </a:solidFill>
+                <a:latin typeface="Arial" charset="0"/>
+                <a:ea typeface="Arial" charset="0"/>
+                <a:cs typeface="Arial" charset="0"/>
+              </a:defRPr>
+            </a:lvl3pPr>
+            <a:lvl4pPr marL="1600200" indent="-228600" eaLnBrk="0" hangingPunct="0">
+              <a:defRPr>
+                <a:solidFill>
+                  <a:schemeClr val="tx1"/>
+                </a:solidFill>
+                <a:latin typeface="Arial" charset="0"/>
+                <a:ea typeface="Arial" charset="0"/>
+                <a:cs typeface="Arial" charset="0"/>
+              </a:defRPr>
+            </a:lvl4pPr>
+            <a:lvl5pPr marL="2057400" indent="-228600" eaLnBrk="0" hangingPunct="0">
+              <a:defRPr>
+                <a:solidFill>
+                  <a:schemeClr val="tx1"/>
+                </a:solidFill>
+                <a:latin typeface="Arial" charset="0"/>
+                <a:ea typeface="Arial" charset="0"/>
+                <a:cs typeface="Arial" charset="0"/>
+              </a:defRPr>
+            </a:lvl5pPr>
+            <a:lvl6pPr marL="2514600" indent="-228600" eaLnBrk="0" fontAlgn="base" hangingPunct="0">
+              <a:spcBef>
+                <a:spcPct val="0"/>
+              </a:spcBef>
+              <a:spcAft>
+                <a:spcPct val="0"/>
+              </a:spcAft>
+              <a:defRPr>
+                <a:solidFill>
+                  <a:schemeClr val="tx1"/>
+                </a:solidFill>
+                <a:latin typeface="Arial" charset="0"/>
+                <a:ea typeface="Arial" charset="0"/>
+                <a:cs typeface="Arial" charset="0"/>
+              </a:defRPr>
+            </a:lvl6pPr>
+            <a:lvl7pPr marL="2971800" indent="-228600" eaLnBrk="0" fontAlgn="base" hangingPunct="0">
+              <a:spcBef>
+                <a:spcPct val="0"/>
+              </a:spcBef>
+              <a:spcAft>
+                <a:spcPct val="0"/>
+              </a:spcAft>
+              <a:defRPr>
+                <a:solidFill>
+                  <a:schemeClr val="tx1"/>
+                </a:solidFill>
+                <a:latin typeface="Arial" charset="0"/>
+                <a:ea typeface="Arial" charset="0"/>
+                <a:cs typeface="Arial" charset="0"/>
+              </a:defRPr>
+            </a:lvl7pPr>
+            <a:lvl8pPr marL="3429000" indent="-228600" eaLnBrk="0" fontAlgn="base" hangingPunct="0">
+              <a:spcBef>
+                <a:spcPct val="0"/>
+              </a:spcBef>
+              <a:spcAft>
+                <a:spcPct val="0"/>
+              </a:spcAft>
+              <a:defRPr>
+                <a:solidFill>
+                  <a:schemeClr val="tx1"/>
+                </a:solidFill>
+                <a:latin typeface="Arial" charset="0"/>
+                <a:ea typeface="Arial" charset="0"/>
+                <a:cs typeface="Arial" charset="0"/>
+              </a:defRPr>
+            </a:lvl8pPr>
+            <a:lvl9pPr marL="3886200" indent="-228600" eaLnBrk="0" fontAlgn="base" hangingPunct="0">
+              <a:spcBef>
+                <a:spcPct val="0"/>
+              </a:spcBef>
+              <a:spcAft>
+                <a:spcPct val="0"/>
+              </a:spcAft>
+              <a:defRPr>
+                <a:solidFill>
+                  <a:schemeClr val="tx1"/>
+                </a:solidFill>
+                <a:latin typeface="Arial" charset="0"/>
+                <a:ea typeface="Arial" charset="0"/>
+                <a:cs typeface="Arial" charset="0"/>
+              </a:defRPr>
+            </a:lvl9pPr>
+          </a:lstStyle>
+          <a:p>
+            <a:pPr eaLnBrk="1" hangingPunct="1">
               <a:spcBef>
                 <a:spcPct val="50000"/>
               </a:spcBef>
+              <a:defRPr/>
             </a:pPr>
             <a:r>
-              <a:rPr lang="en-US">
-                <a:latin typeface="Calibri" pitchFamily="34" charset="0"/>
+              <a:rPr lang="en-US" smtClean="0">
+                <a:latin typeface="Calibri" charset="0"/>
               </a:rPr>
               <a:t>HDF5</a:t>
             </a:r>
@@ -4603,7 +5650,7 @@
       </p:sp>
       <p:sp>
         <p:nvSpPr>
-          <p:cNvPr id="6162" name="Text Box 21"/>
+          <p:cNvPr id="65" name="Text Box 21"/>
           <p:cNvSpPr txBox="1">
             <a:spLocks noChangeArrowheads="1"/>
           </p:cNvSpPr>
@@ -4628,21 +5675,144 @@
             <a:headEnd/>
             <a:tailEnd/>
           </a:ln>
+          <a:scene3d>
+            <a:camera prst="orthographicFront"/>
+            <a:lightRig rig="threePt" dir="t"/>
+          </a:scene3d>
+          <a:sp3d>
+            <a:bevelT/>
+          </a:sp3d>
         </p:spPr>
         <p:txBody>
           <a:bodyPr>
             <a:spAutoFit/>
           </a:bodyPr>
-          <a:lstStyle/>
-          <a:p>
-            <a:pPr>
+          <a:lstStyle>
+            <a:lvl1pPr eaLnBrk="0" hangingPunct="0">
+              <a:defRPr>
+                <a:solidFill>
+                  <a:schemeClr val="tx1"/>
+                </a:solidFill>
+                <a:latin typeface="Arial" charset="0"/>
+                <a:ea typeface="ＭＳ Ｐゴシック" charset="0"/>
+                <a:cs typeface="Arial" charset="0"/>
+              </a:defRPr>
+            </a:lvl1pPr>
+            <a:lvl2pPr marL="742950" indent="-285750" eaLnBrk="0" hangingPunct="0">
+              <a:defRPr>
+                <a:solidFill>
+                  <a:schemeClr val="tx1"/>
+                </a:solidFill>
+                <a:latin typeface="Arial" charset="0"/>
+                <a:ea typeface="Arial" charset="0"/>
+                <a:cs typeface="Arial" charset="0"/>
+              </a:defRPr>
+            </a:lvl2pPr>
+            <a:lvl3pPr marL="1143000" indent="-228600" eaLnBrk="0" hangingPunct="0">
+              <a:defRPr>
+                <a:solidFill>
+                  <a:schemeClr val="tx1"/>
+                </a:solidFill>
+                <a:latin typeface="Arial" charset="0"/>
+                <a:ea typeface="Arial" charset="0"/>
+                <a:cs typeface="Arial" charset="0"/>
+              </a:defRPr>
+            </a:lvl3pPr>
+            <a:lvl4pPr marL="1600200" indent="-228600" eaLnBrk="0" hangingPunct="0">
+              <a:defRPr>
+                <a:solidFill>
+                  <a:schemeClr val="tx1"/>
+                </a:solidFill>
+                <a:latin typeface="Arial" charset="0"/>
+                <a:ea typeface="Arial" charset="0"/>
+                <a:cs typeface="Arial" charset="0"/>
+              </a:defRPr>
+            </a:lvl4pPr>
+            <a:lvl5pPr marL="2057400" indent="-228600" eaLnBrk="0" hangingPunct="0">
+              <a:defRPr>
+                <a:solidFill>
+                  <a:schemeClr val="tx1"/>
+                </a:solidFill>
+                <a:latin typeface="Arial" charset="0"/>
+                <a:ea typeface="Arial" charset="0"/>
+                <a:cs typeface="Arial" charset="0"/>
+              </a:defRPr>
+            </a:lvl5pPr>
+            <a:lvl6pPr marL="2514600" indent="-228600" eaLnBrk="0" fontAlgn="base" hangingPunct="0">
+              <a:spcBef>
+                <a:spcPct val="0"/>
+              </a:spcBef>
+              <a:spcAft>
+                <a:spcPct val="0"/>
+              </a:spcAft>
+              <a:defRPr>
+                <a:solidFill>
+                  <a:schemeClr val="tx1"/>
+                </a:solidFill>
+                <a:latin typeface="Arial" charset="0"/>
+                <a:ea typeface="Arial" charset="0"/>
+                <a:cs typeface="Arial" charset="0"/>
+              </a:defRPr>
+            </a:lvl6pPr>
+            <a:lvl7pPr marL="2971800" indent="-228600" eaLnBrk="0" fontAlgn="base" hangingPunct="0">
+              <a:spcBef>
+                <a:spcPct val="0"/>
+              </a:spcBef>
+              <a:spcAft>
+                <a:spcPct val="0"/>
+              </a:spcAft>
+              <a:defRPr>
+                <a:solidFill>
+                  <a:schemeClr val="tx1"/>
+                </a:solidFill>
+                <a:latin typeface="Arial" charset="0"/>
+                <a:ea typeface="Arial" charset="0"/>
+                <a:cs typeface="Arial" charset="0"/>
+              </a:defRPr>
+            </a:lvl7pPr>
+            <a:lvl8pPr marL="3429000" indent="-228600" eaLnBrk="0" fontAlgn="base" hangingPunct="0">
+              <a:spcBef>
+                <a:spcPct val="0"/>
+              </a:spcBef>
+              <a:spcAft>
+                <a:spcPct val="0"/>
+              </a:spcAft>
+              <a:defRPr>
+                <a:solidFill>
+                  <a:schemeClr val="tx1"/>
+                </a:solidFill>
+                <a:latin typeface="Arial" charset="0"/>
+                <a:ea typeface="Arial" charset="0"/>
+                <a:cs typeface="Arial" charset="0"/>
+              </a:defRPr>
+            </a:lvl8pPr>
+            <a:lvl9pPr marL="3886200" indent="-228600" eaLnBrk="0" fontAlgn="base" hangingPunct="0">
+              <a:spcBef>
+                <a:spcPct val="0"/>
+              </a:spcBef>
+              <a:spcAft>
+                <a:spcPct val="0"/>
+              </a:spcAft>
+              <a:defRPr>
+                <a:solidFill>
+                  <a:schemeClr val="tx1"/>
+                </a:solidFill>
+                <a:latin typeface="Arial" charset="0"/>
+                <a:ea typeface="Arial" charset="0"/>
+                <a:cs typeface="Arial" charset="0"/>
+              </a:defRPr>
+            </a:lvl9pPr>
+          </a:lstStyle>
+          <a:p>
+            <a:pPr eaLnBrk="1" hangingPunct="1">
               <a:spcBef>
                 <a:spcPct val="50000"/>
               </a:spcBef>
+              <a:defRPr/>
             </a:pPr>
             <a:r>
-              <a:rPr lang="en-US">
-                <a:latin typeface="Calibri" pitchFamily="34" charset="0"/>
+              <a:rPr lang="en-US" dirty="0" smtClean="0">
+                <a:latin typeface="Calibri" charset="0"/>
               </a:rPr>
               <a:t>I/O service provider</a:t>
             </a:r>
@@ -4651,7 +5821,7 @@
       </p:sp>
       <p:sp>
         <p:nvSpPr>
-          <p:cNvPr id="6163" name="Text Box 22"/>
+          <p:cNvPr id="66" name="Text Box 22"/>
           <p:cNvSpPr txBox="1">
             <a:spLocks noChangeArrowheads="1"/>
           </p:cNvSpPr>
@@ -4659,7 +5829,7 @@
         </p:nvSpPr>
         <p:spPr bwMode="auto">
           <a:xfrm>
-            <a:off x="7924800" y="5210175"/>
+            <a:off x="7924800" y="5257800"/>
             <a:ext cx="838200" cy="376238"/>
           </a:xfrm>
           <a:prstGeom prst="rect">
@@ -4676,21 +5846,144 @@
             <a:headEnd/>
             <a:tailEnd/>
           </a:ln>
+          <a:scene3d>
+            <a:camera prst="orthographicFront"/>
+            <a:lightRig rig="threePt" dir="t"/>
+          </a:scene3d>
+          <a:sp3d>
+            <a:bevelT prst="relaxedInset"/>
+          </a:sp3d>
         </p:spPr>
         <p:txBody>
           <a:bodyPr>
             <a:spAutoFit/>
           </a:bodyPr>
-          <a:lstStyle/>
-          <a:p>
-            <a:pPr>
+          <a:lstStyle>
+            <a:lvl1pPr eaLnBrk="0" hangingPunct="0">
+              <a:defRPr>
+                <a:solidFill>
+                  <a:schemeClr val="tx1"/>
+                </a:solidFill>
+                <a:latin typeface="Arial" charset="0"/>
+                <a:ea typeface="ＭＳ Ｐゴシック" charset="0"/>
+                <a:cs typeface="Arial" charset="0"/>
+              </a:defRPr>
+            </a:lvl1pPr>
+            <a:lvl2pPr marL="742950" indent="-285750" eaLnBrk="0" hangingPunct="0">
+              <a:defRPr>
+                <a:solidFill>
+                  <a:schemeClr val="tx1"/>
+                </a:solidFill>
+                <a:latin typeface="Arial" charset="0"/>
+                <a:ea typeface="Arial" charset="0"/>
+                <a:cs typeface="Arial" charset="0"/>
+              </a:defRPr>
+            </a:lvl2pPr>
+            <a:lvl3pPr marL="1143000" indent="-228600" eaLnBrk="0" hangingPunct="0">
+              <a:defRPr>
+                <a:solidFill>
+                  <a:schemeClr val="tx1"/>
+                </a:solidFill>
+                <a:latin typeface="Arial" charset="0"/>
+                <a:ea typeface="Arial" charset="0"/>
+                <a:cs typeface="Arial" charset="0"/>
+              </a:defRPr>
+            </a:lvl3pPr>
+            <a:lvl4pPr marL="1600200" indent="-228600" eaLnBrk="0" hangingPunct="0">
+              <a:defRPr>
+                <a:solidFill>
+                  <a:schemeClr val="tx1"/>
+                </a:solidFill>
+                <a:latin typeface="Arial" charset="0"/>
+                <a:ea typeface="Arial" charset="0"/>
+                <a:cs typeface="Arial" charset="0"/>
+              </a:defRPr>
+            </a:lvl4pPr>
+            <a:lvl5pPr marL="2057400" indent="-228600" eaLnBrk="0" hangingPunct="0">
+              <a:defRPr>
+                <a:solidFill>
+                  <a:schemeClr val="tx1"/>
+                </a:solidFill>
+                <a:latin typeface="Arial" charset="0"/>
+                <a:ea typeface="Arial" charset="0"/>
+                <a:cs typeface="Arial" charset="0"/>
+              </a:defRPr>
+            </a:lvl5pPr>
+            <a:lvl6pPr marL="2514600" indent="-228600" eaLnBrk="0" fontAlgn="base" hangingPunct="0">
+              <a:spcBef>
+                <a:spcPct val="0"/>
+              </a:spcBef>
+              <a:spcAft>
+                <a:spcPct val="0"/>
+              </a:spcAft>
+              <a:defRPr>
+                <a:solidFill>
+                  <a:schemeClr val="tx1"/>
+                </a:solidFill>
+                <a:latin typeface="Arial" charset="0"/>
+                <a:ea typeface="Arial" charset="0"/>
+                <a:cs typeface="Arial" charset="0"/>
+              </a:defRPr>
+            </a:lvl6pPr>
+            <a:lvl7pPr marL="2971800" indent="-228600" eaLnBrk="0" fontAlgn="base" hangingPunct="0">
+              <a:spcBef>
+                <a:spcPct val="0"/>
+              </a:spcBef>
+              <a:spcAft>
+                <a:spcPct val="0"/>
+              </a:spcAft>
+              <a:defRPr>
+                <a:solidFill>
+                  <a:schemeClr val="tx1"/>
+                </a:solidFill>
+                <a:latin typeface="Arial" charset="0"/>
+                <a:ea typeface="Arial" charset="0"/>
+                <a:cs typeface="Arial" charset="0"/>
+              </a:defRPr>
+            </a:lvl7pPr>
+            <a:lvl8pPr marL="3429000" indent="-228600" eaLnBrk="0" fontAlgn="base" hangingPunct="0">
+              <a:spcBef>
+                <a:spcPct val="0"/>
+              </a:spcBef>
+              <a:spcAft>
+                <a:spcPct val="0"/>
+              </a:spcAft>
+              <a:defRPr>
+                <a:solidFill>
+                  <a:schemeClr val="tx1"/>
+                </a:solidFill>
+                <a:latin typeface="Arial" charset="0"/>
+                <a:ea typeface="Arial" charset="0"/>
+                <a:cs typeface="Arial" charset="0"/>
+              </a:defRPr>
+            </a:lvl8pPr>
+            <a:lvl9pPr marL="3886200" indent="-228600" eaLnBrk="0" fontAlgn="base" hangingPunct="0">
+              <a:spcBef>
+                <a:spcPct val="0"/>
+              </a:spcBef>
+              <a:spcAft>
+                <a:spcPct val="0"/>
+              </a:spcAft>
+              <a:defRPr>
+                <a:solidFill>
+                  <a:schemeClr val="tx1"/>
+                </a:solidFill>
+                <a:latin typeface="Arial" charset="0"/>
+                <a:ea typeface="Arial" charset="0"/>
+                <a:cs typeface="Arial" charset="0"/>
+              </a:defRPr>
+            </a:lvl9pPr>
+          </a:lstStyle>
+          <a:p>
+            <a:pPr eaLnBrk="1" hangingPunct="1">
               <a:spcBef>
                 <a:spcPct val="50000"/>
               </a:spcBef>
+              <a:defRPr/>
             </a:pPr>
             <a:r>
-              <a:rPr lang="en-US">
-                <a:latin typeface="Calibri" pitchFamily="34" charset="0"/>
+              <a:rPr lang="en-US" dirty="0" smtClean="0">
+                <a:latin typeface="Calibri" charset="0"/>
               </a:rPr>
               <a:t>GRIB</a:t>
             </a:r>
@@ -4699,7 +5992,7 @@
       </p:sp>
       <p:sp>
         <p:nvSpPr>
-          <p:cNvPr id="6164" name="Text Box 23"/>
+          <p:cNvPr id="67" name="Text Box 23"/>
           <p:cNvSpPr txBox="1">
             <a:spLocks noChangeArrowheads="1"/>
           </p:cNvSpPr>
@@ -4724,21 +6017,144 @@
             <a:headEnd/>
             <a:tailEnd/>
           </a:ln>
+          <a:scene3d>
+            <a:camera prst="orthographicFront"/>
+            <a:lightRig rig="threePt" dir="t"/>
+          </a:scene3d>
+          <a:sp3d>
+            <a:bevelT prst="relaxedInset"/>
+          </a:sp3d>
         </p:spPr>
         <p:txBody>
           <a:bodyPr>
             <a:spAutoFit/>
           </a:bodyPr>
-          <a:lstStyle/>
-          <a:p>
-            <a:pPr>
+          <a:lstStyle>
+            <a:lvl1pPr eaLnBrk="0" hangingPunct="0">
+              <a:defRPr>
+                <a:solidFill>
+                  <a:schemeClr val="tx1"/>
+                </a:solidFill>
+                <a:latin typeface="Arial" charset="0"/>
+                <a:ea typeface="ＭＳ Ｐゴシック" charset="0"/>
+                <a:cs typeface="Arial" charset="0"/>
+              </a:defRPr>
+            </a:lvl1pPr>
+            <a:lvl2pPr marL="742950" indent="-285750" eaLnBrk="0" hangingPunct="0">
+              <a:defRPr>
+                <a:solidFill>
+                  <a:schemeClr val="tx1"/>
+                </a:solidFill>
+                <a:latin typeface="Arial" charset="0"/>
+                <a:ea typeface="Arial" charset="0"/>
+                <a:cs typeface="Arial" charset="0"/>
+              </a:defRPr>
+            </a:lvl2pPr>
+            <a:lvl3pPr marL="1143000" indent="-228600" eaLnBrk="0" hangingPunct="0">
+              <a:defRPr>
+                <a:solidFill>
+                  <a:schemeClr val="tx1"/>
+                </a:solidFill>
+                <a:latin typeface="Arial" charset="0"/>
+                <a:ea typeface="Arial" charset="0"/>
+                <a:cs typeface="Arial" charset="0"/>
+              </a:defRPr>
+            </a:lvl3pPr>
+            <a:lvl4pPr marL="1600200" indent="-228600" eaLnBrk="0" hangingPunct="0">
+              <a:defRPr>
+                <a:solidFill>
+                  <a:schemeClr val="tx1"/>
+                </a:solidFill>
+                <a:latin typeface="Arial" charset="0"/>
+                <a:ea typeface="Arial" charset="0"/>
+                <a:cs typeface="Arial" charset="0"/>
+              </a:defRPr>
+            </a:lvl4pPr>
+            <a:lvl5pPr marL="2057400" indent="-228600" eaLnBrk="0" hangingPunct="0">
+              <a:defRPr>
+                <a:solidFill>
+                  <a:schemeClr val="tx1"/>
+                </a:solidFill>
+                <a:latin typeface="Arial" charset="0"/>
+                <a:ea typeface="Arial" charset="0"/>
+                <a:cs typeface="Arial" charset="0"/>
+              </a:defRPr>
+            </a:lvl5pPr>
+            <a:lvl6pPr marL="2514600" indent="-228600" eaLnBrk="0" fontAlgn="base" hangingPunct="0">
+              <a:spcBef>
+                <a:spcPct val="0"/>
+              </a:spcBef>
+              <a:spcAft>
+                <a:spcPct val="0"/>
+              </a:spcAft>
+              <a:defRPr>
+                <a:solidFill>
+                  <a:schemeClr val="tx1"/>
+                </a:solidFill>
+                <a:latin typeface="Arial" charset="0"/>
+                <a:ea typeface="Arial" charset="0"/>
+                <a:cs typeface="Arial" charset="0"/>
+              </a:defRPr>
+            </a:lvl6pPr>
+            <a:lvl7pPr marL="2971800" indent="-228600" eaLnBrk="0" fontAlgn="base" hangingPunct="0">
+              <a:spcBef>
+                <a:spcPct val="0"/>
+              </a:spcBef>
+              <a:spcAft>
+                <a:spcPct val="0"/>
+              </a:spcAft>
+              <a:defRPr>
+                <a:solidFill>
+                  <a:schemeClr val="tx1"/>
+                </a:solidFill>
+                <a:latin typeface="Arial" charset="0"/>
+                <a:ea typeface="Arial" charset="0"/>
+                <a:cs typeface="Arial" charset="0"/>
+              </a:defRPr>
+            </a:lvl7pPr>
+            <a:lvl8pPr marL="3429000" indent="-228600" eaLnBrk="0" fontAlgn="base" hangingPunct="0">
+              <a:spcBef>
+                <a:spcPct val="0"/>
+              </a:spcBef>
+              <a:spcAft>
+                <a:spcPct val="0"/>
+              </a:spcAft>
+              <a:defRPr>
+                <a:solidFill>
+                  <a:schemeClr val="tx1"/>
+                </a:solidFill>
+                <a:latin typeface="Arial" charset="0"/>
+                <a:ea typeface="Arial" charset="0"/>
+                <a:cs typeface="Arial" charset="0"/>
+              </a:defRPr>
+            </a:lvl8pPr>
+            <a:lvl9pPr marL="3886200" indent="-228600" eaLnBrk="0" fontAlgn="base" hangingPunct="0">
+              <a:spcBef>
+                <a:spcPct val="0"/>
+              </a:spcBef>
+              <a:spcAft>
+                <a:spcPct val="0"/>
+              </a:spcAft>
+              <a:defRPr>
+                <a:solidFill>
+                  <a:schemeClr val="tx1"/>
+                </a:solidFill>
+                <a:latin typeface="Arial" charset="0"/>
+                <a:ea typeface="Arial" charset="0"/>
+                <a:cs typeface="Arial" charset="0"/>
+              </a:defRPr>
+            </a:lvl9pPr>
+          </a:lstStyle>
+          <a:p>
+            <a:pPr eaLnBrk="1" hangingPunct="1">
               <a:spcBef>
                 <a:spcPct val="50000"/>
               </a:spcBef>
+              <a:defRPr/>
             </a:pPr>
             <a:r>
-              <a:rPr lang="en-US">
-                <a:latin typeface="Calibri" pitchFamily="34" charset="0"/>
+              <a:rPr lang="en-US" smtClean="0">
+                <a:latin typeface="Calibri" charset="0"/>
               </a:rPr>
               <a:t>GINI</a:t>
             </a:r>
@@ -4747,7 +6163,7 @@
       </p:sp>
       <p:sp>
         <p:nvSpPr>
-          <p:cNvPr id="6165" name="Text Box 24"/>
+          <p:cNvPr id="68" name="Text Box 24"/>
           <p:cNvSpPr txBox="1">
             <a:spLocks noChangeArrowheads="1"/>
           </p:cNvSpPr>
@@ -4755,7 +6171,7 @@
         </p:nvSpPr>
         <p:spPr bwMode="auto">
           <a:xfrm>
-            <a:off x="7924800" y="4676775"/>
+            <a:off x="7924800" y="4729162"/>
             <a:ext cx="838200" cy="376238"/>
           </a:xfrm>
           <a:prstGeom prst="rect">
@@ -4772,21 +6188,144 @@
             <a:headEnd/>
             <a:tailEnd/>
           </a:ln>
+          <a:scene3d>
+            <a:camera prst="orthographicFront"/>
+            <a:lightRig rig="threePt" dir="t"/>
+          </a:scene3d>
+          <a:sp3d>
+            <a:bevelT prst="relaxedInset"/>
+          </a:sp3d>
         </p:spPr>
         <p:txBody>
           <a:bodyPr>
             <a:spAutoFit/>
           </a:bodyPr>
-          <a:lstStyle/>
-          <a:p>
-            <a:pPr>
+          <a:lstStyle>
+            <a:lvl1pPr eaLnBrk="0" hangingPunct="0">
+              <a:defRPr>
+                <a:solidFill>
+                  <a:schemeClr val="tx1"/>
+                </a:solidFill>
+                <a:latin typeface="Arial" charset="0"/>
+                <a:ea typeface="ＭＳ Ｐゴシック" charset="0"/>
+                <a:cs typeface="Arial" charset="0"/>
+              </a:defRPr>
+            </a:lvl1pPr>
+            <a:lvl2pPr marL="742950" indent="-285750" eaLnBrk="0" hangingPunct="0">
+              <a:defRPr>
+                <a:solidFill>
+                  <a:schemeClr val="tx1"/>
+                </a:solidFill>
+                <a:latin typeface="Arial" charset="0"/>
+                <a:ea typeface="Arial" charset="0"/>
+                <a:cs typeface="Arial" charset="0"/>
+              </a:defRPr>
+            </a:lvl2pPr>
+            <a:lvl3pPr marL="1143000" indent="-228600" eaLnBrk="0" hangingPunct="0">
+              <a:defRPr>
+                <a:solidFill>
+                  <a:schemeClr val="tx1"/>
+                </a:solidFill>
+                <a:latin typeface="Arial" charset="0"/>
+                <a:ea typeface="Arial" charset="0"/>
+                <a:cs typeface="Arial" charset="0"/>
+              </a:defRPr>
+            </a:lvl3pPr>
+            <a:lvl4pPr marL="1600200" indent="-228600" eaLnBrk="0" hangingPunct="0">
+              <a:defRPr>
+                <a:solidFill>
+                  <a:schemeClr val="tx1"/>
+                </a:solidFill>
+                <a:latin typeface="Arial" charset="0"/>
+                <a:ea typeface="Arial" charset="0"/>
+                <a:cs typeface="Arial" charset="0"/>
+              </a:defRPr>
+            </a:lvl4pPr>
+            <a:lvl5pPr marL="2057400" indent="-228600" eaLnBrk="0" hangingPunct="0">
+              <a:defRPr>
+                <a:solidFill>
+                  <a:schemeClr val="tx1"/>
+                </a:solidFill>
+                <a:latin typeface="Arial" charset="0"/>
+                <a:ea typeface="Arial" charset="0"/>
+                <a:cs typeface="Arial" charset="0"/>
+              </a:defRPr>
+            </a:lvl5pPr>
+            <a:lvl6pPr marL="2514600" indent="-228600" eaLnBrk="0" fontAlgn="base" hangingPunct="0">
+              <a:spcBef>
+                <a:spcPct val="0"/>
+              </a:spcBef>
+              <a:spcAft>
+                <a:spcPct val="0"/>
+              </a:spcAft>
+              <a:defRPr>
+                <a:solidFill>
+                  <a:schemeClr val="tx1"/>
+                </a:solidFill>
+                <a:latin typeface="Arial" charset="0"/>
+                <a:ea typeface="Arial" charset="0"/>
+                <a:cs typeface="Arial" charset="0"/>
+              </a:defRPr>
+            </a:lvl6pPr>
+            <a:lvl7pPr marL="2971800" indent="-228600" eaLnBrk="0" fontAlgn="base" hangingPunct="0">
+              <a:spcBef>
+                <a:spcPct val="0"/>
+              </a:spcBef>
+              <a:spcAft>
+                <a:spcPct val="0"/>
+              </a:spcAft>
+              <a:defRPr>
+                <a:solidFill>
+                  <a:schemeClr val="tx1"/>
+                </a:solidFill>
+                <a:latin typeface="Arial" charset="0"/>
+                <a:ea typeface="Arial" charset="0"/>
+                <a:cs typeface="Arial" charset="0"/>
+              </a:defRPr>
+            </a:lvl7pPr>
+            <a:lvl8pPr marL="3429000" indent="-228600" eaLnBrk="0" fontAlgn="base" hangingPunct="0">
+              <a:spcBef>
+                <a:spcPct val="0"/>
+              </a:spcBef>
+              <a:spcAft>
+                <a:spcPct val="0"/>
+              </a:spcAft>
+              <a:defRPr>
+                <a:solidFill>
+                  <a:schemeClr val="tx1"/>
+                </a:solidFill>
+                <a:latin typeface="Arial" charset="0"/>
+                <a:ea typeface="Arial" charset="0"/>
+                <a:cs typeface="Arial" charset="0"/>
+              </a:defRPr>
+            </a:lvl8pPr>
+            <a:lvl9pPr marL="3886200" indent="-228600" eaLnBrk="0" fontAlgn="base" hangingPunct="0">
+              <a:spcBef>
+                <a:spcPct val="0"/>
+              </a:spcBef>
+              <a:spcAft>
+                <a:spcPct val="0"/>
+              </a:spcAft>
+              <a:defRPr>
+                <a:solidFill>
+                  <a:schemeClr val="tx1"/>
+                </a:solidFill>
+                <a:latin typeface="Arial" charset="0"/>
+                <a:ea typeface="Arial" charset="0"/>
+                <a:cs typeface="Arial" charset="0"/>
+              </a:defRPr>
+            </a:lvl9pPr>
+          </a:lstStyle>
+          <a:p>
+            <a:pPr eaLnBrk="1" hangingPunct="1">
               <a:spcBef>
                 <a:spcPct val="50000"/>
               </a:spcBef>
+              <a:defRPr/>
             </a:pPr>
             <a:r>
-              <a:rPr lang="en-US">
-                <a:latin typeface="Calibri" pitchFamily="34" charset="0"/>
+              <a:rPr lang="en-US" dirty="0" smtClean="0">
+                <a:latin typeface="Calibri" charset="0"/>
               </a:rPr>
               <a:t>NIDS</a:t>
             </a:r>
@@ -4795,18 +6334,16 @@
       </p:sp>
       <p:cxnSp>
         <p:nvCxnSpPr>
-          <p:cNvPr id="6166" name="AutoShape 25"/>
+          <p:cNvPr id="69" name="AutoShape 25"/>
           <p:cNvCxnSpPr>
             <a:cxnSpLocks noChangeShapeType="1"/>
-            <a:stCxn id="6162" idx="2"/>
-            <a:endCxn id="6163" idx="1"/>
           </p:cNvCxnSpPr>
           <p:nvPr/>
         </p:nvCxnSpPr>
         <p:spPr bwMode="auto">
           <a:xfrm rot="16200000" flipH="1">
-            <a:off x="7199312" y="4673601"/>
-            <a:ext cx="879475" cy="571500"/>
+            <a:off x="7175500" y="4697413"/>
+            <a:ext cx="927100" cy="571500"/>
           </a:xfrm>
           <a:prstGeom prst="bentConnector2">
             <a:avLst/>
@@ -4820,15 +6357,20 @@
             <a:headEnd/>
             <a:tailEnd type="triangle" w="med" len="med"/>
           </a:ln>
+          <a:extLst>
+            <a:ext uri="{909E8E84-426E-40dd-AFC4-6F175D3DCCD1}">
+              <a14:hiddenFill xmlns:a14="http://schemas.microsoft.com/office/drawing/2010/main">
+                <a:noFill/>
+              </a14:hiddenFill>
+            </a:ext>
+          </a:extLst>
         </p:spPr>
       </p:cxnSp>
       <p:cxnSp>
         <p:nvCxnSpPr>
-          <p:cNvPr id="6167" name="AutoShape 26"/>
+          <p:cNvPr id="70" name="AutoShape 26"/>
           <p:cNvCxnSpPr>
             <a:cxnSpLocks noChangeShapeType="1"/>
-            <a:stCxn id="6162" idx="2"/>
-            <a:endCxn id="6164" idx="1"/>
           </p:cNvCxnSpPr>
           <p:nvPr/>
         </p:nvCxnSpPr>
@@ -4849,22 +6391,27 @@
             <a:headEnd/>
             <a:tailEnd type="triangle" w="med" len="med"/>
           </a:ln>
+          <a:extLst>
+            <a:ext uri="{909E8E84-426E-40dd-AFC4-6F175D3DCCD1}">
+              <a14:hiddenFill xmlns:a14="http://schemas.microsoft.com/office/drawing/2010/main">
+                <a:noFill/>
+              </a14:hiddenFill>
+            </a:ext>
+          </a:extLst>
         </p:spPr>
       </p:cxnSp>
       <p:cxnSp>
         <p:nvCxnSpPr>
-          <p:cNvPr id="6168" name="AutoShape 27"/>
+          <p:cNvPr id="71" name="AutoShape 27"/>
           <p:cNvCxnSpPr>
             <a:cxnSpLocks noChangeShapeType="1"/>
-            <a:stCxn id="6162" idx="2"/>
-            <a:endCxn id="6165" idx="1"/>
           </p:cNvCxnSpPr>
           <p:nvPr/>
         </p:nvCxnSpPr>
         <p:spPr bwMode="auto">
           <a:xfrm rot="16200000" flipH="1">
-            <a:off x="7466012" y="4406901"/>
-            <a:ext cx="346075" cy="571500"/>
+            <a:off x="7440612" y="4432301"/>
+            <a:ext cx="396875" cy="571500"/>
           </a:xfrm>
           <a:prstGeom prst="bentConnector2">
             <a:avLst/>
@@ -4878,11 +6425,18 @@
             <a:headEnd/>
             <a:tailEnd type="triangle" w="med" len="med"/>
           </a:ln>
+          <a:extLst>
+            <a:ext uri="{909E8E84-426E-40dd-AFC4-6F175D3DCCD1}">
+              <a14:hiddenFill xmlns:a14="http://schemas.microsoft.com/office/drawing/2010/main">
+                <a:noFill/>
+              </a14:hiddenFill>
+            </a:ext>
+          </a:extLst>
         </p:spPr>
       </p:cxnSp>
       <p:sp>
         <p:nvSpPr>
-          <p:cNvPr id="6169" name="Text Box 28"/>
+          <p:cNvPr id="72" name="Text Box 28"/>
           <p:cNvSpPr txBox="1">
             <a:spLocks noChangeArrowheads="1"/>
           </p:cNvSpPr>
@@ -4897,7 +6451,7 @@
             <a:avLst/>
           </a:prstGeom>
           <a:solidFill>
-            <a:srgbClr val="FFFF99"/>
+            <a:srgbClr val="FFFF00"/>
           </a:solidFill>
           <a:ln w="9525">
             <a:solidFill>
@@ -4907,21 +6461,144 @@
             <a:headEnd/>
             <a:tailEnd/>
           </a:ln>
+          <a:scene3d>
+            <a:camera prst="orthographicFront"/>
+            <a:lightRig rig="threePt" dir="t"/>
+          </a:scene3d>
+          <a:sp3d>
+            <a:bevelT w="114300" prst="hardEdge"/>
+          </a:sp3d>
         </p:spPr>
         <p:txBody>
           <a:bodyPr>
             <a:spAutoFit/>
           </a:bodyPr>
-          <a:lstStyle/>
-          <a:p>
-            <a:pPr algn="ctr">
+          <a:lstStyle>
+            <a:lvl1pPr eaLnBrk="0" hangingPunct="0">
+              <a:defRPr>
+                <a:solidFill>
+                  <a:schemeClr val="tx1"/>
+                </a:solidFill>
+                <a:latin typeface="Arial" charset="0"/>
+                <a:ea typeface="ＭＳ Ｐゴシック" charset="0"/>
+                <a:cs typeface="Arial" charset="0"/>
+              </a:defRPr>
+            </a:lvl1pPr>
+            <a:lvl2pPr marL="742950" indent="-285750" eaLnBrk="0" hangingPunct="0">
+              <a:defRPr>
+                <a:solidFill>
+                  <a:schemeClr val="tx1"/>
+                </a:solidFill>
+                <a:latin typeface="Arial" charset="0"/>
+                <a:ea typeface="Arial" charset="0"/>
+                <a:cs typeface="Arial" charset="0"/>
+              </a:defRPr>
+            </a:lvl2pPr>
+            <a:lvl3pPr marL="1143000" indent="-228600" eaLnBrk="0" hangingPunct="0">
+              <a:defRPr>
+                <a:solidFill>
+                  <a:schemeClr val="tx1"/>
+                </a:solidFill>
+                <a:latin typeface="Arial" charset="0"/>
+                <a:ea typeface="Arial" charset="0"/>
+                <a:cs typeface="Arial" charset="0"/>
+              </a:defRPr>
+            </a:lvl3pPr>
+            <a:lvl4pPr marL="1600200" indent="-228600" eaLnBrk="0" hangingPunct="0">
+              <a:defRPr>
+                <a:solidFill>
+                  <a:schemeClr val="tx1"/>
+                </a:solidFill>
+                <a:latin typeface="Arial" charset="0"/>
+                <a:ea typeface="Arial" charset="0"/>
+                <a:cs typeface="Arial" charset="0"/>
+              </a:defRPr>
+            </a:lvl4pPr>
+            <a:lvl5pPr marL="2057400" indent="-228600" eaLnBrk="0" hangingPunct="0">
+              <a:defRPr>
+                <a:solidFill>
+                  <a:schemeClr val="tx1"/>
+                </a:solidFill>
+                <a:latin typeface="Arial" charset="0"/>
+                <a:ea typeface="Arial" charset="0"/>
+                <a:cs typeface="Arial" charset="0"/>
+              </a:defRPr>
+            </a:lvl5pPr>
+            <a:lvl6pPr marL="2514600" indent="-228600" eaLnBrk="0" fontAlgn="base" hangingPunct="0">
+              <a:spcBef>
+                <a:spcPct val="0"/>
+              </a:spcBef>
+              <a:spcAft>
+                <a:spcPct val="0"/>
+              </a:spcAft>
+              <a:defRPr>
+                <a:solidFill>
+                  <a:schemeClr val="tx1"/>
+                </a:solidFill>
+                <a:latin typeface="Arial" charset="0"/>
+                <a:ea typeface="Arial" charset="0"/>
+                <a:cs typeface="Arial" charset="0"/>
+              </a:defRPr>
+            </a:lvl6pPr>
+            <a:lvl7pPr marL="2971800" indent="-228600" eaLnBrk="0" fontAlgn="base" hangingPunct="0">
+              <a:spcBef>
+                <a:spcPct val="0"/>
+              </a:spcBef>
+              <a:spcAft>
+                <a:spcPct val="0"/>
+              </a:spcAft>
+              <a:defRPr>
+                <a:solidFill>
+                  <a:schemeClr val="tx1"/>
+                </a:solidFill>
+                <a:latin typeface="Arial" charset="0"/>
+                <a:ea typeface="Arial" charset="0"/>
+                <a:cs typeface="Arial" charset="0"/>
+              </a:defRPr>
+            </a:lvl7pPr>
+            <a:lvl8pPr marL="3429000" indent="-228600" eaLnBrk="0" fontAlgn="base" hangingPunct="0">
+              <a:spcBef>
+                <a:spcPct val="0"/>
+              </a:spcBef>
+              <a:spcAft>
+                <a:spcPct val="0"/>
+              </a:spcAft>
+              <a:defRPr>
+                <a:solidFill>
+                  <a:schemeClr val="tx1"/>
+                </a:solidFill>
+                <a:latin typeface="Arial" charset="0"/>
+                <a:ea typeface="Arial" charset="0"/>
+                <a:cs typeface="Arial" charset="0"/>
+              </a:defRPr>
+            </a:lvl8pPr>
+            <a:lvl9pPr marL="3886200" indent="-228600" eaLnBrk="0" fontAlgn="base" hangingPunct="0">
+              <a:spcBef>
+                <a:spcPct val="0"/>
+              </a:spcBef>
+              <a:spcAft>
+                <a:spcPct val="0"/>
+              </a:spcAft>
+              <a:defRPr>
+                <a:solidFill>
+                  <a:schemeClr val="tx1"/>
+                </a:solidFill>
+                <a:latin typeface="Arial" charset="0"/>
+                <a:ea typeface="Arial" charset="0"/>
+                <a:cs typeface="Arial" charset="0"/>
+              </a:defRPr>
+            </a:lvl9pPr>
+          </a:lstStyle>
+          <a:p>
+            <a:pPr algn="ctr" eaLnBrk="1" hangingPunct="1">
               <a:spcBef>
                 <a:spcPct val="50000"/>
               </a:spcBef>
+              <a:defRPr/>
             </a:pPr>
             <a:r>
-              <a:rPr lang="en-US">
-                <a:latin typeface="Calibri" pitchFamily="34" charset="0"/>
+              <a:rPr lang="en-US" smtClean="0">
+                <a:latin typeface="Calibri" charset="0"/>
               </a:rPr>
               <a:t>NetcdfFile</a:t>
             </a:r>
@@ -4930,7 +6607,7 @@
       </p:sp>
       <p:sp>
         <p:nvSpPr>
-          <p:cNvPr id="6170" name="Line 29"/>
+          <p:cNvPr id="73" name="Line 29"/>
           <p:cNvSpPr>
             <a:spLocks noChangeShapeType="1"/>
           </p:cNvSpPr>
@@ -4953,6 +6630,13 @@
             <a:headEnd/>
             <a:tailEnd type="triangle" w="med" len="med"/>
           </a:ln>
+          <a:extLst>
+            <a:ext uri="{909E8E84-426E-40dd-AFC4-6F175D3DCCD1}">
+              <a14:hiddenFill xmlns:a14="http://schemas.microsoft.com/office/drawing/2010/main">
+                <a:noFill/>
+              </a14:hiddenFill>
+            </a:ext>
+          </a:extLst>
         </p:spPr>
         <p:txBody>
           <a:bodyPr/>
@@ -4964,7 +6648,7 @@
       </p:sp>
       <p:sp>
         <p:nvSpPr>
-          <p:cNvPr id="6171" name="Text Box 30"/>
+          <p:cNvPr id="74" name="Text Box 30"/>
           <p:cNvSpPr txBox="1">
             <a:spLocks noChangeArrowheads="1"/>
           </p:cNvSpPr>
@@ -4972,138 +6656,180 @@
         </p:nvSpPr>
         <p:spPr bwMode="auto">
           <a:xfrm>
-            <a:off x="5257800" y="5210175"/>
+            <a:off x="5562600" y="5253037"/>
             <a:ext cx="1295400" cy="385763"/>
           </a:xfrm>
           <a:prstGeom prst="rect">
             <a:avLst/>
           </a:prstGeom>
-          <a:gradFill rotWithShape="1">
-            <a:gsLst>
-              <a:gs pos="0">
-                <a:srgbClr val="76475E"/>
-              </a:gs>
-              <a:gs pos="50000">
-                <a:srgbClr val="FF99CC"/>
-              </a:gs>
-              <a:gs pos="100000">
-                <a:srgbClr val="76475E"/>
-              </a:gs>
-            </a:gsLst>
-            <a:lin ang="5400000" scaled="1"/>
-          </a:gradFill>
-          <a:ln w="19050">
+          <a:solidFill>
+            <a:srgbClr val="FF99CC"/>
+          </a:solidFill>
+          <a:ln w="9525">
             <a:solidFill>
               <a:schemeClr val="tx1"/>
             </a:solidFill>
-            <a:prstDash val="dash"/>
+            <a:prstDash val="solid"/>
             <a:miter lim="800000"/>
             <a:headEnd/>
             <a:tailEnd/>
           </a:ln>
+          <a:scene3d>
+            <a:camera prst="orthographicFront"/>
+            <a:lightRig rig="threePt" dir="t"/>
+          </a:scene3d>
+          <a:sp3d>
+            <a:bevelT prst="relaxedInset"/>
+          </a:sp3d>
         </p:spPr>
         <p:txBody>
           <a:bodyPr>
             <a:spAutoFit/>
           </a:bodyPr>
-          <a:lstStyle/>
-          <a:p>
-            <a:pPr>
+          <a:lstStyle>
+            <a:lvl1pPr eaLnBrk="0" hangingPunct="0">
+              <a:defRPr>
+                <a:solidFill>
+                  <a:schemeClr val="tx1"/>
+                </a:solidFill>
+                <a:latin typeface="Arial" charset="0"/>
+                <a:ea typeface="ＭＳ Ｐゴシック" charset="0"/>
+                <a:cs typeface="Arial" charset="0"/>
+              </a:defRPr>
+            </a:lvl1pPr>
+            <a:lvl2pPr marL="742950" indent="-285750" eaLnBrk="0" hangingPunct="0">
+              <a:defRPr>
+                <a:solidFill>
+                  <a:schemeClr val="tx1"/>
+                </a:solidFill>
+                <a:latin typeface="Arial" charset="0"/>
+                <a:ea typeface="Arial" charset="0"/>
+                <a:cs typeface="Arial" charset="0"/>
+              </a:defRPr>
+            </a:lvl2pPr>
+            <a:lvl3pPr marL="1143000" indent="-228600" eaLnBrk="0" hangingPunct="0">
+              <a:defRPr>
+                <a:solidFill>
+                  <a:schemeClr val="tx1"/>
+                </a:solidFill>
+                <a:latin typeface="Arial" charset="0"/>
+                <a:ea typeface="Arial" charset="0"/>
+                <a:cs typeface="Arial" charset="0"/>
+              </a:defRPr>
+            </a:lvl3pPr>
+            <a:lvl4pPr marL="1600200" indent="-228600" eaLnBrk="0" hangingPunct="0">
+              <a:defRPr>
+                <a:solidFill>
+                  <a:schemeClr val="tx1"/>
+                </a:solidFill>
+                <a:latin typeface="Arial" charset="0"/>
+                <a:ea typeface="Arial" charset="0"/>
+                <a:cs typeface="Arial" charset="0"/>
+              </a:defRPr>
+            </a:lvl4pPr>
+            <a:lvl5pPr marL="2057400" indent="-228600" eaLnBrk="0" hangingPunct="0">
+              <a:defRPr>
+                <a:solidFill>
+                  <a:schemeClr val="tx1"/>
+                </a:solidFill>
+                <a:latin typeface="Arial" charset="0"/>
+                <a:ea typeface="Arial" charset="0"/>
+                <a:cs typeface="Arial" charset="0"/>
+              </a:defRPr>
+            </a:lvl5pPr>
+            <a:lvl6pPr marL="2514600" indent="-228600" eaLnBrk="0" fontAlgn="base" hangingPunct="0">
+              <a:spcBef>
+                <a:spcPct val="0"/>
+              </a:spcBef>
+              <a:spcAft>
+                <a:spcPct val="0"/>
+              </a:spcAft>
+              <a:defRPr>
+                <a:solidFill>
+                  <a:schemeClr val="tx1"/>
+                </a:solidFill>
+                <a:latin typeface="Arial" charset="0"/>
+                <a:ea typeface="Arial" charset="0"/>
+                <a:cs typeface="Arial" charset="0"/>
+              </a:defRPr>
+            </a:lvl6pPr>
+            <a:lvl7pPr marL="2971800" indent="-228600" eaLnBrk="0" fontAlgn="base" hangingPunct="0">
+              <a:spcBef>
+                <a:spcPct val="0"/>
+              </a:spcBef>
+              <a:spcAft>
+                <a:spcPct val="0"/>
+              </a:spcAft>
+              <a:defRPr>
+                <a:solidFill>
+                  <a:schemeClr val="tx1"/>
+                </a:solidFill>
+                <a:latin typeface="Arial" charset="0"/>
+                <a:ea typeface="Arial" charset="0"/>
+                <a:cs typeface="Arial" charset="0"/>
+              </a:defRPr>
+            </a:lvl7pPr>
+            <a:lvl8pPr marL="3429000" indent="-228600" eaLnBrk="0" fontAlgn="base" hangingPunct="0">
+              <a:spcBef>
+                <a:spcPct val="0"/>
+              </a:spcBef>
+              <a:spcAft>
+                <a:spcPct val="0"/>
+              </a:spcAft>
+              <a:defRPr>
+                <a:solidFill>
+                  <a:schemeClr val="tx1"/>
+                </a:solidFill>
+                <a:latin typeface="Arial" charset="0"/>
+                <a:ea typeface="Arial" charset="0"/>
+                <a:cs typeface="Arial" charset="0"/>
+              </a:defRPr>
+            </a:lvl8pPr>
+            <a:lvl9pPr marL="3886200" indent="-228600" eaLnBrk="0" fontAlgn="base" hangingPunct="0">
+              <a:spcBef>
+                <a:spcPct val="0"/>
+              </a:spcBef>
+              <a:spcAft>
+                <a:spcPct val="0"/>
+              </a:spcAft>
+              <a:defRPr>
+                <a:solidFill>
+                  <a:schemeClr val="tx1"/>
+                </a:solidFill>
+                <a:latin typeface="Arial" charset="0"/>
+                <a:ea typeface="Arial" charset="0"/>
+                <a:cs typeface="Arial" charset="0"/>
+              </a:defRPr>
+            </a:lvl9pPr>
+          </a:lstStyle>
+          <a:p>
+            <a:pPr eaLnBrk="1" hangingPunct="1">
               <a:spcBef>
                 <a:spcPct val="50000"/>
               </a:spcBef>
+              <a:defRPr/>
             </a:pPr>
             <a:r>
-              <a:rPr lang="en-US">
-                <a:latin typeface="Calibri" pitchFamily="34" charset="0"/>
+              <a:rPr lang="en-US" dirty="0" smtClean="0">
+                <a:latin typeface="Calibri" charset="0"/>
               </a:rPr>
               <a:t>NetCDF-4</a:t>
             </a:r>
           </a:p>
         </p:txBody>
       </p:sp>
-      <p:sp>
-        <p:nvSpPr>
-          <p:cNvPr id="6172" name="Line 31"/>
-          <p:cNvSpPr>
-            <a:spLocks noChangeShapeType="1"/>
-          </p:cNvSpPr>
-          <p:nvPr/>
-        </p:nvSpPr>
-        <p:spPr bwMode="auto">
-          <a:xfrm flipH="1" flipV="1">
-            <a:off x="6553200" y="5438775"/>
-            <a:ext cx="762000" cy="0"/>
-          </a:xfrm>
-          <a:prstGeom prst="line">
-            <a:avLst/>
-          </a:prstGeom>
-          <a:noFill/>
-          <a:ln w="9525">
-            <a:solidFill>
-              <a:schemeClr val="tx1"/>
-            </a:solidFill>
-            <a:round/>
-            <a:headEnd/>
-            <a:tailEnd type="triangle" w="med" len="med"/>
-          </a:ln>
-        </p:spPr>
-        <p:txBody>
-          <a:bodyPr/>
-          <a:lstStyle/>
-          <a:p>
-            <a:endParaRPr lang="en-US"/>
-          </a:p>
-        </p:txBody>
-      </p:sp>
-      <p:sp>
-        <p:nvSpPr>
-          <p:cNvPr id="6173" name="Line 32"/>
-          <p:cNvSpPr>
-            <a:spLocks noChangeShapeType="1"/>
-          </p:cNvSpPr>
-          <p:nvPr/>
-        </p:nvSpPr>
-        <p:spPr bwMode="auto">
-          <a:xfrm flipH="1" flipV="1">
-            <a:off x="6781800" y="4829175"/>
-            <a:ext cx="533400" cy="0"/>
-          </a:xfrm>
-          <a:prstGeom prst="line">
-            <a:avLst/>
-          </a:prstGeom>
-          <a:noFill/>
-          <a:ln w="9525">
-            <a:solidFill>
-              <a:schemeClr val="tx1"/>
-            </a:solidFill>
-            <a:round/>
-            <a:headEnd/>
-            <a:tailEnd type="triangle" w="med" len="med"/>
-          </a:ln>
-        </p:spPr>
-        <p:txBody>
-          <a:bodyPr/>
-          <a:lstStyle/>
-          <a:p>
-            <a:endParaRPr lang="en-US"/>
-          </a:p>
-        </p:txBody>
-      </p:sp>
       <p:cxnSp>
         <p:nvCxnSpPr>
-          <p:cNvPr id="6174" name="AutoShape 33"/>
+          <p:cNvPr id="75" name="AutoShape 33"/>
           <p:cNvCxnSpPr>
             <a:cxnSpLocks noChangeShapeType="1"/>
-            <a:stCxn id="6162" idx="2"/>
-            <a:endCxn id="6178" idx="1"/>
           </p:cNvCxnSpPr>
           <p:nvPr/>
         </p:nvCxnSpPr>
         <p:spPr bwMode="auto">
           <a:xfrm rot="16200000" flipH="1">
-            <a:off x="6627812" y="5245101"/>
-            <a:ext cx="2022475" cy="571500"/>
+            <a:off x="6678612" y="5194301"/>
+            <a:ext cx="1920875" cy="571500"/>
           </a:xfrm>
           <a:prstGeom prst="bentConnector2">
             <a:avLst/>
@@ -5117,11 +6843,18 @@
             <a:headEnd/>
             <a:tailEnd type="triangle" w="med" len="med"/>
           </a:ln>
+          <a:extLst>
+            <a:ext uri="{909E8E84-426E-40dd-AFC4-6F175D3DCCD1}">
+              <a14:hiddenFill xmlns:a14="http://schemas.microsoft.com/office/drawing/2010/main">
+                <a:noFill/>
+              </a14:hiddenFill>
+            </a:ext>
+          </a:extLst>
         </p:spPr>
       </p:cxnSp>
       <p:sp>
         <p:nvSpPr>
-          <p:cNvPr id="6175" name="Text Box 34"/>
+          <p:cNvPr id="76" name="Text Box 36"/>
           <p:cNvSpPr txBox="1">
             <a:spLocks noChangeArrowheads="1"/>
           </p:cNvSpPr>
@@ -5129,80 +6862,7 @@
         </p:nvSpPr>
         <p:spPr bwMode="auto">
           <a:xfrm>
-            <a:off x="6324600" y="6491288"/>
-            <a:ext cx="1066800" cy="366712"/>
-          </a:xfrm>
-          <a:prstGeom prst="rect">
-            <a:avLst/>
-          </a:prstGeom>
-          <a:noFill/>
-          <a:ln w="9525">
-            <a:noFill/>
-            <a:miter lim="800000"/>
-            <a:headEnd/>
-            <a:tailEnd/>
-          </a:ln>
-        </p:spPr>
-        <p:txBody>
-          <a:bodyPr>
-            <a:spAutoFit/>
-          </a:bodyPr>
-          <a:lstStyle/>
-          <a:p>
-            <a:pPr algn="r">
-              <a:spcBef>
-                <a:spcPct val="50000"/>
-              </a:spcBef>
-            </a:pPr>
-            <a:r>
-              <a:rPr lang="en-US">
-                <a:latin typeface="Calibri" pitchFamily="34" charset="0"/>
-              </a:rPr>
-              <a:t>…</a:t>
-            </a:r>
-          </a:p>
-        </p:txBody>
-      </p:sp>
-      <p:cxnSp>
-        <p:nvCxnSpPr>
-          <p:cNvPr id="6176" name="AutoShape 35"/>
-          <p:cNvCxnSpPr>
-            <a:cxnSpLocks noChangeShapeType="1"/>
-            <a:stCxn id="6162" idx="2"/>
-            <a:endCxn id="6177" idx="3"/>
-          </p:cNvCxnSpPr>
-          <p:nvPr/>
-        </p:nvCxnSpPr>
-        <p:spPr bwMode="auto">
-          <a:xfrm rot="5400000">
-            <a:off x="6323012" y="5359401"/>
-            <a:ext cx="1870075" cy="190500"/>
-          </a:xfrm>
-          <a:prstGeom prst="bentConnector2">
-            <a:avLst/>
-          </a:prstGeom>
-          <a:noFill/>
-          <a:ln w="9525">
-            <a:solidFill>
-              <a:schemeClr val="tx1"/>
-            </a:solidFill>
-            <a:miter lim="800000"/>
-            <a:headEnd/>
-            <a:tailEnd type="triangle" w="med" len="med"/>
-          </a:ln>
-        </p:spPr>
-      </p:cxnSp>
-      <p:sp>
-        <p:nvSpPr>
-          <p:cNvPr id="6177" name="Text Box 36"/>
-          <p:cNvSpPr txBox="1">
-            <a:spLocks noChangeArrowheads="1"/>
-          </p:cNvSpPr>
-          <p:nvPr/>
-        </p:nvSpPr>
-        <p:spPr bwMode="auto">
-          <a:xfrm>
-            <a:off x="6019800" y="6200775"/>
+            <a:off x="5715000" y="6253162"/>
             <a:ext cx="1143000" cy="376238"/>
           </a:xfrm>
           <a:prstGeom prst="rect">
@@ -5219,21 +6879,144 @@
             <a:headEnd/>
             <a:tailEnd/>
           </a:ln>
+          <a:scene3d>
+            <a:camera prst="orthographicFront"/>
+            <a:lightRig rig="threePt" dir="t"/>
+          </a:scene3d>
+          <a:sp3d>
+            <a:bevelT prst="relaxedInset"/>
+          </a:sp3d>
         </p:spPr>
         <p:txBody>
           <a:bodyPr>
             <a:spAutoFit/>
           </a:bodyPr>
-          <a:lstStyle/>
-          <a:p>
-            <a:pPr>
+          <a:lstStyle>
+            <a:lvl1pPr eaLnBrk="0" hangingPunct="0">
+              <a:defRPr>
+                <a:solidFill>
+                  <a:schemeClr val="tx1"/>
+                </a:solidFill>
+                <a:latin typeface="Arial" charset="0"/>
+                <a:ea typeface="ＭＳ Ｐゴシック" charset="0"/>
+                <a:cs typeface="Arial" charset="0"/>
+              </a:defRPr>
+            </a:lvl1pPr>
+            <a:lvl2pPr marL="742950" indent="-285750" eaLnBrk="0" hangingPunct="0">
+              <a:defRPr>
+                <a:solidFill>
+                  <a:schemeClr val="tx1"/>
+                </a:solidFill>
+                <a:latin typeface="Arial" charset="0"/>
+                <a:ea typeface="Arial" charset="0"/>
+                <a:cs typeface="Arial" charset="0"/>
+              </a:defRPr>
+            </a:lvl2pPr>
+            <a:lvl3pPr marL="1143000" indent="-228600" eaLnBrk="0" hangingPunct="0">
+              <a:defRPr>
+                <a:solidFill>
+                  <a:schemeClr val="tx1"/>
+                </a:solidFill>
+                <a:latin typeface="Arial" charset="0"/>
+                <a:ea typeface="Arial" charset="0"/>
+                <a:cs typeface="Arial" charset="0"/>
+              </a:defRPr>
+            </a:lvl3pPr>
+            <a:lvl4pPr marL="1600200" indent="-228600" eaLnBrk="0" hangingPunct="0">
+              <a:defRPr>
+                <a:solidFill>
+                  <a:schemeClr val="tx1"/>
+                </a:solidFill>
+                <a:latin typeface="Arial" charset="0"/>
+                <a:ea typeface="Arial" charset="0"/>
+                <a:cs typeface="Arial" charset="0"/>
+              </a:defRPr>
+            </a:lvl4pPr>
+            <a:lvl5pPr marL="2057400" indent="-228600" eaLnBrk="0" hangingPunct="0">
+              <a:defRPr>
+                <a:solidFill>
+                  <a:schemeClr val="tx1"/>
+                </a:solidFill>
+                <a:latin typeface="Arial" charset="0"/>
+                <a:ea typeface="Arial" charset="0"/>
+                <a:cs typeface="Arial" charset="0"/>
+              </a:defRPr>
+            </a:lvl5pPr>
+            <a:lvl6pPr marL="2514600" indent="-228600" eaLnBrk="0" fontAlgn="base" hangingPunct="0">
+              <a:spcBef>
+                <a:spcPct val="0"/>
+              </a:spcBef>
+              <a:spcAft>
+                <a:spcPct val="0"/>
+              </a:spcAft>
+              <a:defRPr>
+                <a:solidFill>
+                  <a:schemeClr val="tx1"/>
+                </a:solidFill>
+                <a:latin typeface="Arial" charset="0"/>
+                <a:ea typeface="Arial" charset="0"/>
+                <a:cs typeface="Arial" charset="0"/>
+              </a:defRPr>
+            </a:lvl6pPr>
+            <a:lvl7pPr marL="2971800" indent="-228600" eaLnBrk="0" fontAlgn="base" hangingPunct="0">
+              <a:spcBef>
+                <a:spcPct val="0"/>
+              </a:spcBef>
+              <a:spcAft>
+                <a:spcPct val="0"/>
+              </a:spcAft>
+              <a:defRPr>
+                <a:solidFill>
+                  <a:schemeClr val="tx1"/>
+                </a:solidFill>
+                <a:latin typeface="Arial" charset="0"/>
+                <a:ea typeface="Arial" charset="0"/>
+                <a:cs typeface="Arial" charset="0"/>
+              </a:defRPr>
+            </a:lvl7pPr>
+            <a:lvl8pPr marL="3429000" indent="-228600" eaLnBrk="0" fontAlgn="base" hangingPunct="0">
+              <a:spcBef>
+                <a:spcPct val="0"/>
+              </a:spcBef>
+              <a:spcAft>
+                <a:spcPct val="0"/>
+              </a:spcAft>
+              <a:defRPr>
+                <a:solidFill>
+                  <a:schemeClr val="tx1"/>
+                </a:solidFill>
+                <a:latin typeface="Arial" charset="0"/>
+                <a:ea typeface="Arial" charset="0"/>
+                <a:cs typeface="Arial" charset="0"/>
+              </a:defRPr>
+            </a:lvl8pPr>
+            <a:lvl9pPr marL="3886200" indent="-228600" eaLnBrk="0" fontAlgn="base" hangingPunct="0">
+              <a:spcBef>
+                <a:spcPct val="0"/>
+              </a:spcBef>
+              <a:spcAft>
+                <a:spcPct val="0"/>
+              </a:spcAft>
+              <a:defRPr>
+                <a:solidFill>
+                  <a:schemeClr val="tx1"/>
+                </a:solidFill>
+                <a:latin typeface="Arial" charset="0"/>
+                <a:ea typeface="Arial" charset="0"/>
+                <a:cs typeface="Arial" charset="0"/>
+              </a:defRPr>
+            </a:lvl9pPr>
+          </a:lstStyle>
+          <a:p>
+            <a:pPr eaLnBrk="1" hangingPunct="1">
               <a:spcBef>
                 <a:spcPct val="50000"/>
               </a:spcBef>
+              <a:defRPr/>
             </a:pPr>
             <a:r>
-              <a:rPr lang="en-US">
-                <a:latin typeface="Calibri" pitchFamily="34" charset="0"/>
+              <a:rPr lang="en-US" smtClean="0">
+                <a:latin typeface="Calibri" charset="0"/>
               </a:rPr>
               <a:t>Nexrad</a:t>
             </a:r>
@@ -5242,7 +7025,7 @@
       </p:sp>
       <p:sp>
         <p:nvSpPr>
-          <p:cNvPr id="6178" name="Text Box 37"/>
+          <p:cNvPr id="77" name="Text Box 37"/>
           <p:cNvSpPr txBox="1">
             <a:spLocks noChangeArrowheads="1"/>
           </p:cNvSpPr>
@@ -5250,7 +7033,7 @@
         </p:nvSpPr>
         <p:spPr bwMode="auto">
           <a:xfrm>
-            <a:off x="7924800" y="6353175"/>
+            <a:off x="7924800" y="6253162"/>
             <a:ext cx="914400" cy="376238"/>
           </a:xfrm>
           <a:prstGeom prst="rect">
@@ -5267,21 +7050,144 @@
             <a:headEnd/>
             <a:tailEnd/>
           </a:ln>
+          <a:scene3d>
+            <a:camera prst="orthographicFront"/>
+            <a:lightRig rig="threePt" dir="t"/>
+          </a:scene3d>
+          <a:sp3d>
+            <a:bevelT prst="relaxedInset"/>
+          </a:sp3d>
         </p:spPr>
         <p:txBody>
           <a:bodyPr>
             <a:spAutoFit/>
           </a:bodyPr>
-          <a:lstStyle/>
-          <a:p>
-            <a:pPr>
+          <a:lstStyle>
+            <a:lvl1pPr eaLnBrk="0" hangingPunct="0">
+              <a:defRPr>
+                <a:solidFill>
+                  <a:schemeClr val="tx1"/>
+                </a:solidFill>
+                <a:latin typeface="Arial" charset="0"/>
+                <a:ea typeface="ＭＳ Ｐゴシック" charset="0"/>
+                <a:cs typeface="Arial" charset="0"/>
+              </a:defRPr>
+            </a:lvl1pPr>
+            <a:lvl2pPr marL="742950" indent="-285750" eaLnBrk="0" hangingPunct="0">
+              <a:defRPr>
+                <a:solidFill>
+                  <a:schemeClr val="tx1"/>
+                </a:solidFill>
+                <a:latin typeface="Arial" charset="0"/>
+                <a:ea typeface="Arial" charset="0"/>
+                <a:cs typeface="Arial" charset="0"/>
+              </a:defRPr>
+            </a:lvl2pPr>
+            <a:lvl3pPr marL="1143000" indent="-228600" eaLnBrk="0" hangingPunct="0">
+              <a:defRPr>
+                <a:solidFill>
+                  <a:schemeClr val="tx1"/>
+                </a:solidFill>
+                <a:latin typeface="Arial" charset="0"/>
+                <a:ea typeface="Arial" charset="0"/>
+                <a:cs typeface="Arial" charset="0"/>
+              </a:defRPr>
+            </a:lvl3pPr>
+            <a:lvl4pPr marL="1600200" indent="-228600" eaLnBrk="0" hangingPunct="0">
+              <a:defRPr>
+                <a:solidFill>
+                  <a:schemeClr val="tx1"/>
+                </a:solidFill>
+                <a:latin typeface="Arial" charset="0"/>
+                <a:ea typeface="Arial" charset="0"/>
+                <a:cs typeface="Arial" charset="0"/>
+              </a:defRPr>
+            </a:lvl4pPr>
+            <a:lvl5pPr marL="2057400" indent="-228600" eaLnBrk="0" hangingPunct="0">
+              <a:defRPr>
+                <a:solidFill>
+                  <a:schemeClr val="tx1"/>
+                </a:solidFill>
+                <a:latin typeface="Arial" charset="0"/>
+                <a:ea typeface="Arial" charset="0"/>
+                <a:cs typeface="Arial" charset="0"/>
+              </a:defRPr>
+            </a:lvl5pPr>
+            <a:lvl6pPr marL="2514600" indent="-228600" eaLnBrk="0" fontAlgn="base" hangingPunct="0">
+              <a:spcBef>
+                <a:spcPct val="0"/>
+              </a:spcBef>
+              <a:spcAft>
+                <a:spcPct val="0"/>
+              </a:spcAft>
+              <a:defRPr>
+                <a:solidFill>
+                  <a:schemeClr val="tx1"/>
+                </a:solidFill>
+                <a:latin typeface="Arial" charset="0"/>
+                <a:ea typeface="Arial" charset="0"/>
+                <a:cs typeface="Arial" charset="0"/>
+              </a:defRPr>
+            </a:lvl6pPr>
+            <a:lvl7pPr marL="2971800" indent="-228600" eaLnBrk="0" fontAlgn="base" hangingPunct="0">
+              <a:spcBef>
+                <a:spcPct val="0"/>
+              </a:spcBef>
+              <a:spcAft>
+                <a:spcPct val="0"/>
+              </a:spcAft>
+              <a:defRPr>
+                <a:solidFill>
+                  <a:schemeClr val="tx1"/>
+                </a:solidFill>
+                <a:latin typeface="Arial" charset="0"/>
+                <a:ea typeface="Arial" charset="0"/>
+                <a:cs typeface="Arial" charset="0"/>
+              </a:defRPr>
+            </a:lvl7pPr>
+            <a:lvl8pPr marL="3429000" indent="-228600" eaLnBrk="0" fontAlgn="base" hangingPunct="0">
+              <a:spcBef>
+                <a:spcPct val="0"/>
+              </a:spcBef>
+              <a:spcAft>
+                <a:spcPct val="0"/>
+              </a:spcAft>
+              <a:defRPr>
+                <a:solidFill>
+                  <a:schemeClr val="tx1"/>
+                </a:solidFill>
+                <a:latin typeface="Arial" charset="0"/>
+                <a:ea typeface="Arial" charset="0"/>
+                <a:cs typeface="Arial" charset="0"/>
+              </a:defRPr>
+            </a:lvl8pPr>
+            <a:lvl9pPr marL="3886200" indent="-228600" eaLnBrk="0" fontAlgn="base" hangingPunct="0">
+              <a:spcBef>
+                <a:spcPct val="0"/>
+              </a:spcBef>
+              <a:spcAft>
+                <a:spcPct val="0"/>
+              </a:spcAft>
+              <a:defRPr>
+                <a:solidFill>
+                  <a:schemeClr val="tx1"/>
+                </a:solidFill>
+                <a:latin typeface="Arial" charset="0"/>
+                <a:ea typeface="Arial" charset="0"/>
+                <a:cs typeface="Arial" charset="0"/>
+              </a:defRPr>
+            </a:lvl9pPr>
+          </a:lstStyle>
+          <a:p>
+            <a:pPr eaLnBrk="1" hangingPunct="1">
               <a:spcBef>
                 <a:spcPct val="50000"/>
               </a:spcBef>
+              <a:defRPr/>
             </a:pPr>
             <a:r>
-              <a:rPr lang="en-US">
-                <a:latin typeface="Calibri" pitchFamily="34" charset="0"/>
+              <a:rPr lang="en-US" dirty="0" smtClean="0">
+                <a:latin typeface="Calibri" charset="0"/>
               </a:rPr>
               <a:t>DMSP</a:t>
             </a:r>
@@ -5290,41 +7196,7 @@
       </p:sp>
       <p:sp>
         <p:nvSpPr>
-          <p:cNvPr id="6179" name="Line 38"/>
-          <p:cNvSpPr>
-            <a:spLocks noChangeShapeType="1"/>
-          </p:cNvSpPr>
-          <p:nvPr/>
-        </p:nvSpPr>
-        <p:spPr bwMode="auto">
-          <a:xfrm flipH="1" flipV="1">
-            <a:off x="6019800" y="5895975"/>
-            <a:ext cx="1295400" cy="0"/>
-          </a:xfrm>
-          <a:prstGeom prst="line">
-            <a:avLst/>
-          </a:prstGeom>
-          <a:noFill/>
-          <a:ln w="9525">
-            <a:solidFill>
-              <a:schemeClr val="tx1"/>
-            </a:solidFill>
-            <a:round/>
-            <a:headEnd/>
-            <a:tailEnd type="triangle" w="med" len="med"/>
-          </a:ln>
-        </p:spPr>
-        <p:txBody>
-          <a:bodyPr/>
-          <a:lstStyle/>
-          <a:p>
-            <a:endParaRPr lang="en-US"/>
-          </a:p>
-        </p:txBody>
-      </p:sp>
-      <p:sp>
-        <p:nvSpPr>
-          <p:cNvPr id="6180" name="Text Box 39"/>
+          <p:cNvPr id="78" name="Text Box 39"/>
           <p:cNvSpPr txBox="1">
             <a:spLocks noChangeArrowheads="1"/>
           </p:cNvSpPr>
@@ -5349,21 +7221,144 @@
             <a:headEnd/>
             <a:tailEnd/>
           </a:ln>
+          <a:scene3d>
+            <a:camera prst="orthographicFront"/>
+            <a:lightRig rig="threePt" dir="t"/>
+          </a:scene3d>
+          <a:sp3d>
+            <a:bevelT/>
+          </a:sp3d>
         </p:spPr>
         <p:txBody>
           <a:bodyPr>
             <a:spAutoFit/>
           </a:bodyPr>
-          <a:lstStyle/>
-          <a:p>
-            <a:pPr>
+          <a:lstStyle>
+            <a:lvl1pPr eaLnBrk="0" hangingPunct="0">
+              <a:defRPr>
+                <a:solidFill>
+                  <a:schemeClr val="tx1"/>
+                </a:solidFill>
+                <a:latin typeface="Arial" charset="0"/>
+                <a:ea typeface="ＭＳ Ｐゴシック" charset="0"/>
+                <a:cs typeface="Arial" charset="0"/>
+              </a:defRPr>
+            </a:lvl1pPr>
+            <a:lvl2pPr marL="742950" indent="-285750" eaLnBrk="0" hangingPunct="0">
+              <a:defRPr>
+                <a:solidFill>
+                  <a:schemeClr val="tx1"/>
+                </a:solidFill>
+                <a:latin typeface="Arial" charset="0"/>
+                <a:ea typeface="Arial" charset="0"/>
+                <a:cs typeface="Arial" charset="0"/>
+              </a:defRPr>
+            </a:lvl2pPr>
+            <a:lvl3pPr marL="1143000" indent="-228600" eaLnBrk="0" hangingPunct="0">
+              <a:defRPr>
+                <a:solidFill>
+                  <a:schemeClr val="tx1"/>
+                </a:solidFill>
+                <a:latin typeface="Arial" charset="0"/>
+                <a:ea typeface="Arial" charset="0"/>
+                <a:cs typeface="Arial" charset="0"/>
+              </a:defRPr>
+            </a:lvl3pPr>
+            <a:lvl4pPr marL="1600200" indent="-228600" eaLnBrk="0" hangingPunct="0">
+              <a:defRPr>
+                <a:solidFill>
+                  <a:schemeClr val="tx1"/>
+                </a:solidFill>
+                <a:latin typeface="Arial" charset="0"/>
+                <a:ea typeface="Arial" charset="0"/>
+                <a:cs typeface="Arial" charset="0"/>
+              </a:defRPr>
+            </a:lvl4pPr>
+            <a:lvl5pPr marL="2057400" indent="-228600" eaLnBrk="0" hangingPunct="0">
+              <a:defRPr>
+                <a:solidFill>
+                  <a:schemeClr val="tx1"/>
+                </a:solidFill>
+                <a:latin typeface="Arial" charset="0"/>
+                <a:ea typeface="Arial" charset="0"/>
+                <a:cs typeface="Arial" charset="0"/>
+              </a:defRPr>
+            </a:lvl5pPr>
+            <a:lvl6pPr marL="2514600" indent="-228600" eaLnBrk="0" fontAlgn="base" hangingPunct="0">
+              <a:spcBef>
+                <a:spcPct val="0"/>
+              </a:spcBef>
+              <a:spcAft>
+                <a:spcPct val="0"/>
+              </a:spcAft>
+              <a:defRPr>
+                <a:solidFill>
+                  <a:schemeClr val="tx1"/>
+                </a:solidFill>
+                <a:latin typeface="Arial" charset="0"/>
+                <a:ea typeface="Arial" charset="0"/>
+                <a:cs typeface="Arial" charset="0"/>
+              </a:defRPr>
+            </a:lvl6pPr>
+            <a:lvl7pPr marL="2971800" indent="-228600" eaLnBrk="0" fontAlgn="base" hangingPunct="0">
+              <a:spcBef>
+                <a:spcPct val="0"/>
+              </a:spcBef>
+              <a:spcAft>
+                <a:spcPct val="0"/>
+              </a:spcAft>
+              <a:defRPr>
+                <a:solidFill>
+                  <a:schemeClr val="tx1"/>
+                </a:solidFill>
+                <a:latin typeface="Arial" charset="0"/>
+                <a:ea typeface="Arial" charset="0"/>
+                <a:cs typeface="Arial" charset="0"/>
+              </a:defRPr>
+            </a:lvl7pPr>
+            <a:lvl8pPr marL="3429000" indent="-228600" eaLnBrk="0" fontAlgn="base" hangingPunct="0">
+              <a:spcBef>
+                <a:spcPct val="0"/>
+              </a:spcBef>
+              <a:spcAft>
+                <a:spcPct val="0"/>
+              </a:spcAft>
+              <a:defRPr>
+                <a:solidFill>
+                  <a:schemeClr val="tx1"/>
+                </a:solidFill>
+                <a:latin typeface="Arial" charset="0"/>
+                <a:ea typeface="Arial" charset="0"/>
+                <a:cs typeface="Arial" charset="0"/>
+              </a:defRPr>
+            </a:lvl8pPr>
+            <a:lvl9pPr marL="3886200" indent="-228600" eaLnBrk="0" fontAlgn="base" hangingPunct="0">
+              <a:spcBef>
+                <a:spcPct val="0"/>
+              </a:spcBef>
+              <a:spcAft>
+                <a:spcPct val="0"/>
+              </a:spcAft>
+              <a:defRPr>
+                <a:solidFill>
+                  <a:schemeClr val="tx1"/>
+                </a:solidFill>
+                <a:latin typeface="Arial" charset="0"/>
+                <a:ea typeface="Arial" charset="0"/>
+                <a:cs typeface="Arial" charset="0"/>
+              </a:defRPr>
+            </a:lvl9pPr>
+          </a:lstStyle>
+          <a:p>
+            <a:pPr eaLnBrk="1" hangingPunct="1">
               <a:spcBef>
                 <a:spcPct val="50000"/>
               </a:spcBef>
+              <a:defRPr/>
             </a:pPr>
             <a:r>
-              <a:rPr lang="en-US">
-                <a:latin typeface="Calibri" pitchFamily="34" charset="0"/>
+              <a:rPr lang="en-US" smtClean="0">
+                <a:latin typeface="Calibri" charset="0"/>
               </a:rPr>
               <a:t>CoordSystem Builder</a:t>
             </a:r>
@@ -5372,7 +7367,7 @@
       </p:sp>
       <p:sp>
         <p:nvSpPr>
-          <p:cNvPr id="6181" name="Text Box 40"/>
+          <p:cNvPr id="79" name="Text Box 40"/>
           <p:cNvSpPr txBox="1">
             <a:spLocks noChangeArrowheads="1"/>
           </p:cNvSpPr>
@@ -5397,21 +7392,144 @@
             <a:headEnd/>
             <a:tailEnd/>
           </a:ln>
+          <a:scene3d>
+            <a:camera prst="orthographicFront"/>
+            <a:lightRig rig="threePt" dir="t"/>
+          </a:scene3d>
+          <a:sp3d>
+            <a:bevelT/>
+          </a:sp3d>
         </p:spPr>
         <p:txBody>
           <a:bodyPr>
             <a:spAutoFit/>
           </a:bodyPr>
-          <a:lstStyle/>
-          <a:p>
-            <a:pPr>
+          <a:lstStyle>
+            <a:lvl1pPr eaLnBrk="0" hangingPunct="0">
+              <a:defRPr>
+                <a:solidFill>
+                  <a:schemeClr val="tx1"/>
+                </a:solidFill>
+                <a:latin typeface="Arial" charset="0"/>
+                <a:ea typeface="ＭＳ Ｐゴシック" charset="0"/>
+                <a:cs typeface="Arial" charset="0"/>
+              </a:defRPr>
+            </a:lvl1pPr>
+            <a:lvl2pPr marL="742950" indent="-285750" eaLnBrk="0" hangingPunct="0">
+              <a:defRPr>
+                <a:solidFill>
+                  <a:schemeClr val="tx1"/>
+                </a:solidFill>
+                <a:latin typeface="Arial" charset="0"/>
+                <a:ea typeface="Arial" charset="0"/>
+                <a:cs typeface="Arial" charset="0"/>
+              </a:defRPr>
+            </a:lvl2pPr>
+            <a:lvl3pPr marL="1143000" indent="-228600" eaLnBrk="0" hangingPunct="0">
+              <a:defRPr>
+                <a:solidFill>
+                  <a:schemeClr val="tx1"/>
+                </a:solidFill>
+                <a:latin typeface="Arial" charset="0"/>
+                <a:ea typeface="Arial" charset="0"/>
+                <a:cs typeface="Arial" charset="0"/>
+              </a:defRPr>
+            </a:lvl3pPr>
+            <a:lvl4pPr marL="1600200" indent="-228600" eaLnBrk="0" hangingPunct="0">
+              <a:defRPr>
+                <a:solidFill>
+                  <a:schemeClr val="tx1"/>
+                </a:solidFill>
+                <a:latin typeface="Arial" charset="0"/>
+                <a:ea typeface="Arial" charset="0"/>
+                <a:cs typeface="Arial" charset="0"/>
+              </a:defRPr>
+            </a:lvl4pPr>
+            <a:lvl5pPr marL="2057400" indent="-228600" eaLnBrk="0" hangingPunct="0">
+              <a:defRPr>
+                <a:solidFill>
+                  <a:schemeClr val="tx1"/>
+                </a:solidFill>
+                <a:latin typeface="Arial" charset="0"/>
+                <a:ea typeface="Arial" charset="0"/>
+                <a:cs typeface="Arial" charset="0"/>
+              </a:defRPr>
+            </a:lvl5pPr>
+            <a:lvl6pPr marL="2514600" indent="-228600" eaLnBrk="0" fontAlgn="base" hangingPunct="0">
+              <a:spcBef>
+                <a:spcPct val="0"/>
+              </a:spcBef>
+              <a:spcAft>
+                <a:spcPct val="0"/>
+              </a:spcAft>
+              <a:defRPr>
+                <a:solidFill>
+                  <a:schemeClr val="tx1"/>
+                </a:solidFill>
+                <a:latin typeface="Arial" charset="0"/>
+                <a:ea typeface="Arial" charset="0"/>
+                <a:cs typeface="Arial" charset="0"/>
+              </a:defRPr>
+            </a:lvl6pPr>
+            <a:lvl7pPr marL="2971800" indent="-228600" eaLnBrk="0" fontAlgn="base" hangingPunct="0">
+              <a:spcBef>
+                <a:spcPct val="0"/>
+              </a:spcBef>
+              <a:spcAft>
+                <a:spcPct val="0"/>
+              </a:spcAft>
+              <a:defRPr>
+                <a:solidFill>
+                  <a:schemeClr val="tx1"/>
+                </a:solidFill>
+                <a:latin typeface="Arial" charset="0"/>
+                <a:ea typeface="Arial" charset="0"/>
+                <a:cs typeface="Arial" charset="0"/>
+              </a:defRPr>
+            </a:lvl7pPr>
+            <a:lvl8pPr marL="3429000" indent="-228600" eaLnBrk="0" fontAlgn="base" hangingPunct="0">
+              <a:spcBef>
+                <a:spcPct val="0"/>
+              </a:spcBef>
+              <a:spcAft>
+                <a:spcPct val="0"/>
+              </a:spcAft>
+              <a:defRPr>
+                <a:solidFill>
+                  <a:schemeClr val="tx1"/>
+                </a:solidFill>
+                <a:latin typeface="Arial" charset="0"/>
+                <a:ea typeface="Arial" charset="0"/>
+                <a:cs typeface="Arial" charset="0"/>
+              </a:defRPr>
+            </a:lvl8pPr>
+            <a:lvl9pPr marL="3886200" indent="-228600" eaLnBrk="0" fontAlgn="base" hangingPunct="0">
+              <a:spcBef>
+                <a:spcPct val="0"/>
+              </a:spcBef>
+              <a:spcAft>
+                <a:spcPct val="0"/>
+              </a:spcAft>
+              <a:defRPr>
+                <a:solidFill>
+                  <a:schemeClr val="tx1"/>
+                </a:solidFill>
+                <a:latin typeface="Arial" charset="0"/>
+                <a:ea typeface="Arial" charset="0"/>
+                <a:cs typeface="Arial" charset="0"/>
+              </a:defRPr>
+            </a:lvl9pPr>
+          </a:lstStyle>
+          <a:p>
+            <a:pPr eaLnBrk="1" hangingPunct="1">
               <a:spcBef>
                 <a:spcPct val="50000"/>
               </a:spcBef>
+              <a:defRPr/>
             </a:pPr>
             <a:r>
-              <a:rPr lang="en-US">
-                <a:latin typeface="Calibri" pitchFamily="34" charset="0"/>
+              <a:rPr lang="en-US" smtClean="0">
+                <a:latin typeface="Calibri" charset="0"/>
               </a:rPr>
               <a:t>Datatype Adapter</a:t>
             </a:r>
@@ -5420,7 +7538,7 @@
       </p:sp>
       <p:sp>
         <p:nvSpPr>
-          <p:cNvPr id="6182" name="Line 41"/>
+          <p:cNvPr id="80" name="Line 41"/>
           <p:cNvSpPr>
             <a:spLocks noChangeShapeType="1"/>
           </p:cNvSpPr>
@@ -5443,6 +7561,13 @@
             <a:headEnd/>
             <a:tailEnd type="triangle" w="med" len="med"/>
           </a:ln>
+          <a:extLst>
+            <a:ext uri="{909E8E84-426E-40dd-AFC4-6F175D3DCCD1}">
+              <a14:hiddenFill xmlns:a14="http://schemas.microsoft.com/office/drawing/2010/main">
+                <a:noFill/>
+              </a14:hiddenFill>
+            </a:ext>
+          </a:extLst>
         </p:spPr>
         <p:txBody>
           <a:bodyPr/>
@@ -5454,7 +7579,7 @@
       </p:sp>
       <p:sp>
         <p:nvSpPr>
-          <p:cNvPr id="6183" name="Line 42"/>
+          <p:cNvPr id="81" name="Line 42"/>
           <p:cNvSpPr>
             <a:spLocks noChangeShapeType="1"/>
           </p:cNvSpPr>
@@ -5477,6 +7602,13 @@
             <a:headEnd/>
             <a:tailEnd type="triangle" w="med" len="med"/>
           </a:ln>
+          <a:extLst>
+            <a:ext uri="{909E8E84-426E-40dd-AFC4-6F175D3DCCD1}">
+              <a14:hiddenFill xmlns:a14="http://schemas.microsoft.com/office/drawing/2010/main">
+                <a:noFill/>
+              </a14:hiddenFill>
+            </a:ext>
+          </a:extLst>
         </p:spPr>
         <p:txBody>
           <a:bodyPr/>
@@ -5488,7 +7620,7 @@
       </p:sp>
       <p:sp>
         <p:nvSpPr>
-          <p:cNvPr id="6184" name="Line 43"/>
+          <p:cNvPr id="82" name="Line 43"/>
           <p:cNvSpPr>
             <a:spLocks noChangeShapeType="1"/>
           </p:cNvSpPr>
@@ -5511,6 +7643,13 @@
             <a:headEnd/>
             <a:tailEnd type="triangle" w="med" len="med"/>
           </a:ln>
+          <a:extLst>
+            <a:ext uri="{909E8E84-426E-40dd-AFC4-6F175D3DCCD1}">
+              <a14:hiddenFill xmlns:a14="http://schemas.microsoft.com/office/drawing/2010/main">
+                <a:noFill/>
+              </a14:hiddenFill>
+            </a:ext>
+          </a:extLst>
         </p:spPr>
         <p:txBody>
           <a:bodyPr/>
@@ -5522,7 +7661,7 @@
       </p:sp>
       <p:sp>
         <p:nvSpPr>
-          <p:cNvPr id="157740" name="Document"/>
+          <p:cNvPr id="83" name="Document"/>
           <p:cNvSpPr>
             <a:spLocks noEditPoints="1" noChangeArrowheads="1"/>
           </p:cNvSpPr>
@@ -5648,8 +7787,10 @@
             <a:tailEnd/>
           </a:ln>
           <a:effectLst>
-            <a:outerShdw dist="107763" dir="2700000" algn="ctr" rotWithShape="0">
-              <a:srgbClr val="808080"/>
+            <a:outerShdw blurRad="50800" dist="38100" dir="8100000" sx="104000" sy="104000" algn="tr" rotWithShape="0">
+              <a:prstClr val="black">
+                <a:alpha val="40000"/>
+              </a:prstClr>
             </a:outerShdw>
           </a:effectLst>
         </p:spPr>
@@ -5669,6 +7810,7 @@
             <a:r>
               <a:rPr lang="en-US">
                 <a:latin typeface="+mn-lt"/>
+                <a:ea typeface="+mn-ea"/>
                 <a:cs typeface="+mn-cs"/>
               </a:rPr>
               <a:t>NcML</a:t>
@@ -5678,7 +7820,7 @@
       </p:sp>
       <p:sp>
         <p:nvSpPr>
-          <p:cNvPr id="6186" name="Line 45"/>
+          <p:cNvPr id="84" name="Line 45"/>
           <p:cNvSpPr>
             <a:spLocks noChangeShapeType="1"/>
           </p:cNvSpPr>
@@ -5701,6 +7843,13 @@
             <a:headEnd/>
             <a:tailEnd type="triangle" w="med" len="med"/>
           </a:ln>
+          <a:extLst>
+            <a:ext uri="{909E8E84-426E-40dd-AFC4-6F175D3DCCD1}">
+              <a14:hiddenFill xmlns:a14="http://schemas.microsoft.com/office/drawing/2010/main">
+                <a:noFill/>
+              </a14:hiddenFill>
+            </a:ext>
+          </a:extLst>
         </p:spPr>
         <p:txBody>
           <a:bodyPr/>
@@ -5710,6 +7859,142 @@
           </a:p>
         </p:txBody>
       </p:sp>
+      <p:cxnSp>
+        <p:nvCxnSpPr>
+          <p:cNvPr id="85" name="AutoShape 27"/>
+          <p:cNvCxnSpPr>
+            <a:cxnSpLocks noChangeShapeType="1"/>
+          </p:cNvCxnSpPr>
+          <p:nvPr/>
+        </p:nvCxnSpPr>
+        <p:spPr bwMode="auto">
+          <a:xfrm rot="5400000">
+            <a:off x="6907212" y="4470401"/>
+            <a:ext cx="396875" cy="495300"/>
+          </a:xfrm>
+          <a:prstGeom prst="bentConnector2">
+            <a:avLst/>
+          </a:prstGeom>
+          <a:noFill/>
+          <a:ln w="9525">
+            <a:solidFill>
+              <a:schemeClr val="tx1"/>
+            </a:solidFill>
+            <a:miter lim="800000"/>
+            <a:headEnd/>
+            <a:tailEnd type="triangle" w="med" len="med"/>
+          </a:ln>
+          <a:extLst>
+            <a:ext uri="{909E8E84-426E-40dd-AFC4-6F175D3DCCD1}">
+              <a14:hiddenFill xmlns:a14="http://schemas.microsoft.com/office/drawing/2010/main">
+                <a:noFill/>
+              </a14:hiddenFill>
+            </a:ext>
+          </a:extLst>
+        </p:spPr>
+      </p:cxnSp>
+      <p:cxnSp>
+        <p:nvCxnSpPr>
+          <p:cNvPr id="86" name="AutoShape 27"/>
+          <p:cNvCxnSpPr>
+            <a:cxnSpLocks noChangeShapeType="1"/>
+          </p:cNvCxnSpPr>
+          <p:nvPr/>
+        </p:nvCxnSpPr>
+        <p:spPr bwMode="auto">
+          <a:xfrm rot="5400000">
+            <a:off x="6642100" y="4735513"/>
+            <a:ext cx="927100" cy="495300"/>
+          </a:xfrm>
+          <a:prstGeom prst="bentConnector2">
+            <a:avLst/>
+          </a:prstGeom>
+          <a:noFill/>
+          <a:ln w="9525">
+            <a:solidFill>
+              <a:schemeClr val="tx1"/>
+            </a:solidFill>
+            <a:miter lim="800000"/>
+            <a:headEnd/>
+            <a:tailEnd type="triangle" w="med" len="med"/>
+          </a:ln>
+          <a:extLst>
+            <a:ext uri="{909E8E84-426E-40dd-AFC4-6F175D3DCCD1}">
+              <a14:hiddenFill xmlns:a14="http://schemas.microsoft.com/office/drawing/2010/main">
+                <a:noFill/>
+              </a14:hiddenFill>
+            </a:ext>
+          </a:extLst>
+        </p:spPr>
+      </p:cxnSp>
+      <p:cxnSp>
+        <p:nvCxnSpPr>
+          <p:cNvPr id="87" name="AutoShape 27"/>
+          <p:cNvCxnSpPr>
+            <a:cxnSpLocks noChangeShapeType="1"/>
+          </p:cNvCxnSpPr>
+          <p:nvPr/>
+        </p:nvCxnSpPr>
+        <p:spPr bwMode="auto">
+          <a:xfrm rot="5400000">
+            <a:off x="6145212" y="5232401"/>
+            <a:ext cx="1920875" cy="495300"/>
+          </a:xfrm>
+          <a:prstGeom prst="bentConnector2">
+            <a:avLst/>
+          </a:prstGeom>
+          <a:noFill/>
+          <a:ln w="9525">
+            <a:solidFill>
+              <a:schemeClr val="tx1"/>
+            </a:solidFill>
+            <a:miter lim="800000"/>
+            <a:headEnd/>
+            <a:tailEnd type="triangle" w="med" len="med"/>
+          </a:ln>
+          <a:extLst>
+            <a:ext uri="{909E8E84-426E-40dd-AFC4-6F175D3DCCD1}">
+              <a14:hiddenFill xmlns:a14="http://schemas.microsoft.com/office/drawing/2010/main">
+                <a:noFill/>
+              </a14:hiddenFill>
+            </a:ext>
+          </a:extLst>
+        </p:spPr>
+      </p:cxnSp>
+      <p:cxnSp>
+        <p:nvCxnSpPr>
+          <p:cNvPr id="88" name="AutoShape 27"/>
+          <p:cNvCxnSpPr>
+            <a:cxnSpLocks noChangeShapeType="1"/>
+          </p:cNvCxnSpPr>
+          <p:nvPr/>
+        </p:nvCxnSpPr>
+        <p:spPr bwMode="auto">
+          <a:xfrm rot="5400000">
+            <a:off x="6400006" y="4977607"/>
+            <a:ext cx="1411287" cy="495300"/>
+          </a:xfrm>
+          <a:prstGeom prst="bentConnector2">
+            <a:avLst/>
+          </a:prstGeom>
+          <a:noFill/>
+          <a:ln w="9525">
+            <a:solidFill>
+              <a:schemeClr val="tx1"/>
+            </a:solidFill>
+            <a:miter lim="800000"/>
+            <a:headEnd/>
+            <a:tailEnd type="triangle" w="med" len="med"/>
+          </a:ln>
+          <a:extLst>
+            <a:ext uri="{909E8E84-426E-40dd-AFC4-6F175D3DCCD1}">
+              <a14:hiddenFill xmlns:a14="http://schemas.microsoft.com/office/drawing/2010/main">
+                <a:noFill/>
+              </a14:hiddenFill>
+            </a:ext>
+          </a:extLst>
+        </p:spPr>
+      </p:cxnSp>
     </p:spTree>
   </p:cSld>
   <p:clrMapOvr>
@@ -5718,7 +8003,7 @@
   <p:timing>
     <p:tnLst>
       <p:par>
-        <p:cTn id="1" dur="indefinite" restart="never" nodeType="tmRoot"/>
+        <p:cTn xmlns:p14="http://schemas.microsoft.com/office/powerpoint/2010/main" id="1" dur="indefinite" restart="never" nodeType="tmRoot"/>
       </p:par>
     </p:tnLst>
   </p:timing>
@@ -5870,7 +8155,7 @@
   <p:timing>
     <p:tnLst>
       <p:par>
-        <p:cTn id="1" dur="indefinite" restart="never" nodeType="tmRoot"/>
+        <p:cTn xmlns:p14="http://schemas.microsoft.com/office/powerpoint/2010/main" id="1" dur="indefinite" restart="never" nodeType="tmRoot"/>
       </p:par>
     </p:tnLst>
   </p:timing>
@@ -5928,6 +8213,15 @@
           </p:nvPr>
         </p:nvSpPr>
         <p:spPr>
+          <a:xfrm>
+            <a:off x="2209800" y="274638"/>
+            <a:ext cx="4267200" cy="1143000"/>
+          </a:xfrm>
+          <a:solidFill>
+            <a:schemeClr val="bg1">
+              <a:alpha val="30000"/>
+            </a:schemeClr>
+          </a:solidFill>
           <a:ln>
             <a:solidFill>
               <a:schemeClr val="bg2"/>
@@ -5939,10 +8233,32 @@
           <a:lstStyle/>
           <a:p>
             <a:r>
-              <a:rPr lang="en-US" dirty="0" smtClean="0"/>
+              <a:rPr lang="en-US" b="1" i="1" dirty="0" smtClean="0">
+                <a:solidFill>
+                  <a:srgbClr val="FF0000"/>
+                </a:solidFill>
+                <a:effectLst>
+                  <a:outerShdw blurRad="60007" dist="310007" dir="7680000" sy="30000" kx="1300200" algn="ctr" rotWithShape="0">
+                    <a:prstClr val="black">
+                      <a:alpha val="32000"/>
+                    </a:prstClr>
+                  </a:outerShdw>
+                </a:effectLst>
+              </a:rPr>
               <a:t>Good Luck!</a:t>
             </a:r>
-            <a:endParaRPr lang="en-US" dirty="0"/>
+            <a:endParaRPr lang="en-US" b="1" i="1" dirty="0">
+              <a:solidFill>
+                <a:srgbClr val="FF0000"/>
+              </a:solidFill>
+              <a:effectLst>
+                <a:outerShdw blurRad="60007" dist="310007" dir="7680000" sy="30000" kx="1300200" algn="ctr" rotWithShape="0">
+                  <a:prstClr val="black">
+                    <a:alpha val="32000"/>
+                  </a:prstClr>
+                </a:outerShdw>
+              </a:effectLst>
+            </a:endParaRPr>
           </a:p>
         </p:txBody>
       </p:sp>
@@ -5954,7 +8270,7 @@
   <p:timing>
     <p:tnLst>
       <p:par>
-        <p:cTn id="1" dur="indefinite" restart="never" nodeType="tmRoot"/>
+        <p:cTn xmlns:p14="http://schemas.microsoft.com/office/powerpoint/2010/main" id="1" dur="indefinite" restart="never" nodeType="tmRoot"/>
       </p:par>
     </p:tnLst>
   </p:timing>

</xml_diff>